<commit_message>
guest/user with cartID, update DB quantity after cart is placed order, validate data of quantity input (no more than inventory)
</commit_message>
<xml_diff>
--- a/build/web/doc/business flow.pptx
+++ b/build/web/doc/business flow.pptx
@@ -270,7 +270,7 @@
           <a:p>
             <a:fld id="{C5F3B386-61D0-A542-9BBD-24895FFB08D6}" type="datetimeFigureOut">
               <a:rPr lang="en-US" smtClean="0"/>
-              <a:t>5/28/20</a:t>
+              <a:t>5/29/20</a:t>
             </a:fld>
             <a:endParaRPr lang="en-US"/>
           </a:p>
@@ -468,7 +468,7 @@
           <a:p>
             <a:fld id="{C5F3B386-61D0-A542-9BBD-24895FFB08D6}" type="datetimeFigureOut">
               <a:rPr lang="en-US" smtClean="0"/>
-              <a:t>5/28/20</a:t>
+              <a:t>5/29/20</a:t>
             </a:fld>
             <a:endParaRPr lang="en-US"/>
           </a:p>
@@ -676,7 +676,7 @@
           <a:p>
             <a:fld id="{C5F3B386-61D0-A542-9BBD-24895FFB08D6}" type="datetimeFigureOut">
               <a:rPr lang="en-US" smtClean="0"/>
-              <a:t>5/28/20</a:t>
+              <a:t>5/29/20</a:t>
             </a:fld>
             <a:endParaRPr lang="en-US"/>
           </a:p>
@@ -874,7 +874,7 @@
           <a:p>
             <a:fld id="{C5F3B386-61D0-A542-9BBD-24895FFB08D6}" type="datetimeFigureOut">
               <a:rPr lang="en-US" smtClean="0"/>
-              <a:t>5/28/20</a:t>
+              <a:t>5/29/20</a:t>
             </a:fld>
             <a:endParaRPr lang="en-US"/>
           </a:p>
@@ -1149,7 +1149,7 @@
           <a:p>
             <a:fld id="{C5F3B386-61D0-A542-9BBD-24895FFB08D6}" type="datetimeFigureOut">
               <a:rPr lang="en-US" smtClean="0"/>
-              <a:t>5/28/20</a:t>
+              <a:t>5/29/20</a:t>
             </a:fld>
             <a:endParaRPr lang="en-US"/>
           </a:p>
@@ -1414,7 +1414,7 @@
           <a:p>
             <a:fld id="{C5F3B386-61D0-A542-9BBD-24895FFB08D6}" type="datetimeFigureOut">
               <a:rPr lang="en-US" smtClean="0"/>
-              <a:t>5/28/20</a:t>
+              <a:t>5/29/20</a:t>
             </a:fld>
             <a:endParaRPr lang="en-US"/>
           </a:p>
@@ -1826,7 +1826,7 @@
           <a:p>
             <a:fld id="{C5F3B386-61D0-A542-9BBD-24895FFB08D6}" type="datetimeFigureOut">
               <a:rPr lang="en-US" smtClean="0"/>
-              <a:t>5/28/20</a:t>
+              <a:t>5/29/20</a:t>
             </a:fld>
             <a:endParaRPr lang="en-US"/>
           </a:p>
@@ -1967,7 +1967,7 @@
           <a:p>
             <a:fld id="{C5F3B386-61D0-A542-9BBD-24895FFB08D6}" type="datetimeFigureOut">
               <a:rPr lang="en-US" smtClean="0"/>
-              <a:t>5/28/20</a:t>
+              <a:t>5/29/20</a:t>
             </a:fld>
             <a:endParaRPr lang="en-US"/>
           </a:p>
@@ -2080,7 +2080,7 @@
           <a:p>
             <a:fld id="{C5F3B386-61D0-A542-9BBD-24895FFB08D6}" type="datetimeFigureOut">
               <a:rPr lang="en-US" smtClean="0"/>
-              <a:t>5/28/20</a:t>
+              <a:t>5/29/20</a:t>
             </a:fld>
             <a:endParaRPr lang="en-US"/>
           </a:p>
@@ -2391,7 +2391,7 @@
           <a:p>
             <a:fld id="{C5F3B386-61D0-A542-9BBD-24895FFB08D6}" type="datetimeFigureOut">
               <a:rPr lang="en-US" smtClean="0"/>
-              <a:t>5/28/20</a:t>
+              <a:t>5/29/20</a:t>
             </a:fld>
             <a:endParaRPr lang="en-US"/>
           </a:p>
@@ -2679,7 +2679,7 @@
           <a:p>
             <a:fld id="{C5F3B386-61D0-A542-9BBD-24895FFB08D6}" type="datetimeFigureOut">
               <a:rPr lang="en-US" smtClean="0"/>
-              <a:t>5/28/20</a:t>
+              <a:t>5/29/20</a:t>
             </a:fld>
             <a:endParaRPr lang="en-US"/>
           </a:p>
@@ -2920,7 +2920,7 @@
           <a:p>
             <a:fld id="{C5F3B386-61D0-A542-9BBD-24895FFB08D6}" type="datetimeFigureOut">
               <a:rPr lang="en-US" smtClean="0"/>
-              <a:t>5/28/20</a:t>
+              <a:t>5/29/20</a:t>
             </a:fld>
             <a:endParaRPr lang="en-US"/>
           </a:p>
@@ -3491,7 +3491,7 @@
         </p:nvSpPr>
         <p:spPr>
           <a:xfrm>
-            <a:off x="317706" y="1856003"/>
+            <a:off x="324429" y="1777516"/>
             <a:ext cx="914400" cy="385825"/>
           </a:xfrm>
           <a:prstGeom prst="rect">
@@ -3589,7 +3589,7 @@
         </p:nvSpPr>
         <p:spPr>
           <a:xfrm>
-            <a:off x="2093152" y="229951"/>
+            <a:off x="4973677" y="2378486"/>
             <a:ext cx="914400" cy="311350"/>
           </a:xfrm>
           <a:prstGeom prst="rect">
@@ -3638,7 +3638,7 @@
         </p:nvSpPr>
         <p:spPr>
           <a:xfrm>
-            <a:off x="1971694" y="788518"/>
+            <a:off x="4852219" y="2937053"/>
             <a:ext cx="1196788" cy="385825"/>
           </a:xfrm>
           <a:prstGeom prst="rect">
@@ -3668,17 +3668,17 @@
             <a:pPr algn="ctr"/>
             <a:r>
               <a:rPr lang="en-US" sz="1200" dirty="0"/>
-              <a:t>Cart session invalidate</a:t>
-            </a:r>
-          </a:p>
-        </p:txBody>
-      </p:sp>
-      <p:sp>
-        <p:nvSpPr>
-          <p:cNvPr id="25" name="Rectangle 24">
-            <a:extLst>
-              <a:ext uri="{FF2B5EF4-FFF2-40B4-BE49-F238E27FC236}">
-                <a16:creationId xmlns:a16="http://schemas.microsoft.com/office/drawing/2014/main" id="{1D20068F-70C3-A245-BFC8-7419D65B2B2E}"/>
+              <a:t>All session invalidate</a:t>
+            </a:r>
+          </a:p>
+        </p:txBody>
+      </p:sp>
+      <p:sp>
+        <p:nvSpPr>
+          <p:cNvPr id="28" name="Rectangle 27">
+            <a:extLst>
+              <a:ext uri="{FF2B5EF4-FFF2-40B4-BE49-F238E27FC236}">
+                <a16:creationId xmlns:a16="http://schemas.microsoft.com/office/drawing/2014/main" id="{1816E54F-E7D1-9A4C-8D07-CA1EFDBB8C43}"/>
               </a:ext>
             </a:extLst>
           </p:cNvPr>
@@ -3687,8 +3687,8 @@
         </p:nvSpPr>
         <p:spPr>
           <a:xfrm>
-            <a:off x="3922224" y="229951"/>
-            <a:ext cx="914400" cy="385825"/>
+            <a:off x="3116992" y="6006229"/>
+            <a:ext cx="2145672" cy="753821"/>
           </a:xfrm>
           <a:prstGeom prst="rect">
             <a:avLst/>
@@ -3714,162 +3714,37 @@
           <a:bodyPr rtlCol="0" anchor="ctr"/>
           <a:lstStyle/>
           <a:p>
-            <a:pPr algn="ctr"/>
             <a:r>
               <a:rPr lang="en-US" sz="1200" dirty="0"/>
-              <a:t>Set cart session</a:t>
-            </a:r>
-          </a:p>
-        </p:txBody>
-      </p:sp>
-      <p:sp>
-        <p:nvSpPr>
-          <p:cNvPr id="26" name="Rectangle 25">
-            <a:extLst>
-              <a:ext uri="{FF2B5EF4-FFF2-40B4-BE49-F238E27FC236}">
-                <a16:creationId xmlns:a16="http://schemas.microsoft.com/office/drawing/2014/main" id="{986F98DE-8C5C-7F45-A450-160FCB75DCDB}"/>
-              </a:ext>
-            </a:extLst>
-          </p:cNvPr>
-          <p:cNvSpPr/>
-          <p:nvPr/>
-        </p:nvSpPr>
-        <p:spPr>
-          <a:xfrm>
-            <a:off x="3932581" y="986086"/>
-            <a:ext cx="914400" cy="385825"/>
-          </a:xfrm>
-          <a:prstGeom prst="rect">
-            <a:avLst/>
-          </a:prstGeom>
-        </p:spPr>
-        <p:style>
-          <a:lnRef idx="2">
-            <a:schemeClr val="accent1">
-              <a:shade val="50000"/>
-            </a:schemeClr>
-          </a:lnRef>
-          <a:fillRef idx="1">
-            <a:schemeClr val="accent1"/>
-          </a:fillRef>
-          <a:effectRef idx="0">
-            <a:schemeClr val="accent1"/>
-          </a:effectRef>
-          <a:fontRef idx="minor">
-            <a:schemeClr val="lt1"/>
-          </a:fontRef>
-        </p:style>
-        <p:txBody>
-          <a:bodyPr rtlCol="0" anchor="ctr"/>
-          <a:lstStyle/>
-          <a:p>
-            <a:pPr algn="ctr"/>
+              <a:t>DB:</a:t>
+            </a:r>
+          </a:p>
+          <a:p>
+            <a:pPr marL="171450" indent="-171450">
+              <a:buFont typeface="Arial" panose="020B0604020202020204" pitchFamily="34" charset="0"/>
+              <a:buChar char="•"/>
+            </a:pPr>
             <a:r>
               <a:rPr lang="en-US" sz="1200" dirty="0"/>
-              <a:t>Set </a:t>
+              <a:t>Cart: </a:t>
             </a:r>
             <a:r>
               <a:rPr lang="en-US" sz="1200" dirty="0" err="1"/>
-              <a:t>cartID</a:t>
-            </a:r>
-            <a:endParaRPr lang="en-US" sz="1200" dirty="0"/>
-          </a:p>
-        </p:txBody>
-      </p:sp>
-      <p:sp>
-        <p:nvSpPr>
-          <p:cNvPr id="27" name="Rectangle 26">
-            <a:extLst>
-              <a:ext uri="{FF2B5EF4-FFF2-40B4-BE49-F238E27FC236}">
-                <a16:creationId xmlns:a16="http://schemas.microsoft.com/office/drawing/2014/main" id="{CD8AEE6A-7724-BA4C-9D6B-F7E591DFA4D6}"/>
-              </a:ext>
-            </a:extLst>
-          </p:cNvPr>
-          <p:cNvSpPr/>
-          <p:nvPr/>
-        </p:nvSpPr>
-        <p:spPr>
-          <a:xfrm>
-            <a:off x="3932581" y="1737565"/>
-            <a:ext cx="1342008" cy="385825"/>
-          </a:xfrm>
-          <a:prstGeom prst="rect">
-            <a:avLst/>
-          </a:prstGeom>
-        </p:spPr>
-        <p:style>
-          <a:lnRef idx="2">
-            <a:schemeClr val="accent1">
-              <a:shade val="50000"/>
-            </a:schemeClr>
-          </a:lnRef>
-          <a:fillRef idx="1">
-            <a:schemeClr val="accent1"/>
-          </a:fillRef>
-          <a:effectRef idx="0">
-            <a:schemeClr val="accent1"/>
-          </a:effectRef>
-          <a:fontRef idx="minor">
-            <a:schemeClr val="lt1"/>
-          </a:fontRef>
-        </p:style>
-        <p:txBody>
-          <a:bodyPr rtlCol="0" anchor="ctr"/>
-          <a:lstStyle/>
-          <a:p>
-            <a:pPr algn="ctr"/>
+              <a:t>isOrdered</a:t>
+            </a:r>
             <a:r>
               <a:rPr lang="en-US" sz="1200" dirty="0"/>
-              <a:t>Populate DB with cart table</a:t>
-            </a:r>
-          </a:p>
-        </p:txBody>
-      </p:sp>
-      <p:sp>
-        <p:nvSpPr>
-          <p:cNvPr id="28" name="Rectangle 27">
-            <a:extLst>
-              <a:ext uri="{FF2B5EF4-FFF2-40B4-BE49-F238E27FC236}">
-                <a16:creationId xmlns:a16="http://schemas.microsoft.com/office/drawing/2014/main" id="{1816E54F-E7D1-9A4C-8D07-CA1EFDBB8C43}"/>
-              </a:ext>
-            </a:extLst>
-          </p:cNvPr>
-          <p:cNvSpPr/>
-          <p:nvPr/>
-        </p:nvSpPr>
-        <p:spPr>
-          <a:xfrm>
-            <a:off x="3922224" y="2568751"/>
-            <a:ext cx="1538796" cy="753821"/>
-          </a:xfrm>
-          <a:prstGeom prst="rect">
-            <a:avLst/>
-          </a:prstGeom>
-        </p:spPr>
-        <p:style>
-          <a:lnRef idx="2">
-            <a:schemeClr val="accent1">
-              <a:shade val="50000"/>
-            </a:schemeClr>
-          </a:lnRef>
-          <a:fillRef idx="1">
-            <a:schemeClr val="accent1"/>
-          </a:fillRef>
-          <a:effectRef idx="0">
-            <a:schemeClr val="accent1"/>
-          </a:effectRef>
-          <a:fontRef idx="minor">
-            <a:schemeClr val="lt1"/>
-          </a:fontRef>
-        </p:style>
-        <p:txBody>
-          <a:bodyPr rtlCol="0" anchor="ctr"/>
-          <a:lstStyle/>
-          <a:p>
-            <a:pPr algn="ctr"/>
+              <a:t> =1;</a:t>
+            </a:r>
+          </a:p>
+          <a:p>
+            <a:pPr marL="171450" indent="-171450">
+              <a:buFont typeface="Arial" panose="020B0604020202020204" pitchFamily="34" charset="0"/>
+              <a:buChar char="•"/>
+            </a:pPr>
             <a:r>
               <a:rPr lang="en-US" sz="1200" dirty="0"/>
-              <a:t>If order placed, delete the corresponding cart from DB</a:t>
+              <a:t>Books: delete the corresponding cart from DB</a:t>
             </a:r>
           </a:p>
         </p:txBody>
@@ -4480,44 +4355,6 @@
           </a:p>
         </p:txBody>
       </p:sp>
-      <p:cxnSp>
-        <p:nvCxnSpPr>
-          <p:cNvPr id="44" name="Straight Connector 43">
-            <a:extLst>
-              <a:ext uri="{FF2B5EF4-FFF2-40B4-BE49-F238E27FC236}">
-                <a16:creationId xmlns:a16="http://schemas.microsoft.com/office/drawing/2014/main" id="{614F54D9-3040-A24D-AD63-116E07CF8DA5}"/>
-              </a:ext>
-            </a:extLst>
-          </p:cNvPr>
-          <p:cNvCxnSpPr>
-            <a:cxnSpLocks/>
-          </p:cNvCxnSpPr>
-          <p:nvPr/>
-        </p:nvCxnSpPr>
-        <p:spPr>
-          <a:xfrm>
-            <a:off x="0" y="4944862"/>
-            <a:ext cx="12192000" cy="0"/>
-          </a:xfrm>
-          <a:prstGeom prst="line">
-            <a:avLst/>
-          </a:prstGeom>
-        </p:spPr>
-        <p:style>
-          <a:lnRef idx="1">
-            <a:schemeClr val="accent1"/>
-          </a:lnRef>
-          <a:fillRef idx="0">
-            <a:schemeClr val="accent1"/>
-          </a:fillRef>
-          <a:effectRef idx="0">
-            <a:schemeClr val="accent1"/>
-          </a:effectRef>
-          <a:fontRef idx="minor">
-            <a:schemeClr val="tx1"/>
-          </a:fontRef>
-        </p:style>
-      </p:cxnSp>
       <p:sp>
         <p:nvSpPr>
           <p:cNvPr id="46" name="TextBox 45">
@@ -5012,6 +4849,616 @@
               <a:rPr lang="en-US" dirty="0"/>
               <a:t>business</a:t>
             </a:r>
+          </a:p>
+        </p:txBody>
+      </p:sp>
+      <p:sp>
+        <p:nvSpPr>
+          <p:cNvPr id="35" name="Rectangle 34">
+            <a:extLst>
+              <a:ext uri="{FF2B5EF4-FFF2-40B4-BE49-F238E27FC236}">
+                <a16:creationId xmlns:a16="http://schemas.microsoft.com/office/drawing/2014/main" id="{2BF5E20C-E939-9F47-BE53-DD76976F3951}"/>
+              </a:ext>
+            </a:extLst>
+          </p:cNvPr>
+          <p:cNvSpPr/>
+          <p:nvPr/>
+        </p:nvSpPr>
+        <p:spPr>
+          <a:xfrm>
+            <a:off x="1807932" y="2996307"/>
+            <a:ext cx="914400" cy="385825"/>
+          </a:xfrm>
+          <a:prstGeom prst="rect">
+            <a:avLst/>
+          </a:prstGeom>
+        </p:spPr>
+        <p:style>
+          <a:lnRef idx="2">
+            <a:schemeClr val="accent1">
+              <a:shade val="50000"/>
+            </a:schemeClr>
+          </a:lnRef>
+          <a:fillRef idx="1">
+            <a:schemeClr val="accent1"/>
+          </a:fillRef>
+          <a:effectRef idx="0">
+            <a:schemeClr val="accent1"/>
+          </a:effectRef>
+          <a:fontRef idx="minor">
+            <a:schemeClr val="lt1"/>
+          </a:fontRef>
+        </p:style>
+        <p:txBody>
+          <a:bodyPr rtlCol="0" anchor="ctr"/>
+          <a:lstStyle/>
+          <a:p>
+            <a:pPr algn="ctr"/>
+            <a:r>
+              <a:rPr lang="en-US" sz="1200" dirty="0"/>
+              <a:t>guest</a:t>
+            </a:r>
+          </a:p>
+        </p:txBody>
+      </p:sp>
+      <p:sp>
+        <p:nvSpPr>
+          <p:cNvPr id="37" name="Rectangle 36">
+            <a:extLst>
+              <a:ext uri="{FF2B5EF4-FFF2-40B4-BE49-F238E27FC236}">
+                <a16:creationId xmlns:a16="http://schemas.microsoft.com/office/drawing/2014/main" id="{1D02AB0A-40E9-B34E-B937-66D95063DA74}"/>
+              </a:ext>
+            </a:extLst>
+          </p:cNvPr>
+          <p:cNvSpPr/>
+          <p:nvPr/>
+        </p:nvSpPr>
+        <p:spPr>
+          <a:xfrm>
+            <a:off x="1807932" y="3546356"/>
+            <a:ext cx="914400" cy="385825"/>
+          </a:xfrm>
+          <a:prstGeom prst="rect">
+            <a:avLst/>
+          </a:prstGeom>
+        </p:spPr>
+        <p:style>
+          <a:lnRef idx="2">
+            <a:schemeClr val="accent1">
+              <a:shade val="50000"/>
+            </a:schemeClr>
+          </a:lnRef>
+          <a:fillRef idx="1">
+            <a:schemeClr val="accent1"/>
+          </a:fillRef>
+          <a:effectRef idx="0">
+            <a:schemeClr val="accent1"/>
+          </a:effectRef>
+          <a:fontRef idx="minor">
+            <a:schemeClr val="lt1"/>
+          </a:fontRef>
+        </p:style>
+        <p:txBody>
+          <a:bodyPr rtlCol="0" anchor="ctr"/>
+          <a:lstStyle/>
+          <a:p>
+            <a:pPr algn="ctr"/>
+            <a:r>
+              <a:rPr lang="en-US" sz="1200" dirty="0"/>
+              <a:t>View product</a:t>
+            </a:r>
+          </a:p>
+        </p:txBody>
+      </p:sp>
+      <p:sp>
+        <p:nvSpPr>
+          <p:cNvPr id="41" name="Rectangle 40">
+            <a:extLst>
+              <a:ext uri="{FF2B5EF4-FFF2-40B4-BE49-F238E27FC236}">
+                <a16:creationId xmlns:a16="http://schemas.microsoft.com/office/drawing/2014/main" id="{EAA9580B-F9A5-0A40-A4BC-C76A3E64EBED}"/>
+              </a:ext>
+            </a:extLst>
+          </p:cNvPr>
+          <p:cNvSpPr/>
+          <p:nvPr/>
+        </p:nvSpPr>
+        <p:spPr>
+          <a:xfrm>
+            <a:off x="1680143" y="4307782"/>
+            <a:ext cx="1220282" cy="504133"/>
+          </a:xfrm>
+          <a:prstGeom prst="rect">
+            <a:avLst/>
+          </a:prstGeom>
+        </p:spPr>
+        <p:style>
+          <a:lnRef idx="2">
+            <a:schemeClr val="accent1">
+              <a:shade val="50000"/>
+            </a:schemeClr>
+          </a:lnRef>
+          <a:fillRef idx="1">
+            <a:schemeClr val="accent1"/>
+          </a:fillRef>
+          <a:effectRef idx="0">
+            <a:schemeClr val="accent1"/>
+          </a:effectRef>
+          <a:fontRef idx="minor">
+            <a:schemeClr val="lt1"/>
+          </a:fontRef>
+        </p:style>
+        <p:txBody>
+          <a:bodyPr rtlCol="0" anchor="ctr"/>
+          <a:lstStyle/>
+          <a:p>
+            <a:pPr algn="ctr"/>
+            <a:r>
+              <a:rPr lang="en-US" sz="1200" dirty="0"/>
+              <a:t>Create </a:t>
+            </a:r>
+            <a:r>
+              <a:rPr lang="en-US" sz="1200" dirty="0" err="1"/>
+              <a:t>cartID</a:t>
+            </a:r>
+            <a:r>
+              <a:rPr lang="en-US" sz="1200" dirty="0"/>
+              <a:t> </a:t>
+            </a:r>
+          </a:p>
+          <a:p>
+            <a:pPr algn="ctr"/>
+            <a:r>
+              <a:rPr lang="en-US" sz="1200" dirty="0"/>
+              <a:t>set  cart session</a:t>
+            </a:r>
+          </a:p>
+        </p:txBody>
+      </p:sp>
+      <p:sp>
+        <p:nvSpPr>
+          <p:cNvPr id="42" name="Rectangle 41">
+            <a:extLst>
+              <a:ext uri="{FF2B5EF4-FFF2-40B4-BE49-F238E27FC236}">
+                <a16:creationId xmlns:a16="http://schemas.microsoft.com/office/drawing/2014/main" id="{22C3F46D-8AB2-5B4D-93C7-04DA25C33117}"/>
+              </a:ext>
+            </a:extLst>
+          </p:cNvPr>
+          <p:cNvSpPr/>
+          <p:nvPr/>
+        </p:nvSpPr>
+        <p:spPr>
+          <a:xfrm>
+            <a:off x="1807932" y="5187517"/>
+            <a:ext cx="914400" cy="206512"/>
+          </a:xfrm>
+          <a:prstGeom prst="rect">
+            <a:avLst/>
+          </a:prstGeom>
+        </p:spPr>
+        <p:style>
+          <a:lnRef idx="2">
+            <a:schemeClr val="accent1">
+              <a:shade val="50000"/>
+            </a:schemeClr>
+          </a:lnRef>
+          <a:fillRef idx="1">
+            <a:schemeClr val="accent1"/>
+          </a:fillRef>
+          <a:effectRef idx="0">
+            <a:schemeClr val="accent1"/>
+          </a:effectRef>
+          <a:fontRef idx="minor">
+            <a:schemeClr val="lt1"/>
+          </a:fontRef>
+        </p:style>
+        <p:txBody>
+          <a:bodyPr rtlCol="0" anchor="ctr"/>
+          <a:lstStyle/>
+          <a:p>
+            <a:pPr algn="ctr"/>
+            <a:r>
+              <a:rPr lang="en-US" sz="1200" dirty="0"/>
+              <a:t>Add to cart</a:t>
+            </a:r>
+          </a:p>
+        </p:txBody>
+      </p:sp>
+      <p:sp>
+        <p:nvSpPr>
+          <p:cNvPr id="43" name="Rectangle 42">
+            <a:extLst>
+              <a:ext uri="{FF2B5EF4-FFF2-40B4-BE49-F238E27FC236}">
+                <a16:creationId xmlns:a16="http://schemas.microsoft.com/office/drawing/2014/main" id="{DB0387E2-5644-4145-9F21-5252F86FD0BE}"/>
+              </a:ext>
+            </a:extLst>
+          </p:cNvPr>
+          <p:cNvSpPr/>
+          <p:nvPr/>
+        </p:nvSpPr>
+        <p:spPr>
+          <a:xfrm>
+            <a:off x="1825926" y="5577648"/>
+            <a:ext cx="914400" cy="210889"/>
+          </a:xfrm>
+          <a:prstGeom prst="rect">
+            <a:avLst/>
+          </a:prstGeom>
+        </p:spPr>
+        <p:style>
+          <a:lnRef idx="2">
+            <a:schemeClr val="accent1">
+              <a:shade val="50000"/>
+            </a:schemeClr>
+          </a:lnRef>
+          <a:fillRef idx="1">
+            <a:schemeClr val="accent1"/>
+          </a:fillRef>
+          <a:effectRef idx="0">
+            <a:schemeClr val="accent1"/>
+          </a:effectRef>
+          <a:fontRef idx="minor">
+            <a:schemeClr val="lt1"/>
+          </a:fontRef>
+        </p:style>
+        <p:txBody>
+          <a:bodyPr rtlCol="0" anchor="ctr"/>
+          <a:lstStyle/>
+          <a:p>
+            <a:pPr algn="ctr"/>
+            <a:r>
+              <a:rPr lang="en-US" sz="1200" dirty="0"/>
+              <a:t>Place order</a:t>
+            </a:r>
+          </a:p>
+        </p:txBody>
+      </p:sp>
+      <p:sp>
+        <p:nvSpPr>
+          <p:cNvPr id="45" name="Rectangle 44">
+            <a:extLst>
+              <a:ext uri="{FF2B5EF4-FFF2-40B4-BE49-F238E27FC236}">
+                <a16:creationId xmlns:a16="http://schemas.microsoft.com/office/drawing/2014/main" id="{8D9C895A-017A-DF4E-8198-4ADACA370CAD}"/>
+              </a:ext>
+            </a:extLst>
+          </p:cNvPr>
+          <p:cNvSpPr/>
+          <p:nvPr/>
+        </p:nvSpPr>
+        <p:spPr>
+          <a:xfrm>
+            <a:off x="1833084" y="5989284"/>
+            <a:ext cx="914400" cy="385825"/>
+          </a:xfrm>
+          <a:prstGeom prst="rect">
+            <a:avLst/>
+          </a:prstGeom>
+        </p:spPr>
+        <p:style>
+          <a:lnRef idx="2">
+            <a:schemeClr val="accent1">
+              <a:shade val="50000"/>
+            </a:schemeClr>
+          </a:lnRef>
+          <a:fillRef idx="1">
+            <a:schemeClr val="accent1"/>
+          </a:fillRef>
+          <a:effectRef idx="0">
+            <a:schemeClr val="accent1"/>
+          </a:effectRef>
+          <a:fontRef idx="minor">
+            <a:schemeClr val="lt1"/>
+          </a:fontRef>
+        </p:style>
+        <p:txBody>
+          <a:bodyPr rtlCol="0" anchor="ctr"/>
+          <a:lstStyle/>
+          <a:p>
+            <a:pPr algn="ctr"/>
+            <a:r>
+              <a:rPr lang="en-US" sz="1200" dirty="0"/>
+              <a:t>Cart clear</a:t>
+            </a:r>
+          </a:p>
+          <a:p>
+            <a:pPr algn="ctr"/>
+            <a:endParaRPr lang="en-US" sz="1200" dirty="0"/>
+          </a:p>
+        </p:txBody>
+      </p:sp>
+      <p:cxnSp>
+        <p:nvCxnSpPr>
+          <p:cNvPr id="6" name="Elbow Connector 5">
+            <a:extLst>
+              <a:ext uri="{FF2B5EF4-FFF2-40B4-BE49-F238E27FC236}">
+                <a16:creationId xmlns:a16="http://schemas.microsoft.com/office/drawing/2014/main" id="{0CBAB2BB-4412-C643-BB16-EF29E7485128}"/>
+              </a:ext>
+            </a:extLst>
+          </p:cNvPr>
+          <p:cNvCxnSpPr>
+            <a:stCxn id="17" idx="3"/>
+            <a:endCxn id="37" idx="3"/>
+          </p:cNvCxnSpPr>
+          <p:nvPr/>
+        </p:nvCxnSpPr>
+        <p:spPr>
+          <a:xfrm>
+            <a:off x="1232106" y="956606"/>
+            <a:ext cx="1490226" cy="2782663"/>
+          </a:xfrm>
+          <a:prstGeom prst="bentConnector3">
+            <a:avLst>
+              <a:gd name="adj1" fmla="val 115340"/>
+            </a:avLst>
+          </a:prstGeom>
+          <a:ln>
+            <a:tailEnd type="triangle"/>
+          </a:ln>
+        </p:spPr>
+        <p:style>
+          <a:lnRef idx="1">
+            <a:schemeClr val="accent1"/>
+          </a:lnRef>
+          <a:fillRef idx="0">
+            <a:schemeClr val="accent1"/>
+          </a:fillRef>
+          <a:effectRef idx="0">
+            <a:schemeClr val="accent1"/>
+          </a:effectRef>
+          <a:fontRef idx="minor">
+            <a:schemeClr val="tx1"/>
+          </a:fontRef>
+        </p:style>
+      </p:cxnSp>
+      <p:cxnSp>
+        <p:nvCxnSpPr>
+          <p:cNvPr id="10" name="Straight Arrow Connector 9">
+            <a:extLst>
+              <a:ext uri="{FF2B5EF4-FFF2-40B4-BE49-F238E27FC236}">
+                <a16:creationId xmlns:a16="http://schemas.microsoft.com/office/drawing/2014/main" id="{AA19841E-B824-F441-BEBD-126CDF82DDEE}"/>
+              </a:ext>
+            </a:extLst>
+          </p:cNvPr>
+          <p:cNvCxnSpPr>
+            <a:stCxn id="17" idx="2"/>
+          </p:cNvCxnSpPr>
+          <p:nvPr/>
+        </p:nvCxnSpPr>
+        <p:spPr>
+          <a:xfrm>
+            <a:off x="774906" y="1124694"/>
+            <a:ext cx="0" cy="859749"/>
+          </a:xfrm>
+          <a:prstGeom prst="straightConnector1">
+            <a:avLst/>
+          </a:prstGeom>
+          <a:ln>
+            <a:tailEnd type="triangle"/>
+          </a:ln>
+        </p:spPr>
+        <p:style>
+          <a:lnRef idx="1">
+            <a:schemeClr val="accent1"/>
+          </a:lnRef>
+          <a:fillRef idx="0">
+            <a:schemeClr val="accent1"/>
+          </a:fillRef>
+          <a:effectRef idx="0">
+            <a:schemeClr val="accent1"/>
+          </a:effectRef>
+          <a:fontRef idx="minor">
+            <a:schemeClr val="tx1"/>
+          </a:fontRef>
+        </p:style>
+      </p:cxnSp>
+      <p:cxnSp>
+        <p:nvCxnSpPr>
+          <p:cNvPr id="12" name="Straight Arrow Connector 11">
+            <a:extLst>
+              <a:ext uri="{FF2B5EF4-FFF2-40B4-BE49-F238E27FC236}">
+                <a16:creationId xmlns:a16="http://schemas.microsoft.com/office/drawing/2014/main" id="{4D2A4A2C-0F8C-0A49-A561-CC3B9FF05162}"/>
+              </a:ext>
+            </a:extLst>
+          </p:cNvPr>
+          <p:cNvCxnSpPr>
+            <a:cxnSpLocks/>
+            <a:stCxn id="43" idx="2"/>
+            <a:endCxn id="45" idx="0"/>
+          </p:cNvCxnSpPr>
+          <p:nvPr/>
+        </p:nvCxnSpPr>
+        <p:spPr>
+          <a:xfrm>
+            <a:off x="2283126" y="5788537"/>
+            <a:ext cx="7158" cy="200747"/>
+          </a:xfrm>
+          <a:prstGeom prst="straightConnector1">
+            <a:avLst/>
+          </a:prstGeom>
+          <a:ln>
+            <a:tailEnd type="triangle"/>
+          </a:ln>
+        </p:spPr>
+        <p:style>
+          <a:lnRef idx="1">
+            <a:schemeClr val="accent1"/>
+          </a:lnRef>
+          <a:fillRef idx="0">
+            <a:schemeClr val="accent1"/>
+          </a:fillRef>
+          <a:effectRef idx="0">
+            <a:schemeClr val="accent1"/>
+          </a:effectRef>
+          <a:fontRef idx="minor">
+            <a:schemeClr val="tx1"/>
+          </a:fontRef>
+        </p:style>
+      </p:cxnSp>
+      <p:cxnSp>
+        <p:nvCxnSpPr>
+          <p:cNvPr id="14" name="Elbow Connector 13">
+            <a:extLst>
+              <a:ext uri="{FF2B5EF4-FFF2-40B4-BE49-F238E27FC236}">
+                <a16:creationId xmlns:a16="http://schemas.microsoft.com/office/drawing/2014/main" id="{DC2431BA-BE7C-B648-BD54-F35055190B00}"/>
+              </a:ext>
+            </a:extLst>
+          </p:cNvPr>
+          <p:cNvCxnSpPr>
+            <a:cxnSpLocks/>
+            <a:stCxn id="43" idx="3"/>
+            <a:endCxn id="28" idx="0"/>
+          </p:cNvCxnSpPr>
+          <p:nvPr/>
+        </p:nvCxnSpPr>
+        <p:spPr>
+          <a:xfrm>
+            <a:off x="2740326" y="5683093"/>
+            <a:ext cx="1449502" cy="323136"/>
+          </a:xfrm>
+          <a:prstGeom prst="bentConnector2">
+            <a:avLst/>
+          </a:prstGeom>
+          <a:ln>
+            <a:tailEnd type="triangle"/>
+          </a:ln>
+        </p:spPr>
+        <p:style>
+          <a:lnRef idx="1">
+            <a:schemeClr val="accent1"/>
+          </a:lnRef>
+          <a:fillRef idx="0">
+            <a:schemeClr val="accent1"/>
+          </a:fillRef>
+          <a:effectRef idx="0">
+            <a:schemeClr val="accent1"/>
+          </a:effectRef>
+          <a:fontRef idx="minor">
+            <a:schemeClr val="tx1"/>
+          </a:fontRef>
+        </p:style>
+      </p:cxnSp>
+      <p:cxnSp>
+        <p:nvCxnSpPr>
+          <p:cNvPr id="16" name="Elbow Connector 15">
+            <a:extLst>
+              <a:ext uri="{FF2B5EF4-FFF2-40B4-BE49-F238E27FC236}">
+                <a16:creationId xmlns:a16="http://schemas.microsoft.com/office/drawing/2014/main" id="{C353507E-D2DE-7E4B-8468-FFD6E93FAB1A}"/>
+              </a:ext>
+            </a:extLst>
+          </p:cNvPr>
+          <p:cNvCxnSpPr>
+            <a:cxnSpLocks/>
+            <a:stCxn id="45" idx="2"/>
+            <a:endCxn id="37" idx="1"/>
+          </p:cNvCxnSpPr>
+          <p:nvPr/>
+        </p:nvCxnSpPr>
+        <p:spPr>
+          <a:xfrm rot="5400000" flipH="1">
+            <a:off x="731188" y="4816013"/>
+            <a:ext cx="2635840" cy="482352"/>
+          </a:xfrm>
+          <a:prstGeom prst="bentConnector4">
+            <a:avLst>
+              <a:gd name="adj1" fmla="val -8673"/>
+              <a:gd name="adj2" fmla="val 264362"/>
+            </a:avLst>
+          </a:prstGeom>
+          <a:ln>
+            <a:tailEnd type="triangle"/>
+          </a:ln>
+        </p:spPr>
+        <p:style>
+          <a:lnRef idx="1">
+            <a:schemeClr val="accent1"/>
+          </a:lnRef>
+          <a:fillRef idx="0">
+            <a:schemeClr val="accent1"/>
+          </a:fillRef>
+          <a:effectRef idx="0">
+            <a:schemeClr val="accent1"/>
+          </a:effectRef>
+          <a:fontRef idx="minor">
+            <a:schemeClr val="tx1"/>
+          </a:fontRef>
+        </p:style>
+      </p:cxnSp>
+      <p:sp>
+        <p:nvSpPr>
+          <p:cNvPr id="61" name="TextBox 60">
+            <a:extLst>
+              <a:ext uri="{FF2B5EF4-FFF2-40B4-BE49-F238E27FC236}">
+                <a16:creationId xmlns:a16="http://schemas.microsoft.com/office/drawing/2014/main" id="{BACCB65D-003B-F641-85D8-962C37489707}"/>
+              </a:ext>
+            </a:extLst>
+          </p:cNvPr>
+          <p:cNvSpPr txBox="1"/>
+          <p:nvPr/>
+        </p:nvSpPr>
+        <p:spPr>
+          <a:xfrm>
+            <a:off x="277579" y="4765549"/>
+            <a:ext cx="1231471" cy="461665"/>
+          </a:xfrm>
+          <a:prstGeom prst="rect">
+            <a:avLst/>
+          </a:prstGeom>
+          <a:noFill/>
+        </p:spPr>
+        <p:txBody>
+          <a:bodyPr wrap="square" rtlCol="0">
+            <a:spAutoFit/>
+          </a:bodyPr>
+          <a:lstStyle/>
+          <a:p>
+            <a:r>
+              <a:rPr lang="en-US" sz="1200" dirty="0"/>
+              <a:t>Shopping again with new </a:t>
+            </a:r>
+            <a:r>
+              <a:rPr lang="en-US" sz="1200" dirty="0" err="1"/>
+              <a:t>cartID</a:t>
+            </a:r>
+            <a:endParaRPr lang="en-US" sz="1200" dirty="0"/>
+          </a:p>
+        </p:txBody>
+      </p:sp>
+      <p:sp>
+        <p:nvSpPr>
+          <p:cNvPr id="65" name="TextBox 64">
+            <a:extLst>
+              <a:ext uri="{FF2B5EF4-FFF2-40B4-BE49-F238E27FC236}">
+                <a16:creationId xmlns:a16="http://schemas.microsoft.com/office/drawing/2014/main" id="{88BE6542-374F-FD49-95CF-D5F7502E61A0}"/>
+              </a:ext>
+            </a:extLst>
+          </p:cNvPr>
+          <p:cNvSpPr txBox="1"/>
+          <p:nvPr/>
+        </p:nvSpPr>
+        <p:spPr>
+          <a:xfrm>
+            <a:off x="2972789" y="4304982"/>
+            <a:ext cx="1615777" cy="646331"/>
+          </a:xfrm>
+          <a:prstGeom prst="rect">
+            <a:avLst/>
+          </a:prstGeom>
+          <a:noFill/>
+        </p:spPr>
+        <p:txBody>
+          <a:bodyPr wrap="square" rtlCol="0">
+            <a:spAutoFit/>
+          </a:bodyPr>
+          <a:lstStyle/>
+          <a:p>
+            <a:r>
+              <a:rPr lang="en-US" sz="1200" dirty="0"/>
+              <a:t>If no cart(empty), create new one with new </a:t>
+            </a:r>
+            <a:r>
+              <a:rPr lang="en-US" sz="1200" dirty="0" err="1"/>
+              <a:t>cartID</a:t>
+            </a:r>
+            <a:endParaRPr lang="en-US" sz="1200" dirty="0"/>
           </a:p>
         </p:txBody>
       </p:sp>

</xml_diff>

<commit_message>
pagination with block & list view
</commit_message>
<xml_diff>
--- a/build/web/doc/business flow.pptx
+++ b/build/web/doc/business flow.pptx
@@ -6,6 +6,7 @@
   </p:sldMasterIdLst>
   <p:sldIdLst>
     <p:sldId id="256" r:id="rId2"/>
+    <p:sldId id="258" r:id="rId3"/>
   </p:sldIdLst>
   <p:sldSz cx="12192000" cy="6858000"/>
   <p:notesSz cx="6858000" cy="9144000"/>
@@ -270,7 +271,7 @@
           <a:p>
             <a:fld id="{C5F3B386-61D0-A542-9BBD-24895FFB08D6}" type="datetimeFigureOut">
               <a:rPr lang="en-US" smtClean="0"/>
-              <a:t>5/29/20</a:t>
+              <a:t>6/2/20</a:t>
             </a:fld>
             <a:endParaRPr lang="en-US"/>
           </a:p>
@@ -334,412 +335,6 @@
     <p:extLst>
       <p:ext uri="{BB962C8B-B14F-4D97-AF65-F5344CB8AC3E}">
         <p14:creationId xmlns:p14="http://schemas.microsoft.com/office/powerpoint/2010/main" val="782939916"/>
-      </p:ext>
-    </p:extLst>
-  </p:cSld>
-  <p:clrMapOvr>
-    <a:masterClrMapping/>
-  </p:clrMapOvr>
-</p:sldLayout>
-</file>
-
-<file path=ppt/slideLayouts/slideLayout10.xml><?xml version="1.0" encoding="utf-8"?>
-<p:sldLayout xmlns:a="http://schemas.openxmlformats.org/drawingml/2006/main" xmlns:r="http://schemas.openxmlformats.org/officeDocument/2006/relationships" xmlns:p="http://schemas.openxmlformats.org/presentationml/2006/main" type="vertTx" preserve="1">
-  <p:cSld name="Title and Vertical Text">
-    <p:spTree>
-      <p:nvGrpSpPr>
-        <p:cNvPr id="1" name=""/>
-        <p:cNvGrpSpPr/>
-        <p:nvPr/>
-      </p:nvGrpSpPr>
-      <p:grpSpPr>
-        <a:xfrm>
-          <a:off x="0" y="0"/>
-          <a:ext cx="0" cy="0"/>
-          <a:chOff x="0" y="0"/>
-          <a:chExt cx="0" cy="0"/>
-        </a:xfrm>
-      </p:grpSpPr>
-      <p:sp>
-        <p:nvSpPr>
-          <p:cNvPr id="2" name="Title 1">
-            <a:extLst>
-              <a:ext uri="{FF2B5EF4-FFF2-40B4-BE49-F238E27FC236}">
-                <a16:creationId xmlns:a16="http://schemas.microsoft.com/office/drawing/2014/main" id="{65CB6C3E-4AB5-374B-81ED-094EE7FC695E}"/>
-              </a:ext>
-            </a:extLst>
-          </p:cNvPr>
-          <p:cNvSpPr>
-            <a:spLocks noGrp="1"/>
-          </p:cNvSpPr>
-          <p:nvPr>
-            <p:ph type="title"/>
-          </p:nvPr>
-        </p:nvSpPr>
-        <p:spPr/>
-        <p:txBody>
-          <a:bodyPr/>
-          <a:lstStyle/>
-          <a:p>
-            <a:r>
-              <a:rPr lang="en-US"/>
-              <a:t>Click to edit Master title style</a:t>
-            </a:r>
-          </a:p>
-        </p:txBody>
-      </p:sp>
-      <p:sp>
-        <p:nvSpPr>
-          <p:cNvPr id="3" name="Vertical Text Placeholder 2">
-            <a:extLst>
-              <a:ext uri="{FF2B5EF4-FFF2-40B4-BE49-F238E27FC236}">
-                <a16:creationId xmlns:a16="http://schemas.microsoft.com/office/drawing/2014/main" id="{CEF1E061-FD37-EB4B-940E-516AF01EDCFC}"/>
-              </a:ext>
-            </a:extLst>
-          </p:cNvPr>
-          <p:cNvSpPr>
-            <a:spLocks noGrp="1"/>
-          </p:cNvSpPr>
-          <p:nvPr>
-            <p:ph type="body" orient="vert" idx="1"/>
-          </p:nvPr>
-        </p:nvSpPr>
-        <p:spPr/>
-        <p:txBody>
-          <a:bodyPr vert="eaVert"/>
-          <a:lstStyle/>
-          <a:p>
-            <a:pPr lvl="0"/>
-            <a:r>
-              <a:rPr lang="en-US"/>
-              <a:t>Edit Master text styles</a:t>
-            </a:r>
-          </a:p>
-          <a:p>
-            <a:pPr lvl="1"/>
-            <a:r>
-              <a:rPr lang="en-US"/>
-              <a:t>Second level</a:t>
-            </a:r>
-          </a:p>
-          <a:p>
-            <a:pPr lvl="2"/>
-            <a:r>
-              <a:rPr lang="en-US"/>
-              <a:t>Third level</a:t>
-            </a:r>
-          </a:p>
-          <a:p>
-            <a:pPr lvl="3"/>
-            <a:r>
-              <a:rPr lang="en-US"/>
-              <a:t>Fourth level</a:t>
-            </a:r>
-          </a:p>
-          <a:p>
-            <a:pPr lvl="4"/>
-            <a:r>
-              <a:rPr lang="en-US"/>
-              <a:t>Fifth level</a:t>
-            </a:r>
-          </a:p>
-        </p:txBody>
-      </p:sp>
-      <p:sp>
-        <p:nvSpPr>
-          <p:cNvPr id="4" name="Date Placeholder 3">
-            <a:extLst>
-              <a:ext uri="{FF2B5EF4-FFF2-40B4-BE49-F238E27FC236}">
-                <a16:creationId xmlns:a16="http://schemas.microsoft.com/office/drawing/2014/main" id="{7E99058D-F6FF-EE4E-9CCB-4F4A2E3EBF1F}"/>
-              </a:ext>
-            </a:extLst>
-          </p:cNvPr>
-          <p:cNvSpPr>
-            <a:spLocks noGrp="1"/>
-          </p:cNvSpPr>
-          <p:nvPr>
-            <p:ph type="dt" sz="half" idx="10"/>
-          </p:nvPr>
-        </p:nvSpPr>
-        <p:spPr/>
-        <p:txBody>
-          <a:bodyPr/>
-          <a:lstStyle/>
-          <a:p>
-            <a:fld id="{C5F3B386-61D0-A542-9BBD-24895FFB08D6}" type="datetimeFigureOut">
-              <a:rPr lang="en-US" smtClean="0"/>
-              <a:t>5/29/20</a:t>
-            </a:fld>
-            <a:endParaRPr lang="en-US"/>
-          </a:p>
-        </p:txBody>
-      </p:sp>
-      <p:sp>
-        <p:nvSpPr>
-          <p:cNvPr id="5" name="Footer Placeholder 4">
-            <a:extLst>
-              <a:ext uri="{FF2B5EF4-FFF2-40B4-BE49-F238E27FC236}">
-                <a16:creationId xmlns:a16="http://schemas.microsoft.com/office/drawing/2014/main" id="{B50DF64D-27A1-AF44-9C35-1EFD25378D86}"/>
-              </a:ext>
-            </a:extLst>
-          </p:cNvPr>
-          <p:cNvSpPr>
-            <a:spLocks noGrp="1"/>
-          </p:cNvSpPr>
-          <p:nvPr>
-            <p:ph type="ftr" sz="quarter" idx="11"/>
-          </p:nvPr>
-        </p:nvSpPr>
-        <p:spPr/>
-        <p:txBody>
-          <a:bodyPr/>
-          <a:lstStyle/>
-          <a:p>
-            <a:endParaRPr lang="en-US"/>
-          </a:p>
-        </p:txBody>
-      </p:sp>
-      <p:sp>
-        <p:nvSpPr>
-          <p:cNvPr id="6" name="Slide Number Placeholder 5">
-            <a:extLst>
-              <a:ext uri="{FF2B5EF4-FFF2-40B4-BE49-F238E27FC236}">
-                <a16:creationId xmlns:a16="http://schemas.microsoft.com/office/drawing/2014/main" id="{7EFB3AE4-68B6-8C4D-B1AA-E0194CAFF504}"/>
-              </a:ext>
-            </a:extLst>
-          </p:cNvPr>
-          <p:cNvSpPr>
-            <a:spLocks noGrp="1"/>
-          </p:cNvSpPr>
-          <p:nvPr>
-            <p:ph type="sldNum" sz="quarter" idx="12"/>
-          </p:nvPr>
-        </p:nvSpPr>
-        <p:spPr/>
-        <p:txBody>
-          <a:bodyPr/>
-          <a:lstStyle/>
-          <a:p>
-            <a:fld id="{3F964A69-11D8-8245-B5C8-3C081DDCBFB6}" type="slidenum">
-              <a:rPr lang="en-US" smtClean="0"/>
-              <a:t>‹#›</a:t>
-            </a:fld>
-            <a:endParaRPr lang="en-US"/>
-          </a:p>
-        </p:txBody>
-      </p:sp>
-    </p:spTree>
-    <p:extLst>
-      <p:ext uri="{BB962C8B-B14F-4D97-AF65-F5344CB8AC3E}">
-        <p14:creationId xmlns:p14="http://schemas.microsoft.com/office/powerpoint/2010/main" val="440869391"/>
-      </p:ext>
-    </p:extLst>
-  </p:cSld>
-  <p:clrMapOvr>
-    <a:masterClrMapping/>
-  </p:clrMapOvr>
-</p:sldLayout>
-</file>
-
-<file path=ppt/slideLayouts/slideLayout11.xml><?xml version="1.0" encoding="utf-8"?>
-<p:sldLayout xmlns:a="http://schemas.openxmlformats.org/drawingml/2006/main" xmlns:r="http://schemas.openxmlformats.org/officeDocument/2006/relationships" xmlns:p="http://schemas.openxmlformats.org/presentationml/2006/main" type="vertTitleAndTx" preserve="1">
-  <p:cSld name="Vertical Title and Text">
-    <p:spTree>
-      <p:nvGrpSpPr>
-        <p:cNvPr id="1" name=""/>
-        <p:cNvGrpSpPr/>
-        <p:nvPr/>
-      </p:nvGrpSpPr>
-      <p:grpSpPr>
-        <a:xfrm>
-          <a:off x="0" y="0"/>
-          <a:ext cx="0" cy="0"/>
-          <a:chOff x="0" y="0"/>
-          <a:chExt cx="0" cy="0"/>
-        </a:xfrm>
-      </p:grpSpPr>
-      <p:sp>
-        <p:nvSpPr>
-          <p:cNvPr id="2" name="Vertical Title 1">
-            <a:extLst>
-              <a:ext uri="{FF2B5EF4-FFF2-40B4-BE49-F238E27FC236}">
-                <a16:creationId xmlns:a16="http://schemas.microsoft.com/office/drawing/2014/main" id="{E78818D5-895F-3047-855F-72F1AFD5C6E8}"/>
-              </a:ext>
-            </a:extLst>
-          </p:cNvPr>
-          <p:cNvSpPr>
-            <a:spLocks noGrp="1"/>
-          </p:cNvSpPr>
-          <p:nvPr>
-            <p:ph type="title" orient="vert"/>
-          </p:nvPr>
-        </p:nvSpPr>
-        <p:spPr>
-          <a:xfrm>
-            <a:off x="8724900" y="365125"/>
-            <a:ext cx="2628900" cy="5811838"/>
-          </a:xfrm>
-        </p:spPr>
-        <p:txBody>
-          <a:bodyPr vert="eaVert"/>
-          <a:lstStyle/>
-          <a:p>
-            <a:r>
-              <a:rPr lang="en-US"/>
-              <a:t>Click to edit Master title style</a:t>
-            </a:r>
-          </a:p>
-        </p:txBody>
-      </p:sp>
-      <p:sp>
-        <p:nvSpPr>
-          <p:cNvPr id="3" name="Vertical Text Placeholder 2">
-            <a:extLst>
-              <a:ext uri="{FF2B5EF4-FFF2-40B4-BE49-F238E27FC236}">
-                <a16:creationId xmlns:a16="http://schemas.microsoft.com/office/drawing/2014/main" id="{D7DFC65F-D8E6-D24C-8428-EA1744F846A3}"/>
-              </a:ext>
-            </a:extLst>
-          </p:cNvPr>
-          <p:cNvSpPr>
-            <a:spLocks noGrp="1"/>
-          </p:cNvSpPr>
-          <p:nvPr>
-            <p:ph type="body" orient="vert" idx="1"/>
-          </p:nvPr>
-        </p:nvSpPr>
-        <p:spPr>
-          <a:xfrm>
-            <a:off x="838200" y="365125"/>
-            <a:ext cx="7734300" cy="5811838"/>
-          </a:xfrm>
-        </p:spPr>
-        <p:txBody>
-          <a:bodyPr vert="eaVert"/>
-          <a:lstStyle/>
-          <a:p>
-            <a:pPr lvl="0"/>
-            <a:r>
-              <a:rPr lang="en-US"/>
-              <a:t>Edit Master text styles</a:t>
-            </a:r>
-          </a:p>
-          <a:p>
-            <a:pPr lvl="1"/>
-            <a:r>
-              <a:rPr lang="en-US"/>
-              <a:t>Second level</a:t>
-            </a:r>
-          </a:p>
-          <a:p>
-            <a:pPr lvl="2"/>
-            <a:r>
-              <a:rPr lang="en-US"/>
-              <a:t>Third level</a:t>
-            </a:r>
-          </a:p>
-          <a:p>
-            <a:pPr lvl="3"/>
-            <a:r>
-              <a:rPr lang="en-US"/>
-              <a:t>Fourth level</a:t>
-            </a:r>
-          </a:p>
-          <a:p>
-            <a:pPr lvl="4"/>
-            <a:r>
-              <a:rPr lang="en-US"/>
-              <a:t>Fifth level</a:t>
-            </a:r>
-          </a:p>
-        </p:txBody>
-      </p:sp>
-      <p:sp>
-        <p:nvSpPr>
-          <p:cNvPr id="4" name="Date Placeholder 3">
-            <a:extLst>
-              <a:ext uri="{FF2B5EF4-FFF2-40B4-BE49-F238E27FC236}">
-                <a16:creationId xmlns:a16="http://schemas.microsoft.com/office/drawing/2014/main" id="{0E590096-7132-7A4F-9D59-0DAD01920602}"/>
-              </a:ext>
-            </a:extLst>
-          </p:cNvPr>
-          <p:cNvSpPr>
-            <a:spLocks noGrp="1"/>
-          </p:cNvSpPr>
-          <p:nvPr>
-            <p:ph type="dt" sz="half" idx="10"/>
-          </p:nvPr>
-        </p:nvSpPr>
-        <p:spPr/>
-        <p:txBody>
-          <a:bodyPr/>
-          <a:lstStyle/>
-          <a:p>
-            <a:fld id="{C5F3B386-61D0-A542-9BBD-24895FFB08D6}" type="datetimeFigureOut">
-              <a:rPr lang="en-US" smtClean="0"/>
-              <a:t>5/29/20</a:t>
-            </a:fld>
-            <a:endParaRPr lang="en-US"/>
-          </a:p>
-        </p:txBody>
-      </p:sp>
-      <p:sp>
-        <p:nvSpPr>
-          <p:cNvPr id="5" name="Footer Placeholder 4">
-            <a:extLst>
-              <a:ext uri="{FF2B5EF4-FFF2-40B4-BE49-F238E27FC236}">
-                <a16:creationId xmlns:a16="http://schemas.microsoft.com/office/drawing/2014/main" id="{5C5FCC50-3CE5-8946-B835-6FAE2F6B8A8C}"/>
-              </a:ext>
-            </a:extLst>
-          </p:cNvPr>
-          <p:cNvSpPr>
-            <a:spLocks noGrp="1"/>
-          </p:cNvSpPr>
-          <p:nvPr>
-            <p:ph type="ftr" sz="quarter" idx="11"/>
-          </p:nvPr>
-        </p:nvSpPr>
-        <p:spPr/>
-        <p:txBody>
-          <a:bodyPr/>
-          <a:lstStyle/>
-          <a:p>
-            <a:endParaRPr lang="en-US"/>
-          </a:p>
-        </p:txBody>
-      </p:sp>
-      <p:sp>
-        <p:nvSpPr>
-          <p:cNvPr id="6" name="Slide Number Placeholder 5">
-            <a:extLst>
-              <a:ext uri="{FF2B5EF4-FFF2-40B4-BE49-F238E27FC236}">
-                <a16:creationId xmlns:a16="http://schemas.microsoft.com/office/drawing/2014/main" id="{003F45D4-6751-5842-ACD6-0E6ED14077DB}"/>
-              </a:ext>
-            </a:extLst>
-          </p:cNvPr>
-          <p:cNvSpPr>
-            <a:spLocks noGrp="1"/>
-          </p:cNvSpPr>
-          <p:nvPr>
-            <p:ph type="sldNum" sz="quarter" idx="12"/>
-          </p:nvPr>
-        </p:nvSpPr>
-        <p:spPr/>
-        <p:txBody>
-          <a:bodyPr/>
-          <a:lstStyle/>
-          <a:p>
-            <a:fld id="{3F964A69-11D8-8245-B5C8-3C081DDCBFB6}" type="slidenum">
-              <a:rPr lang="en-US" smtClean="0"/>
-              <a:t>‹#›</a:t>
-            </a:fld>
-            <a:endParaRPr lang="en-US"/>
-          </a:p>
-        </p:txBody>
-      </p:sp>
-    </p:spTree>
-    <p:extLst>
-      <p:ext uri="{BB962C8B-B14F-4D97-AF65-F5344CB8AC3E}">
-        <p14:creationId xmlns:p14="http://schemas.microsoft.com/office/powerpoint/2010/main" val="4225655140"/>
       </p:ext>
     </p:extLst>
   </p:cSld>
@@ -874,7 +469,7 @@
           <a:p>
             <a:fld id="{C5F3B386-61D0-A542-9BBD-24895FFB08D6}" type="datetimeFigureOut">
               <a:rPr lang="en-US" smtClean="0"/>
-              <a:t>5/29/20</a:t>
+              <a:t>6/2/20</a:t>
             </a:fld>
             <a:endParaRPr lang="en-US"/>
           </a:p>
@@ -947,1818 +542,16 @@
 </p:sldLayout>
 </file>
 
-<file path=ppt/slideLayouts/slideLayout3.xml><?xml version="1.0" encoding="utf-8"?>
-<p:sldLayout xmlns:a="http://schemas.openxmlformats.org/drawingml/2006/main" xmlns:r="http://schemas.openxmlformats.org/officeDocument/2006/relationships" xmlns:p="http://schemas.openxmlformats.org/presentationml/2006/main" type="secHead" preserve="1">
-  <p:cSld name="Section Header">
-    <p:spTree>
-      <p:nvGrpSpPr>
-        <p:cNvPr id="1" name=""/>
-        <p:cNvGrpSpPr/>
-        <p:nvPr/>
-      </p:nvGrpSpPr>
-      <p:grpSpPr>
-        <a:xfrm>
-          <a:off x="0" y="0"/>
-          <a:ext cx="0" cy="0"/>
-          <a:chOff x="0" y="0"/>
-          <a:chExt cx="0" cy="0"/>
-        </a:xfrm>
-      </p:grpSpPr>
-      <p:sp>
-        <p:nvSpPr>
-          <p:cNvPr id="2" name="Title 1">
-            <a:extLst>
-              <a:ext uri="{FF2B5EF4-FFF2-40B4-BE49-F238E27FC236}">
-                <a16:creationId xmlns:a16="http://schemas.microsoft.com/office/drawing/2014/main" id="{CCD8A134-D722-874D-B7DF-E70726F695DD}"/>
-              </a:ext>
-            </a:extLst>
-          </p:cNvPr>
-          <p:cNvSpPr>
-            <a:spLocks noGrp="1"/>
-          </p:cNvSpPr>
-          <p:nvPr>
-            <p:ph type="title"/>
-          </p:nvPr>
-        </p:nvSpPr>
-        <p:spPr>
-          <a:xfrm>
-            <a:off x="831850" y="1709738"/>
-            <a:ext cx="10515600" cy="2852737"/>
-          </a:xfrm>
-        </p:spPr>
-        <p:txBody>
-          <a:bodyPr anchor="b"/>
-          <a:lstStyle>
-            <a:lvl1pPr>
-              <a:defRPr sz="6000"/>
-            </a:lvl1pPr>
-          </a:lstStyle>
-          <a:p>
-            <a:r>
-              <a:rPr lang="en-US"/>
-              <a:t>Click to edit Master title style</a:t>
-            </a:r>
-          </a:p>
-        </p:txBody>
-      </p:sp>
-      <p:sp>
-        <p:nvSpPr>
-          <p:cNvPr id="3" name="Text Placeholder 2">
-            <a:extLst>
-              <a:ext uri="{FF2B5EF4-FFF2-40B4-BE49-F238E27FC236}">
-                <a16:creationId xmlns:a16="http://schemas.microsoft.com/office/drawing/2014/main" id="{5A46E8C0-C059-DD4C-89D9-55E675DCABD7}"/>
-              </a:ext>
-            </a:extLst>
-          </p:cNvPr>
-          <p:cNvSpPr>
-            <a:spLocks noGrp="1"/>
-          </p:cNvSpPr>
-          <p:nvPr>
-            <p:ph type="body" idx="1"/>
-          </p:nvPr>
-        </p:nvSpPr>
-        <p:spPr>
-          <a:xfrm>
-            <a:off x="831850" y="4589463"/>
-            <a:ext cx="10515600" cy="1500187"/>
-          </a:xfrm>
-        </p:spPr>
-        <p:txBody>
-          <a:bodyPr/>
-          <a:lstStyle>
-            <a:lvl1pPr marL="0" indent="0">
-              <a:buNone/>
-              <a:defRPr sz="2400">
-                <a:solidFill>
-                  <a:schemeClr val="tx1">
-                    <a:tint val="75000"/>
-                  </a:schemeClr>
-                </a:solidFill>
-              </a:defRPr>
-            </a:lvl1pPr>
-            <a:lvl2pPr marL="457200" indent="0">
-              <a:buNone/>
-              <a:defRPr sz="2000">
-                <a:solidFill>
-                  <a:schemeClr val="tx1">
-                    <a:tint val="75000"/>
-                  </a:schemeClr>
-                </a:solidFill>
-              </a:defRPr>
-            </a:lvl2pPr>
-            <a:lvl3pPr marL="914400" indent="0">
-              <a:buNone/>
-              <a:defRPr sz="1800">
-                <a:solidFill>
-                  <a:schemeClr val="tx1">
-                    <a:tint val="75000"/>
-                  </a:schemeClr>
-                </a:solidFill>
-              </a:defRPr>
-            </a:lvl3pPr>
-            <a:lvl4pPr marL="1371600" indent="0">
-              <a:buNone/>
-              <a:defRPr sz="1600">
-                <a:solidFill>
-                  <a:schemeClr val="tx1">
-                    <a:tint val="75000"/>
-                  </a:schemeClr>
-                </a:solidFill>
-              </a:defRPr>
-            </a:lvl4pPr>
-            <a:lvl5pPr marL="1828800" indent="0">
-              <a:buNone/>
-              <a:defRPr sz="1600">
-                <a:solidFill>
-                  <a:schemeClr val="tx1">
-                    <a:tint val="75000"/>
-                  </a:schemeClr>
-                </a:solidFill>
-              </a:defRPr>
-            </a:lvl5pPr>
-            <a:lvl6pPr marL="2286000" indent="0">
-              <a:buNone/>
-              <a:defRPr sz="1600">
-                <a:solidFill>
-                  <a:schemeClr val="tx1">
-                    <a:tint val="75000"/>
-                  </a:schemeClr>
-                </a:solidFill>
-              </a:defRPr>
-            </a:lvl6pPr>
-            <a:lvl7pPr marL="2743200" indent="0">
-              <a:buNone/>
-              <a:defRPr sz="1600">
-                <a:solidFill>
-                  <a:schemeClr val="tx1">
-                    <a:tint val="75000"/>
-                  </a:schemeClr>
-                </a:solidFill>
-              </a:defRPr>
-            </a:lvl7pPr>
-            <a:lvl8pPr marL="3200400" indent="0">
-              <a:buNone/>
-              <a:defRPr sz="1600">
-                <a:solidFill>
-                  <a:schemeClr val="tx1">
-                    <a:tint val="75000"/>
-                  </a:schemeClr>
-                </a:solidFill>
-              </a:defRPr>
-            </a:lvl8pPr>
-            <a:lvl9pPr marL="3657600" indent="0">
-              <a:buNone/>
-              <a:defRPr sz="1600">
-                <a:solidFill>
-                  <a:schemeClr val="tx1">
-                    <a:tint val="75000"/>
-                  </a:schemeClr>
-                </a:solidFill>
-              </a:defRPr>
-            </a:lvl9pPr>
-          </a:lstStyle>
-          <a:p>
-            <a:pPr lvl="0"/>
-            <a:r>
-              <a:rPr lang="en-US"/>
-              <a:t>Edit Master text styles</a:t>
-            </a:r>
-          </a:p>
-        </p:txBody>
-      </p:sp>
-      <p:sp>
-        <p:nvSpPr>
-          <p:cNvPr id="4" name="Date Placeholder 3">
-            <a:extLst>
-              <a:ext uri="{FF2B5EF4-FFF2-40B4-BE49-F238E27FC236}">
-                <a16:creationId xmlns:a16="http://schemas.microsoft.com/office/drawing/2014/main" id="{AB7BFF2F-F25C-BE49-ABC6-A7B1EEAE502D}"/>
-              </a:ext>
-            </a:extLst>
-          </p:cNvPr>
-          <p:cNvSpPr>
-            <a:spLocks noGrp="1"/>
-          </p:cNvSpPr>
-          <p:nvPr>
-            <p:ph type="dt" sz="half" idx="10"/>
-          </p:nvPr>
-        </p:nvSpPr>
-        <p:spPr/>
-        <p:txBody>
-          <a:bodyPr/>
-          <a:lstStyle/>
-          <a:p>
-            <a:fld id="{C5F3B386-61D0-A542-9BBD-24895FFB08D6}" type="datetimeFigureOut">
-              <a:rPr lang="en-US" smtClean="0"/>
-              <a:t>5/29/20</a:t>
-            </a:fld>
-            <a:endParaRPr lang="en-US"/>
-          </a:p>
-        </p:txBody>
-      </p:sp>
-      <p:sp>
-        <p:nvSpPr>
-          <p:cNvPr id="5" name="Footer Placeholder 4">
-            <a:extLst>
-              <a:ext uri="{FF2B5EF4-FFF2-40B4-BE49-F238E27FC236}">
-                <a16:creationId xmlns:a16="http://schemas.microsoft.com/office/drawing/2014/main" id="{667043E4-2C86-9949-A22B-D32AEDB8E700}"/>
-              </a:ext>
-            </a:extLst>
-          </p:cNvPr>
-          <p:cNvSpPr>
-            <a:spLocks noGrp="1"/>
-          </p:cNvSpPr>
-          <p:nvPr>
-            <p:ph type="ftr" sz="quarter" idx="11"/>
-          </p:nvPr>
-        </p:nvSpPr>
-        <p:spPr/>
-        <p:txBody>
-          <a:bodyPr/>
-          <a:lstStyle/>
-          <a:p>
-            <a:endParaRPr lang="en-US"/>
-          </a:p>
-        </p:txBody>
-      </p:sp>
-      <p:sp>
-        <p:nvSpPr>
-          <p:cNvPr id="6" name="Slide Number Placeholder 5">
-            <a:extLst>
-              <a:ext uri="{FF2B5EF4-FFF2-40B4-BE49-F238E27FC236}">
-                <a16:creationId xmlns:a16="http://schemas.microsoft.com/office/drawing/2014/main" id="{771C1288-86B6-B744-AB6F-B18778C3AFD5}"/>
-              </a:ext>
-            </a:extLst>
-          </p:cNvPr>
-          <p:cNvSpPr>
-            <a:spLocks noGrp="1"/>
-          </p:cNvSpPr>
-          <p:nvPr>
-            <p:ph type="sldNum" sz="quarter" idx="12"/>
-          </p:nvPr>
-        </p:nvSpPr>
-        <p:spPr/>
-        <p:txBody>
-          <a:bodyPr/>
-          <a:lstStyle/>
-          <a:p>
-            <a:fld id="{3F964A69-11D8-8245-B5C8-3C081DDCBFB6}" type="slidenum">
-              <a:rPr lang="en-US" smtClean="0"/>
-              <a:t>‹#›</a:t>
-            </a:fld>
-            <a:endParaRPr lang="en-US"/>
-          </a:p>
-        </p:txBody>
-      </p:sp>
-    </p:spTree>
-    <p:extLst>
-      <p:ext uri="{BB962C8B-B14F-4D97-AF65-F5344CB8AC3E}">
-        <p14:creationId xmlns:p14="http://schemas.microsoft.com/office/powerpoint/2010/main" val="1708552174"/>
-      </p:ext>
-    </p:extLst>
-  </p:cSld>
-  <p:clrMapOvr>
-    <a:masterClrMapping/>
-  </p:clrMapOvr>
-</p:sldLayout>
-</file>
-
-<file path=ppt/slideLayouts/slideLayout4.xml><?xml version="1.0" encoding="utf-8"?>
-<p:sldLayout xmlns:a="http://schemas.openxmlformats.org/drawingml/2006/main" xmlns:r="http://schemas.openxmlformats.org/officeDocument/2006/relationships" xmlns:p="http://schemas.openxmlformats.org/presentationml/2006/main" type="twoObj" preserve="1">
-  <p:cSld name="Two Content">
-    <p:spTree>
-      <p:nvGrpSpPr>
-        <p:cNvPr id="1" name=""/>
-        <p:cNvGrpSpPr/>
-        <p:nvPr/>
-      </p:nvGrpSpPr>
-      <p:grpSpPr>
-        <a:xfrm>
-          <a:off x="0" y="0"/>
-          <a:ext cx="0" cy="0"/>
-          <a:chOff x="0" y="0"/>
-          <a:chExt cx="0" cy="0"/>
-        </a:xfrm>
-      </p:grpSpPr>
-      <p:sp>
-        <p:nvSpPr>
-          <p:cNvPr id="2" name="Title 1">
-            <a:extLst>
-              <a:ext uri="{FF2B5EF4-FFF2-40B4-BE49-F238E27FC236}">
-                <a16:creationId xmlns:a16="http://schemas.microsoft.com/office/drawing/2014/main" id="{F382728A-45D6-434E-8DA8-9BEEBB87F8CA}"/>
-              </a:ext>
-            </a:extLst>
-          </p:cNvPr>
-          <p:cNvSpPr>
-            <a:spLocks noGrp="1"/>
-          </p:cNvSpPr>
-          <p:nvPr>
-            <p:ph type="title"/>
-          </p:nvPr>
-        </p:nvSpPr>
-        <p:spPr/>
-        <p:txBody>
-          <a:bodyPr/>
-          <a:lstStyle/>
-          <a:p>
-            <a:r>
-              <a:rPr lang="en-US"/>
-              <a:t>Click to edit Master title style</a:t>
-            </a:r>
-          </a:p>
-        </p:txBody>
-      </p:sp>
-      <p:sp>
-        <p:nvSpPr>
-          <p:cNvPr id="3" name="Content Placeholder 2">
-            <a:extLst>
-              <a:ext uri="{FF2B5EF4-FFF2-40B4-BE49-F238E27FC236}">
-                <a16:creationId xmlns:a16="http://schemas.microsoft.com/office/drawing/2014/main" id="{7C3A9C68-6C87-9942-82DE-C61BC1890635}"/>
-              </a:ext>
-            </a:extLst>
-          </p:cNvPr>
-          <p:cNvSpPr>
-            <a:spLocks noGrp="1"/>
-          </p:cNvSpPr>
-          <p:nvPr>
-            <p:ph sz="half" idx="1"/>
-          </p:nvPr>
-        </p:nvSpPr>
-        <p:spPr>
-          <a:xfrm>
-            <a:off x="838200" y="1825625"/>
-            <a:ext cx="5181600" cy="4351338"/>
-          </a:xfrm>
-        </p:spPr>
-        <p:txBody>
-          <a:bodyPr/>
-          <a:lstStyle/>
-          <a:p>
-            <a:pPr lvl="0"/>
-            <a:r>
-              <a:rPr lang="en-US"/>
-              <a:t>Edit Master text styles</a:t>
-            </a:r>
-          </a:p>
-          <a:p>
-            <a:pPr lvl="1"/>
-            <a:r>
-              <a:rPr lang="en-US"/>
-              <a:t>Second level</a:t>
-            </a:r>
-          </a:p>
-          <a:p>
-            <a:pPr lvl="2"/>
-            <a:r>
-              <a:rPr lang="en-US"/>
-              <a:t>Third level</a:t>
-            </a:r>
-          </a:p>
-          <a:p>
-            <a:pPr lvl="3"/>
-            <a:r>
-              <a:rPr lang="en-US"/>
-              <a:t>Fourth level</a:t>
-            </a:r>
-          </a:p>
-          <a:p>
-            <a:pPr lvl="4"/>
-            <a:r>
-              <a:rPr lang="en-US"/>
-              <a:t>Fifth level</a:t>
-            </a:r>
-          </a:p>
-        </p:txBody>
-      </p:sp>
-      <p:sp>
-        <p:nvSpPr>
-          <p:cNvPr id="4" name="Content Placeholder 3">
-            <a:extLst>
-              <a:ext uri="{FF2B5EF4-FFF2-40B4-BE49-F238E27FC236}">
-                <a16:creationId xmlns:a16="http://schemas.microsoft.com/office/drawing/2014/main" id="{1A9B134C-1D51-C94C-AD84-16263917D74C}"/>
-              </a:ext>
-            </a:extLst>
-          </p:cNvPr>
-          <p:cNvSpPr>
-            <a:spLocks noGrp="1"/>
-          </p:cNvSpPr>
-          <p:nvPr>
-            <p:ph sz="half" idx="2"/>
-          </p:nvPr>
-        </p:nvSpPr>
-        <p:spPr>
-          <a:xfrm>
-            <a:off x="6172200" y="1825625"/>
-            <a:ext cx="5181600" cy="4351338"/>
-          </a:xfrm>
-        </p:spPr>
-        <p:txBody>
-          <a:bodyPr/>
-          <a:lstStyle/>
-          <a:p>
-            <a:pPr lvl="0"/>
-            <a:r>
-              <a:rPr lang="en-US"/>
-              <a:t>Edit Master text styles</a:t>
-            </a:r>
-          </a:p>
-          <a:p>
-            <a:pPr lvl="1"/>
-            <a:r>
-              <a:rPr lang="en-US"/>
-              <a:t>Second level</a:t>
-            </a:r>
-          </a:p>
-          <a:p>
-            <a:pPr lvl="2"/>
-            <a:r>
-              <a:rPr lang="en-US"/>
-              <a:t>Third level</a:t>
-            </a:r>
-          </a:p>
-          <a:p>
-            <a:pPr lvl="3"/>
-            <a:r>
-              <a:rPr lang="en-US"/>
-              <a:t>Fourth level</a:t>
-            </a:r>
-          </a:p>
-          <a:p>
-            <a:pPr lvl="4"/>
-            <a:r>
-              <a:rPr lang="en-US"/>
-              <a:t>Fifth level</a:t>
-            </a:r>
-          </a:p>
-        </p:txBody>
-      </p:sp>
-      <p:sp>
-        <p:nvSpPr>
-          <p:cNvPr id="5" name="Date Placeholder 4">
-            <a:extLst>
-              <a:ext uri="{FF2B5EF4-FFF2-40B4-BE49-F238E27FC236}">
-                <a16:creationId xmlns:a16="http://schemas.microsoft.com/office/drawing/2014/main" id="{A6F2B596-3568-884D-8540-C561795C0FBF}"/>
-              </a:ext>
-            </a:extLst>
-          </p:cNvPr>
-          <p:cNvSpPr>
-            <a:spLocks noGrp="1"/>
-          </p:cNvSpPr>
-          <p:nvPr>
-            <p:ph type="dt" sz="half" idx="10"/>
-          </p:nvPr>
-        </p:nvSpPr>
-        <p:spPr/>
-        <p:txBody>
-          <a:bodyPr/>
-          <a:lstStyle/>
-          <a:p>
-            <a:fld id="{C5F3B386-61D0-A542-9BBD-24895FFB08D6}" type="datetimeFigureOut">
-              <a:rPr lang="en-US" smtClean="0"/>
-              <a:t>5/29/20</a:t>
-            </a:fld>
-            <a:endParaRPr lang="en-US"/>
-          </a:p>
-        </p:txBody>
-      </p:sp>
-      <p:sp>
-        <p:nvSpPr>
-          <p:cNvPr id="6" name="Footer Placeholder 5">
-            <a:extLst>
-              <a:ext uri="{FF2B5EF4-FFF2-40B4-BE49-F238E27FC236}">
-                <a16:creationId xmlns:a16="http://schemas.microsoft.com/office/drawing/2014/main" id="{8517BD3B-1E39-1549-ACFE-A1ACE6A4D01B}"/>
-              </a:ext>
-            </a:extLst>
-          </p:cNvPr>
-          <p:cNvSpPr>
-            <a:spLocks noGrp="1"/>
-          </p:cNvSpPr>
-          <p:nvPr>
-            <p:ph type="ftr" sz="quarter" idx="11"/>
-          </p:nvPr>
-        </p:nvSpPr>
-        <p:spPr/>
-        <p:txBody>
-          <a:bodyPr/>
-          <a:lstStyle/>
-          <a:p>
-            <a:endParaRPr lang="en-US"/>
-          </a:p>
-        </p:txBody>
-      </p:sp>
-      <p:sp>
-        <p:nvSpPr>
-          <p:cNvPr id="7" name="Slide Number Placeholder 6">
-            <a:extLst>
-              <a:ext uri="{FF2B5EF4-FFF2-40B4-BE49-F238E27FC236}">
-                <a16:creationId xmlns:a16="http://schemas.microsoft.com/office/drawing/2014/main" id="{B357DE11-B693-7D4B-B226-89DC11EFBD40}"/>
-              </a:ext>
-            </a:extLst>
-          </p:cNvPr>
-          <p:cNvSpPr>
-            <a:spLocks noGrp="1"/>
-          </p:cNvSpPr>
-          <p:nvPr>
-            <p:ph type="sldNum" sz="quarter" idx="12"/>
-          </p:nvPr>
-        </p:nvSpPr>
-        <p:spPr/>
-        <p:txBody>
-          <a:bodyPr/>
-          <a:lstStyle/>
-          <a:p>
-            <a:fld id="{3F964A69-11D8-8245-B5C8-3C081DDCBFB6}" type="slidenum">
-              <a:rPr lang="en-US" smtClean="0"/>
-              <a:t>‹#›</a:t>
-            </a:fld>
-            <a:endParaRPr lang="en-US"/>
-          </a:p>
-        </p:txBody>
-      </p:sp>
-    </p:spTree>
-    <p:extLst>
-      <p:ext uri="{BB962C8B-B14F-4D97-AF65-F5344CB8AC3E}">
-        <p14:creationId xmlns:p14="http://schemas.microsoft.com/office/powerpoint/2010/main" val="2309356344"/>
-      </p:ext>
-    </p:extLst>
-  </p:cSld>
-  <p:clrMapOvr>
-    <a:masterClrMapping/>
-  </p:clrMapOvr>
-</p:sldLayout>
-</file>
-
-<file path=ppt/slideLayouts/slideLayout5.xml><?xml version="1.0" encoding="utf-8"?>
-<p:sldLayout xmlns:a="http://schemas.openxmlformats.org/drawingml/2006/main" xmlns:r="http://schemas.openxmlformats.org/officeDocument/2006/relationships" xmlns:p="http://schemas.openxmlformats.org/presentationml/2006/main" type="twoTxTwoObj" preserve="1">
-  <p:cSld name="Comparison">
-    <p:spTree>
-      <p:nvGrpSpPr>
-        <p:cNvPr id="1" name=""/>
-        <p:cNvGrpSpPr/>
-        <p:nvPr/>
-      </p:nvGrpSpPr>
-      <p:grpSpPr>
-        <a:xfrm>
-          <a:off x="0" y="0"/>
-          <a:ext cx="0" cy="0"/>
-          <a:chOff x="0" y="0"/>
-          <a:chExt cx="0" cy="0"/>
-        </a:xfrm>
-      </p:grpSpPr>
-      <p:sp>
-        <p:nvSpPr>
-          <p:cNvPr id="2" name="Title 1">
-            <a:extLst>
-              <a:ext uri="{FF2B5EF4-FFF2-40B4-BE49-F238E27FC236}">
-                <a16:creationId xmlns:a16="http://schemas.microsoft.com/office/drawing/2014/main" id="{997E9000-2DDB-0949-AA52-9D42918E045F}"/>
-              </a:ext>
-            </a:extLst>
-          </p:cNvPr>
-          <p:cNvSpPr>
-            <a:spLocks noGrp="1"/>
-          </p:cNvSpPr>
-          <p:nvPr>
-            <p:ph type="title"/>
-          </p:nvPr>
-        </p:nvSpPr>
-        <p:spPr>
-          <a:xfrm>
-            <a:off x="839788" y="365125"/>
-            <a:ext cx="10515600" cy="1325563"/>
-          </a:xfrm>
-        </p:spPr>
-        <p:txBody>
-          <a:bodyPr/>
-          <a:lstStyle/>
-          <a:p>
-            <a:r>
-              <a:rPr lang="en-US"/>
-              <a:t>Click to edit Master title style</a:t>
-            </a:r>
-          </a:p>
-        </p:txBody>
-      </p:sp>
-      <p:sp>
-        <p:nvSpPr>
-          <p:cNvPr id="3" name="Text Placeholder 2">
-            <a:extLst>
-              <a:ext uri="{FF2B5EF4-FFF2-40B4-BE49-F238E27FC236}">
-                <a16:creationId xmlns:a16="http://schemas.microsoft.com/office/drawing/2014/main" id="{754BF6CE-B75F-FE4D-83E2-752907C0D728}"/>
-              </a:ext>
-            </a:extLst>
-          </p:cNvPr>
-          <p:cNvSpPr>
-            <a:spLocks noGrp="1"/>
-          </p:cNvSpPr>
-          <p:nvPr>
-            <p:ph type="body" idx="1"/>
-          </p:nvPr>
-        </p:nvSpPr>
-        <p:spPr>
-          <a:xfrm>
-            <a:off x="839788" y="1681163"/>
-            <a:ext cx="5157787" cy="823912"/>
-          </a:xfrm>
-        </p:spPr>
-        <p:txBody>
-          <a:bodyPr anchor="b"/>
-          <a:lstStyle>
-            <a:lvl1pPr marL="0" indent="0">
-              <a:buNone/>
-              <a:defRPr sz="2400" b="1"/>
-            </a:lvl1pPr>
-            <a:lvl2pPr marL="457200" indent="0">
-              <a:buNone/>
-              <a:defRPr sz="2000" b="1"/>
-            </a:lvl2pPr>
-            <a:lvl3pPr marL="914400" indent="0">
-              <a:buNone/>
-              <a:defRPr sz="1800" b="1"/>
-            </a:lvl3pPr>
-            <a:lvl4pPr marL="1371600" indent="0">
-              <a:buNone/>
-              <a:defRPr sz="1600" b="1"/>
-            </a:lvl4pPr>
-            <a:lvl5pPr marL="1828800" indent="0">
-              <a:buNone/>
-              <a:defRPr sz="1600" b="1"/>
-            </a:lvl5pPr>
-            <a:lvl6pPr marL="2286000" indent="0">
-              <a:buNone/>
-              <a:defRPr sz="1600" b="1"/>
-            </a:lvl6pPr>
-            <a:lvl7pPr marL="2743200" indent="0">
-              <a:buNone/>
-              <a:defRPr sz="1600" b="1"/>
-            </a:lvl7pPr>
-            <a:lvl8pPr marL="3200400" indent="0">
-              <a:buNone/>
-              <a:defRPr sz="1600" b="1"/>
-            </a:lvl8pPr>
-            <a:lvl9pPr marL="3657600" indent="0">
-              <a:buNone/>
-              <a:defRPr sz="1600" b="1"/>
-            </a:lvl9pPr>
-          </a:lstStyle>
-          <a:p>
-            <a:pPr lvl="0"/>
-            <a:r>
-              <a:rPr lang="en-US"/>
-              <a:t>Edit Master text styles</a:t>
-            </a:r>
-          </a:p>
-        </p:txBody>
-      </p:sp>
-      <p:sp>
-        <p:nvSpPr>
-          <p:cNvPr id="4" name="Content Placeholder 3">
-            <a:extLst>
-              <a:ext uri="{FF2B5EF4-FFF2-40B4-BE49-F238E27FC236}">
-                <a16:creationId xmlns:a16="http://schemas.microsoft.com/office/drawing/2014/main" id="{1865C1A0-76E8-3442-B424-052D6F6F3952}"/>
-              </a:ext>
-            </a:extLst>
-          </p:cNvPr>
-          <p:cNvSpPr>
-            <a:spLocks noGrp="1"/>
-          </p:cNvSpPr>
-          <p:nvPr>
-            <p:ph sz="half" idx="2"/>
-          </p:nvPr>
-        </p:nvSpPr>
-        <p:spPr>
-          <a:xfrm>
-            <a:off x="839788" y="2505075"/>
-            <a:ext cx="5157787" cy="3684588"/>
-          </a:xfrm>
-        </p:spPr>
-        <p:txBody>
-          <a:bodyPr/>
-          <a:lstStyle/>
-          <a:p>
-            <a:pPr lvl="0"/>
-            <a:r>
-              <a:rPr lang="en-US"/>
-              <a:t>Edit Master text styles</a:t>
-            </a:r>
-          </a:p>
-          <a:p>
-            <a:pPr lvl="1"/>
-            <a:r>
-              <a:rPr lang="en-US"/>
-              <a:t>Second level</a:t>
-            </a:r>
-          </a:p>
-          <a:p>
-            <a:pPr lvl="2"/>
-            <a:r>
-              <a:rPr lang="en-US"/>
-              <a:t>Third level</a:t>
-            </a:r>
-          </a:p>
-          <a:p>
-            <a:pPr lvl="3"/>
-            <a:r>
-              <a:rPr lang="en-US"/>
-              <a:t>Fourth level</a:t>
-            </a:r>
-          </a:p>
-          <a:p>
-            <a:pPr lvl="4"/>
-            <a:r>
-              <a:rPr lang="en-US"/>
-              <a:t>Fifth level</a:t>
-            </a:r>
-          </a:p>
-        </p:txBody>
-      </p:sp>
-      <p:sp>
-        <p:nvSpPr>
-          <p:cNvPr id="5" name="Text Placeholder 4">
-            <a:extLst>
-              <a:ext uri="{FF2B5EF4-FFF2-40B4-BE49-F238E27FC236}">
-                <a16:creationId xmlns:a16="http://schemas.microsoft.com/office/drawing/2014/main" id="{764A50F9-463C-1D45-A4CA-2D9C6634B4A3}"/>
-              </a:ext>
-            </a:extLst>
-          </p:cNvPr>
-          <p:cNvSpPr>
-            <a:spLocks noGrp="1"/>
-          </p:cNvSpPr>
-          <p:nvPr>
-            <p:ph type="body" sz="quarter" idx="3"/>
-          </p:nvPr>
-        </p:nvSpPr>
-        <p:spPr>
-          <a:xfrm>
-            <a:off x="6172200" y="1681163"/>
-            <a:ext cx="5183188" cy="823912"/>
-          </a:xfrm>
-        </p:spPr>
-        <p:txBody>
-          <a:bodyPr anchor="b"/>
-          <a:lstStyle>
-            <a:lvl1pPr marL="0" indent="0">
-              <a:buNone/>
-              <a:defRPr sz="2400" b="1"/>
-            </a:lvl1pPr>
-            <a:lvl2pPr marL="457200" indent="0">
-              <a:buNone/>
-              <a:defRPr sz="2000" b="1"/>
-            </a:lvl2pPr>
-            <a:lvl3pPr marL="914400" indent="0">
-              <a:buNone/>
-              <a:defRPr sz="1800" b="1"/>
-            </a:lvl3pPr>
-            <a:lvl4pPr marL="1371600" indent="0">
-              <a:buNone/>
-              <a:defRPr sz="1600" b="1"/>
-            </a:lvl4pPr>
-            <a:lvl5pPr marL="1828800" indent="0">
-              <a:buNone/>
-              <a:defRPr sz="1600" b="1"/>
-            </a:lvl5pPr>
-            <a:lvl6pPr marL="2286000" indent="0">
-              <a:buNone/>
-              <a:defRPr sz="1600" b="1"/>
-            </a:lvl6pPr>
-            <a:lvl7pPr marL="2743200" indent="0">
-              <a:buNone/>
-              <a:defRPr sz="1600" b="1"/>
-            </a:lvl7pPr>
-            <a:lvl8pPr marL="3200400" indent="0">
-              <a:buNone/>
-              <a:defRPr sz="1600" b="1"/>
-            </a:lvl8pPr>
-            <a:lvl9pPr marL="3657600" indent="0">
-              <a:buNone/>
-              <a:defRPr sz="1600" b="1"/>
-            </a:lvl9pPr>
-          </a:lstStyle>
-          <a:p>
-            <a:pPr lvl="0"/>
-            <a:r>
-              <a:rPr lang="en-US"/>
-              <a:t>Edit Master text styles</a:t>
-            </a:r>
-          </a:p>
-        </p:txBody>
-      </p:sp>
-      <p:sp>
-        <p:nvSpPr>
-          <p:cNvPr id="6" name="Content Placeholder 5">
-            <a:extLst>
-              <a:ext uri="{FF2B5EF4-FFF2-40B4-BE49-F238E27FC236}">
-                <a16:creationId xmlns:a16="http://schemas.microsoft.com/office/drawing/2014/main" id="{E2BD16CE-9E11-B747-BD65-9029AB76E8A1}"/>
-              </a:ext>
-            </a:extLst>
-          </p:cNvPr>
-          <p:cNvSpPr>
-            <a:spLocks noGrp="1"/>
-          </p:cNvSpPr>
-          <p:nvPr>
-            <p:ph sz="quarter" idx="4"/>
-          </p:nvPr>
-        </p:nvSpPr>
-        <p:spPr>
-          <a:xfrm>
-            <a:off x="6172200" y="2505075"/>
-            <a:ext cx="5183188" cy="3684588"/>
-          </a:xfrm>
-        </p:spPr>
-        <p:txBody>
-          <a:bodyPr/>
-          <a:lstStyle/>
-          <a:p>
-            <a:pPr lvl="0"/>
-            <a:r>
-              <a:rPr lang="en-US"/>
-              <a:t>Edit Master text styles</a:t>
-            </a:r>
-          </a:p>
-          <a:p>
-            <a:pPr lvl="1"/>
-            <a:r>
-              <a:rPr lang="en-US"/>
-              <a:t>Second level</a:t>
-            </a:r>
-          </a:p>
-          <a:p>
-            <a:pPr lvl="2"/>
-            <a:r>
-              <a:rPr lang="en-US"/>
-              <a:t>Third level</a:t>
-            </a:r>
-          </a:p>
-          <a:p>
-            <a:pPr lvl="3"/>
-            <a:r>
-              <a:rPr lang="en-US"/>
-              <a:t>Fourth level</a:t>
-            </a:r>
-          </a:p>
-          <a:p>
-            <a:pPr lvl="4"/>
-            <a:r>
-              <a:rPr lang="en-US"/>
-              <a:t>Fifth level</a:t>
-            </a:r>
-          </a:p>
-        </p:txBody>
-      </p:sp>
-      <p:sp>
-        <p:nvSpPr>
-          <p:cNvPr id="7" name="Date Placeholder 6">
-            <a:extLst>
-              <a:ext uri="{FF2B5EF4-FFF2-40B4-BE49-F238E27FC236}">
-                <a16:creationId xmlns:a16="http://schemas.microsoft.com/office/drawing/2014/main" id="{00F796A1-684B-3042-8EF3-9FCAB74CB12D}"/>
-              </a:ext>
-            </a:extLst>
-          </p:cNvPr>
-          <p:cNvSpPr>
-            <a:spLocks noGrp="1"/>
-          </p:cNvSpPr>
-          <p:nvPr>
-            <p:ph type="dt" sz="half" idx="10"/>
-          </p:nvPr>
-        </p:nvSpPr>
-        <p:spPr/>
-        <p:txBody>
-          <a:bodyPr/>
-          <a:lstStyle/>
-          <a:p>
-            <a:fld id="{C5F3B386-61D0-A542-9BBD-24895FFB08D6}" type="datetimeFigureOut">
-              <a:rPr lang="en-US" smtClean="0"/>
-              <a:t>5/29/20</a:t>
-            </a:fld>
-            <a:endParaRPr lang="en-US"/>
-          </a:p>
-        </p:txBody>
-      </p:sp>
-      <p:sp>
-        <p:nvSpPr>
-          <p:cNvPr id="8" name="Footer Placeholder 7">
-            <a:extLst>
-              <a:ext uri="{FF2B5EF4-FFF2-40B4-BE49-F238E27FC236}">
-                <a16:creationId xmlns:a16="http://schemas.microsoft.com/office/drawing/2014/main" id="{2F27A945-A1FB-354D-A475-DAC94D6FE5EE}"/>
-              </a:ext>
-            </a:extLst>
-          </p:cNvPr>
-          <p:cNvSpPr>
-            <a:spLocks noGrp="1"/>
-          </p:cNvSpPr>
-          <p:nvPr>
-            <p:ph type="ftr" sz="quarter" idx="11"/>
-          </p:nvPr>
-        </p:nvSpPr>
-        <p:spPr/>
-        <p:txBody>
-          <a:bodyPr/>
-          <a:lstStyle/>
-          <a:p>
-            <a:endParaRPr lang="en-US"/>
-          </a:p>
-        </p:txBody>
-      </p:sp>
-      <p:sp>
-        <p:nvSpPr>
-          <p:cNvPr id="9" name="Slide Number Placeholder 8">
-            <a:extLst>
-              <a:ext uri="{FF2B5EF4-FFF2-40B4-BE49-F238E27FC236}">
-                <a16:creationId xmlns:a16="http://schemas.microsoft.com/office/drawing/2014/main" id="{46EAB4BA-0702-A746-81A8-8BC8CCD0AE1B}"/>
-              </a:ext>
-            </a:extLst>
-          </p:cNvPr>
-          <p:cNvSpPr>
-            <a:spLocks noGrp="1"/>
-          </p:cNvSpPr>
-          <p:nvPr>
-            <p:ph type="sldNum" sz="quarter" idx="12"/>
-          </p:nvPr>
-        </p:nvSpPr>
-        <p:spPr/>
-        <p:txBody>
-          <a:bodyPr/>
-          <a:lstStyle/>
-          <a:p>
-            <a:fld id="{3F964A69-11D8-8245-B5C8-3C081DDCBFB6}" type="slidenum">
-              <a:rPr lang="en-US" smtClean="0"/>
-              <a:t>‹#›</a:t>
-            </a:fld>
-            <a:endParaRPr lang="en-US"/>
-          </a:p>
-        </p:txBody>
-      </p:sp>
-    </p:spTree>
-    <p:extLst>
-      <p:ext uri="{BB962C8B-B14F-4D97-AF65-F5344CB8AC3E}">
-        <p14:creationId xmlns:p14="http://schemas.microsoft.com/office/powerpoint/2010/main" val="1241866351"/>
-      </p:ext>
-    </p:extLst>
-  </p:cSld>
-  <p:clrMapOvr>
-    <a:masterClrMapping/>
-  </p:clrMapOvr>
-</p:sldLayout>
-</file>
-
-<file path=ppt/slideLayouts/slideLayout6.xml><?xml version="1.0" encoding="utf-8"?>
-<p:sldLayout xmlns:a="http://schemas.openxmlformats.org/drawingml/2006/main" xmlns:r="http://schemas.openxmlformats.org/officeDocument/2006/relationships" xmlns:p="http://schemas.openxmlformats.org/presentationml/2006/main" type="titleOnly" preserve="1">
-  <p:cSld name="Title Only">
-    <p:spTree>
-      <p:nvGrpSpPr>
-        <p:cNvPr id="1" name=""/>
-        <p:cNvGrpSpPr/>
-        <p:nvPr/>
-      </p:nvGrpSpPr>
-      <p:grpSpPr>
-        <a:xfrm>
-          <a:off x="0" y="0"/>
-          <a:ext cx="0" cy="0"/>
-          <a:chOff x="0" y="0"/>
-          <a:chExt cx="0" cy="0"/>
-        </a:xfrm>
-      </p:grpSpPr>
-      <p:sp>
-        <p:nvSpPr>
-          <p:cNvPr id="2" name="Title 1">
-            <a:extLst>
-              <a:ext uri="{FF2B5EF4-FFF2-40B4-BE49-F238E27FC236}">
-                <a16:creationId xmlns:a16="http://schemas.microsoft.com/office/drawing/2014/main" id="{92A46BFE-AACE-514F-AFAC-C0DD0423711D}"/>
-              </a:ext>
-            </a:extLst>
-          </p:cNvPr>
-          <p:cNvSpPr>
-            <a:spLocks noGrp="1"/>
-          </p:cNvSpPr>
-          <p:nvPr>
-            <p:ph type="title"/>
-          </p:nvPr>
-        </p:nvSpPr>
-        <p:spPr/>
-        <p:txBody>
-          <a:bodyPr/>
-          <a:lstStyle/>
-          <a:p>
-            <a:r>
-              <a:rPr lang="en-US"/>
-              <a:t>Click to edit Master title style</a:t>
-            </a:r>
-          </a:p>
-        </p:txBody>
-      </p:sp>
-      <p:sp>
-        <p:nvSpPr>
-          <p:cNvPr id="3" name="Date Placeholder 2">
-            <a:extLst>
-              <a:ext uri="{FF2B5EF4-FFF2-40B4-BE49-F238E27FC236}">
-                <a16:creationId xmlns:a16="http://schemas.microsoft.com/office/drawing/2014/main" id="{E0DF7F3C-B591-C04F-8797-590D888D9D15}"/>
-              </a:ext>
-            </a:extLst>
-          </p:cNvPr>
-          <p:cNvSpPr>
-            <a:spLocks noGrp="1"/>
-          </p:cNvSpPr>
-          <p:nvPr>
-            <p:ph type="dt" sz="half" idx="10"/>
-          </p:nvPr>
-        </p:nvSpPr>
-        <p:spPr/>
-        <p:txBody>
-          <a:bodyPr/>
-          <a:lstStyle/>
-          <a:p>
-            <a:fld id="{C5F3B386-61D0-A542-9BBD-24895FFB08D6}" type="datetimeFigureOut">
-              <a:rPr lang="en-US" smtClean="0"/>
-              <a:t>5/29/20</a:t>
-            </a:fld>
-            <a:endParaRPr lang="en-US"/>
-          </a:p>
-        </p:txBody>
-      </p:sp>
-      <p:sp>
-        <p:nvSpPr>
-          <p:cNvPr id="4" name="Footer Placeholder 3">
-            <a:extLst>
-              <a:ext uri="{FF2B5EF4-FFF2-40B4-BE49-F238E27FC236}">
-                <a16:creationId xmlns:a16="http://schemas.microsoft.com/office/drawing/2014/main" id="{0C910670-6B87-FA42-BC91-E8102AED2BC2}"/>
-              </a:ext>
-            </a:extLst>
-          </p:cNvPr>
-          <p:cNvSpPr>
-            <a:spLocks noGrp="1"/>
-          </p:cNvSpPr>
-          <p:nvPr>
-            <p:ph type="ftr" sz="quarter" idx="11"/>
-          </p:nvPr>
-        </p:nvSpPr>
-        <p:spPr/>
-        <p:txBody>
-          <a:bodyPr/>
-          <a:lstStyle/>
-          <a:p>
-            <a:endParaRPr lang="en-US"/>
-          </a:p>
-        </p:txBody>
-      </p:sp>
-      <p:sp>
-        <p:nvSpPr>
-          <p:cNvPr id="5" name="Slide Number Placeholder 4">
-            <a:extLst>
-              <a:ext uri="{FF2B5EF4-FFF2-40B4-BE49-F238E27FC236}">
-                <a16:creationId xmlns:a16="http://schemas.microsoft.com/office/drawing/2014/main" id="{A0F6801A-D238-894B-9CB7-135F35624ACB}"/>
-              </a:ext>
-            </a:extLst>
-          </p:cNvPr>
-          <p:cNvSpPr>
-            <a:spLocks noGrp="1"/>
-          </p:cNvSpPr>
-          <p:nvPr>
-            <p:ph type="sldNum" sz="quarter" idx="12"/>
-          </p:nvPr>
-        </p:nvSpPr>
-        <p:spPr/>
-        <p:txBody>
-          <a:bodyPr/>
-          <a:lstStyle/>
-          <a:p>
-            <a:fld id="{3F964A69-11D8-8245-B5C8-3C081DDCBFB6}" type="slidenum">
-              <a:rPr lang="en-US" smtClean="0"/>
-              <a:t>‹#›</a:t>
-            </a:fld>
-            <a:endParaRPr lang="en-US"/>
-          </a:p>
-        </p:txBody>
-      </p:sp>
-    </p:spTree>
-    <p:extLst>
-      <p:ext uri="{BB962C8B-B14F-4D97-AF65-F5344CB8AC3E}">
-        <p14:creationId xmlns:p14="http://schemas.microsoft.com/office/powerpoint/2010/main" val="1975028359"/>
-      </p:ext>
-    </p:extLst>
-  </p:cSld>
-  <p:clrMapOvr>
-    <a:masterClrMapping/>
-  </p:clrMapOvr>
-</p:sldLayout>
-</file>
-
-<file path=ppt/slideLayouts/slideLayout7.xml><?xml version="1.0" encoding="utf-8"?>
-<p:sldLayout xmlns:a="http://schemas.openxmlformats.org/drawingml/2006/main" xmlns:r="http://schemas.openxmlformats.org/officeDocument/2006/relationships" xmlns:p="http://schemas.openxmlformats.org/presentationml/2006/main" type="blank" preserve="1">
-  <p:cSld name="Blank">
-    <p:spTree>
-      <p:nvGrpSpPr>
-        <p:cNvPr id="1" name=""/>
-        <p:cNvGrpSpPr/>
-        <p:nvPr/>
-      </p:nvGrpSpPr>
-      <p:grpSpPr>
-        <a:xfrm>
-          <a:off x="0" y="0"/>
-          <a:ext cx="0" cy="0"/>
-          <a:chOff x="0" y="0"/>
-          <a:chExt cx="0" cy="0"/>
-        </a:xfrm>
-      </p:grpSpPr>
-      <p:sp>
-        <p:nvSpPr>
-          <p:cNvPr id="2" name="Date Placeholder 1">
-            <a:extLst>
-              <a:ext uri="{FF2B5EF4-FFF2-40B4-BE49-F238E27FC236}">
-                <a16:creationId xmlns:a16="http://schemas.microsoft.com/office/drawing/2014/main" id="{7F606B84-2433-A047-A22A-9F84CB127F8B}"/>
-              </a:ext>
-            </a:extLst>
-          </p:cNvPr>
-          <p:cNvSpPr>
-            <a:spLocks noGrp="1"/>
-          </p:cNvSpPr>
-          <p:nvPr>
-            <p:ph type="dt" sz="half" idx="10"/>
-          </p:nvPr>
-        </p:nvSpPr>
-        <p:spPr/>
-        <p:txBody>
-          <a:bodyPr/>
-          <a:lstStyle/>
-          <a:p>
-            <a:fld id="{C5F3B386-61D0-A542-9BBD-24895FFB08D6}" type="datetimeFigureOut">
-              <a:rPr lang="en-US" smtClean="0"/>
-              <a:t>5/29/20</a:t>
-            </a:fld>
-            <a:endParaRPr lang="en-US"/>
-          </a:p>
-        </p:txBody>
-      </p:sp>
-      <p:sp>
-        <p:nvSpPr>
-          <p:cNvPr id="3" name="Footer Placeholder 2">
-            <a:extLst>
-              <a:ext uri="{FF2B5EF4-FFF2-40B4-BE49-F238E27FC236}">
-                <a16:creationId xmlns:a16="http://schemas.microsoft.com/office/drawing/2014/main" id="{4E890C57-32CB-8345-BEA0-2405D6CCCC01}"/>
-              </a:ext>
-            </a:extLst>
-          </p:cNvPr>
-          <p:cNvSpPr>
-            <a:spLocks noGrp="1"/>
-          </p:cNvSpPr>
-          <p:nvPr>
-            <p:ph type="ftr" sz="quarter" idx="11"/>
-          </p:nvPr>
-        </p:nvSpPr>
-        <p:spPr/>
-        <p:txBody>
-          <a:bodyPr/>
-          <a:lstStyle/>
-          <a:p>
-            <a:endParaRPr lang="en-US"/>
-          </a:p>
-        </p:txBody>
-      </p:sp>
-      <p:sp>
-        <p:nvSpPr>
-          <p:cNvPr id="4" name="Slide Number Placeholder 3">
-            <a:extLst>
-              <a:ext uri="{FF2B5EF4-FFF2-40B4-BE49-F238E27FC236}">
-                <a16:creationId xmlns:a16="http://schemas.microsoft.com/office/drawing/2014/main" id="{AEBF70CB-197A-1A41-915A-4B50A156DFA2}"/>
-              </a:ext>
-            </a:extLst>
-          </p:cNvPr>
-          <p:cNvSpPr>
-            <a:spLocks noGrp="1"/>
-          </p:cNvSpPr>
-          <p:nvPr>
-            <p:ph type="sldNum" sz="quarter" idx="12"/>
-          </p:nvPr>
-        </p:nvSpPr>
-        <p:spPr/>
-        <p:txBody>
-          <a:bodyPr/>
-          <a:lstStyle/>
-          <a:p>
-            <a:fld id="{3F964A69-11D8-8245-B5C8-3C081DDCBFB6}" type="slidenum">
-              <a:rPr lang="en-US" smtClean="0"/>
-              <a:t>‹#›</a:t>
-            </a:fld>
-            <a:endParaRPr lang="en-US"/>
-          </a:p>
-        </p:txBody>
-      </p:sp>
-    </p:spTree>
-    <p:extLst>
-      <p:ext uri="{BB962C8B-B14F-4D97-AF65-F5344CB8AC3E}">
-        <p14:creationId xmlns:p14="http://schemas.microsoft.com/office/powerpoint/2010/main" val="102586902"/>
-      </p:ext>
-    </p:extLst>
-  </p:cSld>
-  <p:clrMapOvr>
-    <a:masterClrMapping/>
-  </p:clrMapOvr>
-</p:sldLayout>
-</file>
-
-<file path=ppt/slideLayouts/slideLayout8.xml><?xml version="1.0" encoding="utf-8"?>
-<p:sldLayout xmlns:a="http://schemas.openxmlformats.org/drawingml/2006/main" xmlns:r="http://schemas.openxmlformats.org/officeDocument/2006/relationships" xmlns:p="http://schemas.openxmlformats.org/presentationml/2006/main" type="objTx" preserve="1">
-  <p:cSld name="Content with Caption">
-    <p:spTree>
-      <p:nvGrpSpPr>
-        <p:cNvPr id="1" name=""/>
-        <p:cNvGrpSpPr/>
-        <p:nvPr/>
-      </p:nvGrpSpPr>
-      <p:grpSpPr>
-        <a:xfrm>
-          <a:off x="0" y="0"/>
-          <a:ext cx="0" cy="0"/>
-          <a:chOff x="0" y="0"/>
-          <a:chExt cx="0" cy="0"/>
-        </a:xfrm>
-      </p:grpSpPr>
-      <p:sp>
-        <p:nvSpPr>
-          <p:cNvPr id="2" name="Title 1">
-            <a:extLst>
-              <a:ext uri="{FF2B5EF4-FFF2-40B4-BE49-F238E27FC236}">
-                <a16:creationId xmlns:a16="http://schemas.microsoft.com/office/drawing/2014/main" id="{752EB201-D4D1-4D42-A484-9DCF5F40E4C1}"/>
-              </a:ext>
-            </a:extLst>
-          </p:cNvPr>
-          <p:cNvSpPr>
-            <a:spLocks noGrp="1"/>
-          </p:cNvSpPr>
-          <p:nvPr>
-            <p:ph type="title"/>
-          </p:nvPr>
-        </p:nvSpPr>
-        <p:spPr>
-          <a:xfrm>
-            <a:off x="839788" y="457200"/>
-            <a:ext cx="3932237" cy="1600200"/>
-          </a:xfrm>
-        </p:spPr>
-        <p:txBody>
-          <a:bodyPr anchor="b"/>
-          <a:lstStyle>
-            <a:lvl1pPr>
-              <a:defRPr sz="3200"/>
-            </a:lvl1pPr>
-          </a:lstStyle>
-          <a:p>
-            <a:r>
-              <a:rPr lang="en-US"/>
-              <a:t>Click to edit Master title style</a:t>
-            </a:r>
-          </a:p>
-        </p:txBody>
-      </p:sp>
-      <p:sp>
-        <p:nvSpPr>
-          <p:cNvPr id="3" name="Content Placeholder 2">
-            <a:extLst>
-              <a:ext uri="{FF2B5EF4-FFF2-40B4-BE49-F238E27FC236}">
-                <a16:creationId xmlns:a16="http://schemas.microsoft.com/office/drawing/2014/main" id="{DF0B578B-D3DF-AC49-8120-CA95DFCDB87D}"/>
-              </a:ext>
-            </a:extLst>
-          </p:cNvPr>
-          <p:cNvSpPr>
-            <a:spLocks noGrp="1"/>
-          </p:cNvSpPr>
-          <p:nvPr>
-            <p:ph idx="1"/>
-          </p:nvPr>
-        </p:nvSpPr>
-        <p:spPr>
-          <a:xfrm>
-            <a:off x="5183188" y="987425"/>
-            <a:ext cx="6172200" cy="4873625"/>
-          </a:xfrm>
-        </p:spPr>
-        <p:txBody>
-          <a:bodyPr/>
-          <a:lstStyle>
-            <a:lvl1pPr>
-              <a:defRPr sz="3200"/>
-            </a:lvl1pPr>
-            <a:lvl2pPr>
-              <a:defRPr sz="2800"/>
-            </a:lvl2pPr>
-            <a:lvl3pPr>
-              <a:defRPr sz="2400"/>
-            </a:lvl3pPr>
-            <a:lvl4pPr>
-              <a:defRPr sz="2000"/>
-            </a:lvl4pPr>
-            <a:lvl5pPr>
-              <a:defRPr sz="2000"/>
-            </a:lvl5pPr>
-            <a:lvl6pPr>
-              <a:defRPr sz="2000"/>
-            </a:lvl6pPr>
-            <a:lvl7pPr>
-              <a:defRPr sz="2000"/>
-            </a:lvl7pPr>
-            <a:lvl8pPr>
-              <a:defRPr sz="2000"/>
-            </a:lvl8pPr>
-            <a:lvl9pPr>
-              <a:defRPr sz="2000"/>
-            </a:lvl9pPr>
-          </a:lstStyle>
-          <a:p>
-            <a:pPr lvl="0"/>
-            <a:r>
-              <a:rPr lang="en-US"/>
-              <a:t>Edit Master text styles</a:t>
-            </a:r>
-          </a:p>
-          <a:p>
-            <a:pPr lvl="1"/>
-            <a:r>
-              <a:rPr lang="en-US"/>
-              <a:t>Second level</a:t>
-            </a:r>
-          </a:p>
-          <a:p>
-            <a:pPr lvl="2"/>
-            <a:r>
-              <a:rPr lang="en-US"/>
-              <a:t>Third level</a:t>
-            </a:r>
-          </a:p>
-          <a:p>
-            <a:pPr lvl="3"/>
-            <a:r>
-              <a:rPr lang="en-US"/>
-              <a:t>Fourth level</a:t>
-            </a:r>
-          </a:p>
-          <a:p>
-            <a:pPr lvl="4"/>
-            <a:r>
-              <a:rPr lang="en-US"/>
-              <a:t>Fifth level</a:t>
-            </a:r>
-          </a:p>
-        </p:txBody>
-      </p:sp>
-      <p:sp>
-        <p:nvSpPr>
-          <p:cNvPr id="4" name="Text Placeholder 3">
-            <a:extLst>
-              <a:ext uri="{FF2B5EF4-FFF2-40B4-BE49-F238E27FC236}">
-                <a16:creationId xmlns:a16="http://schemas.microsoft.com/office/drawing/2014/main" id="{2A55B72D-2F08-884E-8C00-38BBCC30E820}"/>
-              </a:ext>
-            </a:extLst>
-          </p:cNvPr>
-          <p:cNvSpPr>
-            <a:spLocks noGrp="1"/>
-          </p:cNvSpPr>
-          <p:nvPr>
-            <p:ph type="body" sz="half" idx="2"/>
-          </p:nvPr>
-        </p:nvSpPr>
-        <p:spPr>
-          <a:xfrm>
-            <a:off x="839788" y="2057400"/>
-            <a:ext cx="3932237" cy="3811588"/>
-          </a:xfrm>
-        </p:spPr>
-        <p:txBody>
-          <a:bodyPr/>
-          <a:lstStyle>
-            <a:lvl1pPr marL="0" indent="0">
-              <a:buNone/>
-              <a:defRPr sz="1600"/>
-            </a:lvl1pPr>
-            <a:lvl2pPr marL="457200" indent="0">
-              <a:buNone/>
-              <a:defRPr sz="1400"/>
-            </a:lvl2pPr>
-            <a:lvl3pPr marL="914400" indent="0">
-              <a:buNone/>
-              <a:defRPr sz="1200"/>
-            </a:lvl3pPr>
-            <a:lvl4pPr marL="1371600" indent="0">
-              <a:buNone/>
-              <a:defRPr sz="1000"/>
-            </a:lvl4pPr>
-            <a:lvl5pPr marL="1828800" indent="0">
-              <a:buNone/>
-              <a:defRPr sz="1000"/>
-            </a:lvl5pPr>
-            <a:lvl6pPr marL="2286000" indent="0">
-              <a:buNone/>
-              <a:defRPr sz="1000"/>
-            </a:lvl6pPr>
-            <a:lvl7pPr marL="2743200" indent="0">
-              <a:buNone/>
-              <a:defRPr sz="1000"/>
-            </a:lvl7pPr>
-            <a:lvl8pPr marL="3200400" indent="0">
-              <a:buNone/>
-              <a:defRPr sz="1000"/>
-            </a:lvl8pPr>
-            <a:lvl9pPr marL="3657600" indent="0">
-              <a:buNone/>
-              <a:defRPr sz="1000"/>
-            </a:lvl9pPr>
-          </a:lstStyle>
-          <a:p>
-            <a:pPr lvl="0"/>
-            <a:r>
-              <a:rPr lang="en-US"/>
-              <a:t>Edit Master text styles</a:t>
-            </a:r>
-          </a:p>
-        </p:txBody>
-      </p:sp>
-      <p:sp>
-        <p:nvSpPr>
-          <p:cNvPr id="5" name="Date Placeholder 4">
-            <a:extLst>
-              <a:ext uri="{FF2B5EF4-FFF2-40B4-BE49-F238E27FC236}">
-                <a16:creationId xmlns:a16="http://schemas.microsoft.com/office/drawing/2014/main" id="{84C5AD18-D567-0544-8189-C002FBCA6633}"/>
-              </a:ext>
-            </a:extLst>
-          </p:cNvPr>
-          <p:cNvSpPr>
-            <a:spLocks noGrp="1"/>
-          </p:cNvSpPr>
-          <p:nvPr>
-            <p:ph type="dt" sz="half" idx="10"/>
-          </p:nvPr>
-        </p:nvSpPr>
-        <p:spPr/>
-        <p:txBody>
-          <a:bodyPr/>
-          <a:lstStyle/>
-          <a:p>
-            <a:fld id="{C5F3B386-61D0-A542-9BBD-24895FFB08D6}" type="datetimeFigureOut">
-              <a:rPr lang="en-US" smtClean="0"/>
-              <a:t>5/29/20</a:t>
-            </a:fld>
-            <a:endParaRPr lang="en-US"/>
-          </a:p>
-        </p:txBody>
-      </p:sp>
-      <p:sp>
-        <p:nvSpPr>
-          <p:cNvPr id="6" name="Footer Placeholder 5">
-            <a:extLst>
-              <a:ext uri="{FF2B5EF4-FFF2-40B4-BE49-F238E27FC236}">
-                <a16:creationId xmlns:a16="http://schemas.microsoft.com/office/drawing/2014/main" id="{3F1EFB99-470B-424B-8442-75D841FED89E}"/>
-              </a:ext>
-            </a:extLst>
-          </p:cNvPr>
-          <p:cNvSpPr>
-            <a:spLocks noGrp="1"/>
-          </p:cNvSpPr>
-          <p:nvPr>
-            <p:ph type="ftr" sz="quarter" idx="11"/>
-          </p:nvPr>
-        </p:nvSpPr>
-        <p:spPr/>
-        <p:txBody>
-          <a:bodyPr/>
-          <a:lstStyle/>
-          <a:p>
-            <a:endParaRPr lang="en-US"/>
-          </a:p>
-        </p:txBody>
-      </p:sp>
-      <p:sp>
-        <p:nvSpPr>
-          <p:cNvPr id="7" name="Slide Number Placeholder 6">
-            <a:extLst>
-              <a:ext uri="{FF2B5EF4-FFF2-40B4-BE49-F238E27FC236}">
-                <a16:creationId xmlns:a16="http://schemas.microsoft.com/office/drawing/2014/main" id="{BFE176BF-BB86-034A-A983-4B4561D47222}"/>
-              </a:ext>
-            </a:extLst>
-          </p:cNvPr>
-          <p:cNvSpPr>
-            <a:spLocks noGrp="1"/>
-          </p:cNvSpPr>
-          <p:nvPr>
-            <p:ph type="sldNum" sz="quarter" idx="12"/>
-          </p:nvPr>
-        </p:nvSpPr>
-        <p:spPr/>
-        <p:txBody>
-          <a:bodyPr/>
-          <a:lstStyle/>
-          <a:p>
-            <a:fld id="{3F964A69-11D8-8245-B5C8-3C081DDCBFB6}" type="slidenum">
-              <a:rPr lang="en-US" smtClean="0"/>
-              <a:t>‹#›</a:t>
-            </a:fld>
-            <a:endParaRPr lang="en-US"/>
-          </a:p>
-        </p:txBody>
-      </p:sp>
-    </p:spTree>
-    <p:extLst>
-      <p:ext uri="{BB962C8B-B14F-4D97-AF65-F5344CB8AC3E}">
-        <p14:creationId xmlns:p14="http://schemas.microsoft.com/office/powerpoint/2010/main" val="2374412688"/>
-      </p:ext>
-    </p:extLst>
-  </p:cSld>
-  <p:clrMapOvr>
-    <a:masterClrMapping/>
-  </p:clrMapOvr>
-</p:sldLayout>
-</file>
-
-<file path=ppt/slideLayouts/slideLayout9.xml><?xml version="1.0" encoding="utf-8"?>
-<p:sldLayout xmlns:a="http://schemas.openxmlformats.org/drawingml/2006/main" xmlns:r="http://schemas.openxmlformats.org/officeDocument/2006/relationships" xmlns:p="http://schemas.openxmlformats.org/presentationml/2006/main" type="picTx" preserve="1">
-  <p:cSld name="Picture with Caption">
-    <p:spTree>
-      <p:nvGrpSpPr>
-        <p:cNvPr id="1" name=""/>
-        <p:cNvGrpSpPr/>
-        <p:nvPr/>
-      </p:nvGrpSpPr>
-      <p:grpSpPr>
-        <a:xfrm>
-          <a:off x="0" y="0"/>
-          <a:ext cx="0" cy="0"/>
-          <a:chOff x="0" y="0"/>
-          <a:chExt cx="0" cy="0"/>
-        </a:xfrm>
-      </p:grpSpPr>
-      <p:sp>
-        <p:nvSpPr>
-          <p:cNvPr id="2" name="Title 1">
-            <a:extLst>
-              <a:ext uri="{FF2B5EF4-FFF2-40B4-BE49-F238E27FC236}">
-                <a16:creationId xmlns:a16="http://schemas.microsoft.com/office/drawing/2014/main" id="{305A09A3-338E-1D49-A34D-88C9DBCB75A7}"/>
-              </a:ext>
-            </a:extLst>
-          </p:cNvPr>
-          <p:cNvSpPr>
-            <a:spLocks noGrp="1"/>
-          </p:cNvSpPr>
-          <p:nvPr>
-            <p:ph type="title"/>
-          </p:nvPr>
-        </p:nvSpPr>
-        <p:spPr>
-          <a:xfrm>
-            <a:off x="839788" y="457200"/>
-            <a:ext cx="3932237" cy="1600200"/>
-          </a:xfrm>
-        </p:spPr>
-        <p:txBody>
-          <a:bodyPr anchor="b"/>
-          <a:lstStyle>
-            <a:lvl1pPr>
-              <a:defRPr sz="3200"/>
-            </a:lvl1pPr>
-          </a:lstStyle>
-          <a:p>
-            <a:r>
-              <a:rPr lang="en-US"/>
-              <a:t>Click to edit Master title style</a:t>
-            </a:r>
-          </a:p>
-        </p:txBody>
-      </p:sp>
-      <p:sp>
-        <p:nvSpPr>
-          <p:cNvPr id="3" name="Picture Placeholder 2">
-            <a:extLst>
-              <a:ext uri="{FF2B5EF4-FFF2-40B4-BE49-F238E27FC236}">
-                <a16:creationId xmlns:a16="http://schemas.microsoft.com/office/drawing/2014/main" id="{1014EB70-D058-134D-BC68-8293D62DE5EF}"/>
-              </a:ext>
-            </a:extLst>
-          </p:cNvPr>
-          <p:cNvSpPr>
-            <a:spLocks noGrp="1"/>
-          </p:cNvSpPr>
-          <p:nvPr>
-            <p:ph type="pic" idx="1"/>
-          </p:nvPr>
-        </p:nvSpPr>
-        <p:spPr>
-          <a:xfrm>
-            <a:off x="5183188" y="987425"/>
-            <a:ext cx="6172200" cy="4873625"/>
-          </a:xfrm>
-        </p:spPr>
-        <p:txBody>
-          <a:bodyPr/>
-          <a:lstStyle>
-            <a:lvl1pPr marL="0" indent="0">
-              <a:buNone/>
-              <a:defRPr sz="3200"/>
-            </a:lvl1pPr>
-            <a:lvl2pPr marL="457200" indent="0">
-              <a:buNone/>
-              <a:defRPr sz="2800"/>
-            </a:lvl2pPr>
-            <a:lvl3pPr marL="914400" indent="0">
-              <a:buNone/>
-              <a:defRPr sz="2400"/>
-            </a:lvl3pPr>
-            <a:lvl4pPr marL="1371600" indent="0">
-              <a:buNone/>
-              <a:defRPr sz="2000"/>
-            </a:lvl4pPr>
-            <a:lvl5pPr marL="1828800" indent="0">
-              <a:buNone/>
-              <a:defRPr sz="2000"/>
-            </a:lvl5pPr>
-            <a:lvl6pPr marL="2286000" indent="0">
-              <a:buNone/>
-              <a:defRPr sz="2000"/>
-            </a:lvl6pPr>
-            <a:lvl7pPr marL="2743200" indent="0">
-              <a:buNone/>
-              <a:defRPr sz="2000"/>
-            </a:lvl7pPr>
-            <a:lvl8pPr marL="3200400" indent="0">
-              <a:buNone/>
-              <a:defRPr sz="2000"/>
-            </a:lvl8pPr>
-            <a:lvl9pPr marL="3657600" indent="0">
-              <a:buNone/>
-              <a:defRPr sz="2000"/>
-            </a:lvl9pPr>
-          </a:lstStyle>
-          <a:p>
-            <a:endParaRPr lang="en-US"/>
-          </a:p>
-        </p:txBody>
-      </p:sp>
-      <p:sp>
-        <p:nvSpPr>
-          <p:cNvPr id="4" name="Text Placeholder 3">
-            <a:extLst>
-              <a:ext uri="{FF2B5EF4-FFF2-40B4-BE49-F238E27FC236}">
-                <a16:creationId xmlns:a16="http://schemas.microsoft.com/office/drawing/2014/main" id="{01BB3734-2C17-D14E-8C62-35145BF84E1E}"/>
-              </a:ext>
-            </a:extLst>
-          </p:cNvPr>
-          <p:cNvSpPr>
-            <a:spLocks noGrp="1"/>
-          </p:cNvSpPr>
-          <p:nvPr>
-            <p:ph type="body" sz="half" idx="2"/>
-          </p:nvPr>
-        </p:nvSpPr>
-        <p:spPr>
-          <a:xfrm>
-            <a:off x="839788" y="2057400"/>
-            <a:ext cx="3932237" cy="3811588"/>
-          </a:xfrm>
-        </p:spPr>
-        <p:txBody>
-          <a:bodyPr/>
-          <a:lstStyle>
-            <a:lvl1pPr marL="0" indent="0">
-              <a:buNone/>
-              <a:defRPr sz="1600"/>
-            </a:lvl1pPr>
-            <a:lvl2pPr marL="457200" indent="0">
-              <a:buNone/>
-              <a:defRPr sz="1400"/>
-            </a:lvl2pPr>
-            <a:lvl3pPr marL="914400" indent="0">
-              <a:buNone/>
-              <a:defRPr sz="1200"/>
-            </a:lvl3pPr>
-            <a:lvl4pPr marL="1371600" indent="0">
-              <a:buNone/>
-              <a:defRPr sz="1000"/>
-            </a:lvl4pPr>
-            <a:lvl5pPr marL="1828800" indent="0">
-              <a:buNone/>
-              <a:defRPr sz="1000"/>
-            </a:lvl5pPr>
-            <a:lvl6pPr marL="2286000" indent="0">
-              <a:buNone/>
-              <a:defRPr sz="1000"/>
-            </a:lvl6pPr>
-            <a:lvl7pPr marL="2743200" indent="0">
-              <a:buNone/>
-              <a:defRPr sz="1000"/>
-            </a:lvl7pPr>
-            <a:lvl8pPr marL="3200400" indent="0">
-              <a:buNone/>
-              <a:defRPr sz="1000"/>
-            </a:lvl8pPr>
-            <a:lvl9pPr marL="3657600" indent="0">
-              <a:buNone/>
-              <a:defRPr sz="1000"/>
-            </a:lvl9pPr>
-          </a:lstStyle>
-          <a:p>
-            <a:pPr lvl="0"/>
-            <a:r>
-              <a:rPr lang="en-US"/>
-              <a:t>Edit Master text styles</a:t>
-            </a:r>
-          </a:p>
-        </p:txBody>
-      </p:sp>
-      <p:sp>
-        <p:nvSpPr>
-          <p:cNvPr id="5" name="Date Placeholder 4">
-            <a:extLst>
-              <a:ext uri="{FF2B5EF4-FFF2-40B4-BE49-F238E27FC236}">
-                <a16:creationId xmlns:a16="http://schemas.microsoft.com/office/drawing/2014/main" id="{EB376BA9-0FDB-704C-B517-1409AE298FE2}"/>
-              </a:ext>
-            </a:extLst>
-          </p:cNvPr>
-          <p:cNvSpPr>
-            <a:spLocks noGrp="1"/>
-          </p:cNvSpPr>
-          <p:nvPr>
-            <p:ph type="dt" sz="half" idx="10"/>
-          </p:nvPr>
-        </p:nvSpPr>
-        <p:spPr/>
-        <p:txBody>
-          <a:bodyPr/>
-          <a:lstStyle/>
-          <a:p>
-            <a:fld id="{C5F3B386-61D0-A542-9BBD-24895FFB08D6}" type="datetimeFigureOut">
-              <a:rPr lang="en-US" smtClean="0"/>
-              <a:t>5/29/20</a:t>
-            </a:fld>
-            <a:endParaRPr lang="en-US"/>
-          </a:p>
-        </p:txBody>
-      </p:sp>
-      <p:sp>
-        <p:nvSpPr>
-          <p:cNvPr id="6" name="Footer Placeholder 5">
-            <a:extLst>
-              <a:ext uri="{FF2B5EF4-FFF2-40B4-BE49-F238E27FC236}">
-                <a16:creationId xmlns:a16="http://schemas.microsoft.com/office/drawing/2014/main" id="{07B829AA-31EC-1F4A-8190-42F0FC58092C}"/>
-              </a:ext>
-            </a:extLst>
-          </p:cNvPr>
-          <p:cNvSpPr>
-            <a:spLocks noGrp="1"/>
-          </p:cNvSpPr>
-          <p:nvPr>
-            <p:ph type="ftr" sz="quarter" idx="11"/>
-          </p:nvPr>
-        </p:nvSpPr>
-        <p:spPr/>
-        <p:txBody>
-          <a:bodyPr/>
-          <a:lstStyle/>
-          <a:p>
-            <a:endParaRPr lang="en-US"/>
-          </a:p>
-        </p:txBody>
-      </p:sp>
-      <p:sp>
-        <p:nvSpPr>
-          <p:cNvPr id="7" name="Slide Number Placeholder 6">
-            <a:extLst>
-              <a:ext uri="{FF2B5EF4-FFF2-40B4-BE49-F238E27FC236}">
-                <a16:creationId xmlns:a16="http://schemas.microsoft.com/office/drawing/2014/main" id="{950949CB-27C0-9C4A-897A-29C7C7F2784D}"/>
-              </a:ext>
-            </a:extLst>
-          </p:cNvPr>
-          <p:cNvSpPr>
-            <a:spLocks noGrp="1"/>
-          </p:cNvSpPr>
-          <p:nvPr>
-            <p:ph type="sldNum" sz="quarter" idx="12"/>
-          </p:nvPr>
-        </p:nvSpPr>
-        <p:spPr/>
-        <p:txBody>
-          <a:bodyPr/>
-          <a:lstStyle/>
-          <a:p>
-            <a:fld id="{3F964A69-11D8-8245-B5C8-3C081DDCBFB6}" type="slidenum">
-              <a:rPr lang="en-US" smtClean="0"/>
-              <a:t>‹#›</a:t>
-            </a:fld>
-            <a:endParaRPr lang="en-US"/>
-          </a:p>
-        </p:txBody>
-      </p:sp>
-    </p:spTree>
-    <p:extLst>
-      <p:ext uri="{BB962C8B-B14F-4D97-AF65-F5344CB8AC3E}">
-        <p14:creationId xmlns:p14="http://schemas.microsoft.com/office/powerpoint/2010/main" val="2102812620"/>
-      </p:ext>
-    </p:extLst>
-  </p:cSld>
-  <p:clrMapOvr>
-    <a:masterClrMapping/>
-  </p:clrMapOvr>
-</p:sldLayout>
-</file>
-
 <file path=ppt/slideMasters/slideMaster1.xml><?xml version="1.0" encoding="utf-8"?>
 <p:sldMaster xmlns:a="http://schemas.openxmlformats.org/drawingml/2006/main" xmlns:r="http://schemas.openxmlformats.org/officeDocument/2006/relationships" xmlns:p="http://schemas.openxmlformats.org/presentationml/2006/main">
   <p:cSld>
     <p:bg>
-      <p:bgRef idx="1001">
-        <a:schemeClr val="bg1"/>
-      </p:bgRef>
+      <p:bgPr>
+        <a:solidFill>
+          <a:schemeClr val="tx2"/>
+        </a:solidFill>
+        <a:effectLst/>
+      </p:bgPr>
     </p:bg>
     <p:spTree>
       <p:nvGrpSpPr>
@@ -2910,9 +703,7 @@
             <a:lvl1pPr algn="l">
               <a:defRPr sz="1200">
                 <a:solidFill>
-                  <a:schemeClr val="tx1">
-                    <a:tint val="75000"/>
-                  </a:schemeClr>
+                  <a:schemeClr val="bg1"/>
                 </a:solidFill>
               </a:defRPr>
             </a:lvl1pPr>
@@ -2920,7 +711,8 @@
           <a:p>
             <a:fld id="{C5F3B386-61D0-A542-9BBD-24895FFB08D6}" type="datetimeFigureOut">
               <a:rPr lang="en-US" smtClean="0"/>
-              <a:t>5/29/20</a:t>
+              <a:pPr/>
+              <a:t>6/2/20</a:t>
             </a:fld>
             <a:endParaRPr lang="en-US"/>
           </a:p>
@@ -2957,9 +749,7 @@
             <a:lvl1pPr algn="ctr">
               <a:defRPr sz="1200">
                 <a:solidFill>
-                  <a:schemeClr val="tx1">
-                    <a:tint val="75000"/>
-                  </a:schemeClr>
+                  <a:schemeClr val="bg1"/>
                 </a:solidFill>
               </a:defRPr>
             </a:lvl1pPr>
@@ -3000,9 +790,7 @@
             <a:lvl1pPr algn="r">
               <a:defRPr sz="1200">
                 <a:solidFill>
-                  <a:schemeClr val="tx1">
-                    <a:tint val="75000"/>
-                  </a:schemeClr>
+                  <a:schemeClr val="bg1"/>
                 </a:solidFill>
               </a:defRPr>
             </a:lvl1pPr>
@@ -3010,6 +798,7 @@
           <a:p>
             <a:fld id="{3F964A69-11D8-8245-B5C8-3C081DDCBFB6}" type="slidenum">
               <a:rPr lang="en-US" smtClean="0"/>
+              <a:pPr/>
               <a:t>‹#›</a:t>
             </a:fld>
             <a:endParaRPr lang="en-US"/>
@@ -3027,15 +816,6 @@
   <p:sldLayoutIdLst>
     <p:sldLayoutId id="2147483649" r:id="rId1"/>
     <p:sldLayoutId id="2147483650" r:id="rId2"/>
-    <p:sldLayoutId id="2147483651" r:id="rId3"/>
-    <p:sldLayoutId id="2147483652" r:id="rId4"/>
-    <p:sldLayoutId id="2147483653" r:id="rId5"/>
-    <p:sldLayoutId id="2147483654" r:id="rId6"/>
-    <p:sldLayoutId id="2147483655" r:id="rId7"/>
-    <p:sldLayoutId id="2147483656" r:id="rId8"/>
-    <p:sldLayoutId id="2147483657" r:id="rId9"/>
-    <p:sldLayoutId id="2147483658" r:id="rId10"/>
-    <p:sldLayoutId id="2147483659" r:id="rId11"/>
   </p:sldLayoutIdLst>
   <p:txStyles>
     <p:titleStyle>
@@ -3049,7 +829,7 @@
         <a:buNone/>
         <a:defRPr sz="4400" kern="1200">
           <a:solidFill>
-            <a:schemeClr val="tx1"/>
+            <a:schemeClr val="bg1"/>
           </a:solidFill>
           <a:latin typeface="+mj-lt"/>
           <a:ea typeface="+mj-ea"/>
@@ -3069,7 +849,7 @@
         <a:buChar char="•"/>
         <a:defRPr sz="2800" kern="1200">
           <a:solidFill>
-            <a:schemeClr val="tx1"/>
+            <a:schemeClr val="bg1"/>
           </a:solidFill>
           <a:latin typeface="+mn-lt"/>
           <a:ea typeface="+mn-ea"/>
@@ -3087,7 +867,7 @@
         <a:buChar char="•"/>
         <a:defRPr sz="2400" kern="1200">
           <a:solidFill>
-            <a:schemeClr val="tx1"/>
+            <a:schemeClr val="bg1"/>
           </a:solidFill>
           <a:latin typeface="+mn-lt"/>
           <a:ea typeface="+mn-ea"/>
@@ -3105,7 +885,7 @@
         <a:buChar char="•"/>
         <a:defRPr sz="2000" kern="1200">
           <a:solidFill>
-            <a:schemeClr val="tx1"/>
+            <a:schemeClr val="bg1"/>
           </a:solidFill>
           <a:latin typeface="+mn-lt"/>
           <a:ea typeface="+mn-ea"/>
@@ -3123,7 +903,7 @@
         <a:buChar char="•"/>
         <a:defRPr sz="1800" kern="1200">
           <a:solidFill>
-            <a:schemeClr val="tx1"/>
+            <a:schemeClr val="bg1"/>
           </a:solidFill>
           <a:latin typeface="+mn-lt"/>
           <a:ea typeface="+mn-ea"/>
@@ -3141,7 +921,7 @@
         <a:buChar char="•"/>
         <a:defRPr sz="1800" kern="1200">
           <a:solidFill>
-            <a:schemeClr val="tx1"/>
+            <a:schemeClr val="bg1"/>
           </a:solidFill>
           <a:latin typeface="+mn-lt"/>
           <a:ea typeface="+mn-ea"/>
@@ -3380,7 +1160,11 @@
           <a:p>
             <a:pPr algn="ctr"/>
             <a:r>
-              <a:rPr lang="en-US" sz="1200" dirty="0"/>
+              <a:rPr lang="en-US" sz="1200" dirty="0">
+                <a:solidFill>
+                  <a:schemeClr val="bg1"/>
+                </a:solidFill>
+              </a:rPr>
               <a:t>User login</a:t>
             </a:r>
           </a:p>
@@ -3471,7 +1255,11 @@
           <a:p>
             <a:pPr algn="ctr"/>
             <a:r>
-              <a:rPr lang="en-US" sz="1200" dirty="0"/>
+              <a:rPr lang="en-US" sz="1200" dirty="0">
+                <a:solidFill>
+                  <a:schemeClr val="bg1"/>
+                </a:solidFill>
+              </a:rPr>
               <a:t>Check cart for the user</a:t>
             </a:r>
           </a:p>
@@ -3520,7 +1308,11 @@
           <a:p>
             <a:pPr algn="ctr"/>
             <a:r>
-              <a:rPr lang="en-US" sz="1200" dirty="0"/>
+              <a:rPr lang="en-US" sz="1200" dirty="0">
+                <a:solidFill>
+                  <a:schemeClr val="bg1"/>
+                </a:solidFill>
+              </a:rPr>
               <a:t>Set cart session</a:t>
             </a:r>
           </a:p>
@@ -3569,7 +1361,11 @@
           <a:p>
             <a:pPr algn="ctr"/>
             <a:r>
-              <a:rPr lang="en-US" sz="1200" dirty="0"/>
+              <a:rPr lang="en-US" sz="1200" dirty="0">
+                <a:solidFill>
+                  <a:schemeClr val="bg1"/>
+                </a:solidFill>
+              </a:rPr>
               <a:t>Retrieve the cart from the database</a:t>
             </a:r>
           </a:p>
@@ -3618,7 +1414,11 @@
           <a:p>
             <a:pPr algn="ctr"/>
             <a:r>
-              <a:rPr lang="en-US" sz="1200" dirty="0"/>
+              <a:rPr lang="en-US" sz="1200" dirty="0">
+                <a:solidFill>
+                  <a:schemeClr val="bg1"/>
+                </a:solidFill>
+              </a:rPr>
               <a:t>User logout</a:t>
             </a:r>
           </a:p>
@@ -3667,7 +1467,11 @@
           <a:p>
             <a:pPr algn="ctr"/>
             <a:r>
-              <a:rPr lang="en-US" sz="1200" dirty="0"/>
+              <a:rPr lang="en-US" sz="1200" dirty="0">
+                <a:solidFill>
+                  <a:schemeClr val="bg1"/>
+                </a:solidFill>
+              </a:rPr>
               <a:t>All session invalidate</a:t>
             </a:r>
           </a:p>
@@ -3715,7 +1519,11 @@
           <a:lstStyle/>
           <a:p>
             <a:r>
-              <a:rPr lang="en-US" sz="1200" dirty="0"/>
+              <a:rPr lang="en-US" sz="1200" dirty="0">
+                <a:solidFill>
+                  <a:schemeClr val="bg1"/>
+                </a:solidFill>
+              </a:rPr>
               <a:t>DB:</a:t>
             </a:r>
           </a:p>
@@ -3725,15 +1533,27 @@
               <a:buChar char="•"/>
             </a:pPr>
             <a:r>
-              <a:rPr lang="en-US" sz="1200" dirty="0"/>
+              <a:rPr lang="en-US" sz="1200" dirty="0">
+                <a:solidFill>
+                  <a:schemeClr val="bg1"/>
+                </a:solidFill>
+              </a:rPr>
               <a:t>Cart: </a:t>
             </a:r>
             <a:r>
-              <a:rPr lang="en-US" sz="1200" dirty="0" err="1"/>
+              <a:rPr lang="en-US" sz="1200" dirty="0" err="1">
+                <a:solidFill>
+                  <a:schemeClr val="bg1"/>
+                </a:solidFill>
+              </a:rPr>
               <a:t>isOrdered</a:t>
             </a:r>
             <a:r>
-              <a:rPr lang="en-US" sz="1200" dirty="0"/>
+              <a:rPr lang="en-US" sz="1200" dirty="0">
+                <a:solidFill>
+                  <a:schemeClr val="bg1"/>
+                </a:solidFill>
+              </a:rPr>
               <a:t> =1;</a:t>
             </a:r>
           </a:p>
@@ -3743,7 +1563,11 @@
               <a:buChar char="•"/>
             </a:pPr>
             <a:r>
-              <a:rPr lang="en-US" sz="1200" dirty="0"/>
+              <a:rPr lang="en-US" sz="1200" dirty="0">
+                <a:solidFill>
+                  <a:schemeClr val="bg1"/>
+                </a:solidFill>
+              </a:rPr>
               <a:t>Books: delete the corresponding cart from DB</a:t>
             </a:r>
           </a:p>
@@ -3792,36 +1616,64 @@
           <a:p>
             <a:pPr algn="ctr"/>
             <a:r>
-              <a:rPr lang="en-US" sz="1200" dirty="0"/>
+              <a:rPr lang="en-US" sz="1200" dirty="0">
+                <a:solidFill>
+                  <a:schemeClr val="bg1"/>
+                </a:solidFill>
+              </a:rPr>
               <a:t>Order:</a:t>
             </a:r>
           </a:p>
           <a:p>
             <a:pPr algn="ctr"/>
             <a:r>
-              <a:rPr lang="en-US" sz="1200" dirty="0" err="1"/>
+              <a:rPr lang="en-US" sz="1200" dirty="0" err="1">
+                <a:solidFill>
+                  <a:schemeClr val="bg1"/>
+                </a:solidFill>
+              </a:rPr>
               <a:t>orderID</a:t>
             </a:r>
-            <a:endParaRPr lang="en-US" sz="1200" dirty="0"/>
-          </a:p>
-          <a:p>
-            <a:pPr algn="ctr"/>
-            <a:endParaRPr lang="en-US" sz="1200" dirty="0"/>
-          </a:p>
-          <a:p>
-            <a:pPr algn="ctr"/>
-            <a:r>
-              <a:rPr lang="en-US" sz="1200" dirty="0"/>
+            <a:endParaRPr lang="en-US" sz="1200" dirty="0">
+              <a:solidFill>
+                <a:schemeClr val="bg1"/>
+              </a:solidFill>
+            </a:endParaRPr>
+          </a:p>
+          <a:p>
+            <a:pPr algn="ctr"/>
+            <a:endParaRPr lang="en-US" sz="1200" dirty="0">
+              <a:solidFill>
+                <a:schemeClr val="bg1"/>
+              </a:solidFill>
+            </a:endParaRPr>
+          </a:p>
+          <a:p>
+            <a:pPr algn="ctr"/>
+            <a:r>
+              <a:rPr lang="en-US" sz="1200" dirty="0">
+                <a:solidFill>
+                  <a:schemeClr val="bg1"/>
+                </a:solidFill>
+              </a:rPr>
               <a:t>username</a:t>
             </a:r>
           </a:p>
           <a:p>
             <a:pPr algn="ctr"/>
             <a:r>
-              <a:rPr lang="en-US" sz="1200" dirty="0" err="1"/>
+              <a:rPr lang="en-US" sz="1200" dirty="0" err="1">
+                <a:solidFill>
+                  <a:schemeClr val="bg1"/>
+                </a:solidFill>
+              </a:rPr>
               <a:t>invoiceID</a:t>
             </a:r>
-            <a:endParaRPr lang="en-US" sz="1200" dirty="0"/>
+            <a:endParaRPr lang="en-US" sz="1200" dirty="0">
+              <a:solidFill>
+                <a:schemeClr val="bg1"/>
+              </a:solidFill>
+            </a:endParaRPr>
           </a:p>
         </p:txBody>
       </p:sp>
@@ -3868,45 +1720,85 @@
           <a:p>
             <a:pPr algn="ctr"/>
             <a:r>
-              <a:rPr lang="en-US" sz="1200" dirty="0"/>
+              <a:rPr lang="en-US" sz="1200" dirty="0">
+                <a:solidFill>
+                  <a:schemeClr val="bg1"/>
+                </a:solidFill>
+              </a:rPr>
               <a:t>Invoice:</a:t>
             </a:r>
           </a:p>
           <a:p>
             <a:pPr algn="ctr"/>
             <a:r>
-              <a:rPr lang="en-US" sz="1200" dirty="0" err="1"/>
+              <a:rPr lang="en-US" sz="1200" dirty="0" err="1">
+                <a:solidFill>
+                  <a:schemeClr val="bg1"/>
+                </a:solidFill>
+              </a:rPr>
               <a:t>invoiceID</a:t>
             </a:r>
-            <a:endParaRPr lang="en-US" sz="1200" dirty="0"/>
-          </a:p>
-          <a:p>
-            <a:pPr algn="ctr"/>
-            <a:endParaRPr lang="en-US" sz="1200" dirty="0"/>
-          </a:p>
-          <a:p>
-            <a:pPr algn="ctr"/>
-            <a:r>
-              <a:rPr lang="en-US" sz="1200" dirty="0" err="1"/>
+            <a:endParaRPr lang="en-US" sz="1200" dirty="0">
+              <a:solidFill>
+                <a:schemeClr val="bg1"/>
+              </a:solidFill>
+            </a:endParaRPr>
+          </a:p>
+          <a:p>
+            <a:pPr algn="ctr"/>
+            <a:endParaRPr lang="en-US" sz="1200" dirty="0">
+              <a:solidFill>
+                <a:schemeClr val="bg1"/>
+              </a:solidFill>
+            </a:endParaRPr>
+          </a:p>
+          <a:p>
+            <a:pPr algn="ctr"/>
+            <a:r>
+              <a:rPr lang="en-US" sz="1200" dirty="0" err="1">
+                <a:solidFill>
+                  <a:schemeClr val="bg1"/>
+                </a:solidFill>
+              </a:rPr>
               <a:t>cartID</a:t>
             </a:r>
-            <a:endParaRPr lang="en-US" sz="1200" dirty="0"/>
-          </a:p>
-          <a:p>
-            <a:pPr algn="ctr"/>
-            <a:r>
-              <a:rPr lang="en-US" sz="1200" dirty="0" err="1"/>
+            <a:endParaRPr lang="en-US" sz="1200" dirty="0">
+              <a:solidFill>
+                <a:schemeClr val="bg1"/>
+              </a:solidFill>
+            </a:endParaRPr>
+          </a:p>
+          <a:p>
+            <a:pPr algn="ctr"/>
+            <a:r>
+              <a:rPr lang="en-US" sz="1200" dirty="0" err="1">
+                <a:solidFill>
+                  <a:schemeClr val="bg1"/>
+                </a:solidFill>
+              </a:rPr>
               <a:t>ContactID</a:t>
             </a:r>
-            <a:endParaRPr lang="en-US" sz="1200" dirty="0"/>
-          </a:p>
-          <a:p>
-            <a:pPr algn="ctr"/>
-            <a:r>
-              <a:rPr lang="en-US" sz="1200" dirty="0" err="1"/>
+            <a:endParaRPr lang="en-US" sz="1200" dirty="0">
+              <a:solidFill>
+                <a:schemeClr val="bg1"/>
+              </a:solidFill>
+            </a:endParaRPr>
+          </a:p>
+          <a:p>
+            <a:pPr algn="ctr"/>
+            <a:r>
+              <a:rPr lang="en-US" sz="1200" dirty="0" err="1">
+                <a:solidFill>
+                  <a:schemeClr val="bg1"/>
+                </a:solidFill>
+              </a:rPr>
               <a:t>creditID</a:t>
             </a:r>
-            <a:endParaRPr lang="en-US" sz="1200" dirty="0"/>
+            <a:endParaRPr lang="en-US" sz="1200" dirty="0">
+              <a:solidFill>
+                <a:schemeClr val="bg1"/>
+              </a:solidFill>
+            </a:endParaRPr>
           </a:p>
         </p:txBody>
       </p:sp>
@@ -3953,33 +1845,57 @@
           <a:p>
             <a:pPr algn="ctr"/>
             <a:r>
-              <a:rPr lang="en-US" sz="1200" dirty="0"/>
+              <a:rPr lang="en-US" sz="1200" dirty="0">
+                <a:solidFill>
+                  <a:schemeClr val="bg1"/>
+                </a:solidFill>
+              </a:rPr>
               <a:t>User:</a:t>
             </a:r>
           </a:p>
           <a:p>
             <a:pPr algn="ctr"/>
             <a:r>
-              <a:rPr lang="en-US" sz="1200" dirty="0"/>
+              <a:rPr lang="en-US" sz="1200" dirty="0">
+                <a:solidFill>
+                  <a:schemeClr val="bg1"/>
+                </a:solidFill>
+              </a:rPr>
               <a:t>username</a:t>
             </a:r>
           </a:p>
           <a:p>
             <a:pPr algn="ctr"/>
-            <a:endParaRPr lang="en-US" sz="1200" dirty="0"/>
-          </a:p>
-          <a:p>
-            <a:pPr algn="ctr"/>
-            <a:r>
-              <a:rPr lang="en-US" sz="1200" dirty="0" err="1"/>
+            <a:endParaRPr lang="en-US" sz="1200" dirty="0">
+              <a:solidFill>
+                <a:schemeClr val="bg1"/>
+              </a:solidFill>
+            </a:endParaRPr>
+          </a:p>
+          <a:p>
+            <a:pPr algn="ctr"/>
+            <a:r>
+              <a:rPr lang="en-US" sz="1200" dirty="0" err="1">
+                <a:solidFill>
+                  <a:schemeClr val="bg1"/>
+                </a:solidFill>
+              </a:rPr>
               <a:t>Hashpassword</a:t>
             </a:r>
-            <a:endParaRPr lang="en-US" sz="1200" dirty="0"/>
-          </a:p>
-          <a:p>
-            <a:pPr algn="ctr"/>
-            <a:r>
-              <a:rPr lang="en-US" sz="1200" dirty="0"/>
+            <a:endParaRPr lang="en-US" sz="1200" dirty="0">
+              <a:solidFill>
+                <a:schemeClr val="bg1"/>
+              </a:solidFill>
+            </a:endParaRPr>
+          </a:p>
+          <a:p>
+            <a:pPr algn="ctr"/>
+            <a:r>
+              <a:rPr lang="en-US" sz="1200" dirty="0">
+                <a:solidFill>
+                  <a:schemeClr val="bg1"/>
+                </a:solidFill>
+              </a:rPr>
               <a:t>salt</a:t>
             </a:r>
           </a:p>
@@ -4028,24 +1944,40 @@
           <a:p>
             <a:pPr algn="ctr"/>
             <a:r>
-              <a:rPr lang="en-US" sz="1200" dirty="0"/>
+              <a:rPr lang="en-US" sz="1200" dirty="0">
+                <a:solidFill>
+                  <a:schemeClr val="bg1"/>
+                </a:solidFill>
+              </a:rPr>
               <a:t>Cart</a:t>
             </a:r>
           </a:p>
           <a:p>
             <a:pPr algn="ctr"/>
             <a:r>
-              <a:rPr lang="en-US" sz="1200" dirty="0"/>
+              <a:rPr lang="en-US" sz="1200" dirty="0">
+                <a:solidFill>
+                  <a:schemeClr val="bg1"/>
+                </a:solidFill>
+              </a:rPr>
               <a:t>PK: Id</a:t>
             </a:r>
           </a:p>
           <a:p>
             <a:pPr algn="ctr"/>
             <a:r>
-              <a:rPr lang="en-US" sz="1200" dirty="0" err="1"/>
+              <a:rPr lang="en-US" sz="1200" dirty="0" err="1">
+                <a:solidFill>
+                  <a:schemeClr val="bg1"/>
+                </a:solidFill>
+              </a:rPr>
               <a:t>PK:cartID</a:t>
             </a:r>
-            <a:endParaRPr lang="en-US" sz="1200" dirty="0"/>
+            <a:endParaRPr lang="en-US" sz="1200" dirty="0">
+              <a:solidFill>
+                <a:schemeClr val="bg1"/>
+              </a:solidFill>
+            </a:endParaRPr>
           </a:p>
         </p:txBody>
       </p:sp>
@@ -4092,7 +2024,11 @@
           <a:p>
             <a:pPr algn="ctr"/>
             <a:r>
-              <a:rPr lang="en-US" sz="1200" dirty="0"/>
+              <a:rPr lang="en-US" sz="1200" dirty="0">
+                <a:solidFill>
+                  <a:schemeClr val="bg1"/>
+                </a:solidFill>
+              </a:rPr>
               <a:t>contact</a:t>
             </a:r>
           </a:p>
@@ -4141,7 +2077,11 @@
           <a:p>
             <a:pPr algn="ctr"/>
             <a:r>
-              <a:rPr lang="en-US" sz="1200" dirty="0"/>
+              <a:rPr lang="en-US" sz="1200" dirty="0">
+                <a:solidFill>
+                  <a:schemeClr val="bg1"/>
+                </a:solidFill>
+              </a:rPr>
               <a:t>credit</a:t>
             </a:r>
           </a:p>
@@ -4274,7 +2214,11 @@
           <a:lstStyle/>
           <a:p>
             <a:pPr algn="ctr"/>
-            <a:endParaRPr lang="en-US"/>
+            <a:endParaRPr lang="en-US">
+              <a:solidFill>
+                <a:schemeClr val="bg1"/>
+              </a:solidFill>
+            </a:endParaRPr>
           </a:p>
         </p:txBody>
       </p:sp>
@@ -4321,35 +2265,55 @@
           <a:p>
             <a:pPr algn="ctr"/>
             <a:r>
-              <a:rPr lang="en-US" sz="1200" dirty="0"/>
+              <a:rPr lang="en-US" sz="1200" dirty="0">
+                <a:solidFill>
+                  <a:schemeClr val="bg1"/>
+                </a:solidFill>
+              </a:rPr>
               <a:t>DB </a:t>
             </a:r>
           </a:p>
           <a:p>
             <a:pPr algn="ctr"/>
             <a:r>
-              <a:rPr lang="en-US" sz="1200" dirty="0"/>
+              <a:rPr lang="en-US" sz="1200" dirty="0">
+                <a:solidFill>
+                  <a:schemeClr val="bg1"/>
+                </a:solidFill>
+              </a:rPr>
               <a:t>Search</a:t>
             </a:r>
           </a:p>
           <a:p>
             <a:pPr algn="ctr"/>
             <a:r>
-              <a:rPr lang="en-US" sz="1200" dirty="0"/>
+              <a:rPr lang="en-US" sz="1200" dirty="0">
+                <a:solidFill>
+                  <a:schemeClr val="bg1"/>
+                </a:solidFill>
+              </a:rPr>
               <a:t>Update</a:t>
             </a:r>
           </a:p>
           <a:p>
             <a:pPr algn="ctr"/>
             <a:r>
-              <a:rPr lang="en-US" sz="1200" dirty="0"/>
+              <a:rPr lang="en-US" sz="1200" dirty="0">
+                <a:solidFill>
+                  <a:schemeClr val="bg1"/>
+                </a:solidFill>
+              </a:rPr>
               <a:t>Delete</a:t>
             </a:r>
           </a:p>
           <a:p>
             <a:pPr algn="ctr"/>
             <a:r>
-              <a:rPr lang="en-US" sz="1200" dirty="0"/>
+              <a:rPr lang="en-US" sz="1200" dirty="0">
+                <a:solidFill>
+                  <a:schemeClr val="bg1"/>
+                </a:solidFill>
+              </a:rPr>
               <a:t>Insert</a:t>
             </a:r>
           </a:p>
@@ -4384,7 +2348,11 @@
           <a:lstStyle/>
           <a:p>
             <a:r>
-              <a:rPr lang="en-US" dirty="0"/>
+              <a:rPr lang="en-US" dirty="0">
+                <a:solidFill>
+                  <a:schemeClr val="bg1"/>
+                </a:solidFill>
+              </a:rPr>
               <a:t>view</a:t>
             </a:r>
           </a:p>
@@ -4419,7 +2387,11 @@
           <a:lstStyle/>
           <a:p>
             <a:r>
-              <a:rPr lang="en-US" dirty="0"/>
+              <a:rPr lang="en-US" dirty="0">
+                <a:solidFill>
+                  <a:schemeClr val="bg1"/>
+                </a:solidFill>
+              </a:rPr>
               <a:t>data</a:t>
             </a:r>
           </a:p>
@@ -4468,7 +2440,11 @@
           <a:p>
             <a:pPr algn="ctr"/>
             <a:r>
-              <a:rPr lang="en-US" sz="1200" dirty="0"/>
+              <a:rPr lang="en-US" sz="1200" dirty="0">
+                <a:solidFill>
+                  <a:schemeClr val="bg1"/>
+                </a:solidFill>
+              </a:rPr>
               <a:t>user</a:t>
             </a:r>
           </a:p>
@@ -4517,7 +2493,11 @@
           <a:p>
             <a:pPr algn="ctr"/>
             <a:r>
-              <a:rPr lang="en-US" sz="1200" dirty="0"/>
+              <a:rPr lang="en-US" sz="1200" dirty="0">
+                <a:solidFill>
+                  <a:schemeClr val="bg1"/>
+                </a:solidFill>
+              </a:rPr>
               <a:t>order</a:t>
             </a:r>
           </a:p>
@@ -4566,7 +2546,11 @@
           <a:p>
             <a:pPr algn="ctr"/>
             <a:r>
-              <a:rPr lang="en-US" sz="1200" dirty="0"/>
+              <a:rPr lang="en-US" sz="1200" dirty="0">
+                <a:solidFill>
+                  <a:schemeClr val="bg1"/>
+                </a:solidFill>
+              </a:rPr>
               <a:t>cart</a:t>
             </a:r>
           </a:p>
@@ -4615,7 +2599,11 @@
           <a:p>
             <a:pPr algn="ctr"/>
             <a:r>
-              <a:rPr lang="en-US" sz="1200" dirty="0"/>
+              <a:rPr lang="en-US" sz="1200" dirty="0">
+                <a:solidFill>
+                  <a:schemeClr val="bg1"/>
+                </a:solidFill>
+              </a:rPr>
               <a:t>contact</a:t>
             </a:r>
           </a:p>
@@ -4664,7 +2652,11 @@
           <a:p>
             <a:pPr algn="ctr"/>
             <a:r>
-              <a:rPr lang="en-US" sz="1200" dirty="0"/>
+              <a:rPr lang="en-US" sz="1200" dirty="0">
+                <a:solidFill>
+                  <a:schemeClr val="bg1"/>
+                </a:solidFill>
+              </a:rPr>
               <a:t>credit</a:t>
             </a:r>
           </a:p>
@@ -4713,7 +2705,11 @@
           <a:p>
             <a:pPr algn="ctr"/>
             <a:r>
-              <a:rPr lang="en-US" sz="1200" dirty="0"/>
+              <a:rPr lang="en-US" sz="1200" dirty="0">
+                <a:solidFill>
+                  <a:schemeClr val="bg1"/>
+                </a:solidFill>
+              </a:rPr>
               <a:t>cart</a:t>
             </a:r>
           </a:p>
@@ -4762,7 +2758,11 @@
           <a:p>
             <a:pPr algn="ctr"/>
             <a:r>
-              <a:rPr lang="en-US" sz="1200" dirty="0"/>
+              <a:rPr lang="en-US" sz="1200" dirty="0">
+                <a:solidFill>
+                  <a:schemeClr val="bg1"/>
+                </a:solidFill>
+              </a:rPr>
               <a:t>admin</a:t>
             </a:r>
           </a:p>
@@ -4811,7 +2811,11 @@
           <a:p>
             <a:pPr algn="ctr"/>
             <a:r>
-              <a:rPr lang="en-US" sz="1200" dirty="0"/>
+              <a:rPr lang="en-US" sz="1200" dirty="0">
+                <a:solidFill>
+                  <a:schemeClr val="bg1"/>
+                </a:solidFill>
+              </a:rPr>
               <a:t>order</a:t>
             </a:r>
           </a:p>
@@ -4846,7 +2850,11 @@
           <a:lstStyle/>
           <a:p>
             <a:r>
-              <a:rPr lang="en-US" dirty="0"/>
+              <a:rPr lang="en-US" dirty="0">
+                <a:solidFill>
+                  <a:schemeClr val="bg1"/>
+                </a:solidFill>
+              </a:rPr>
               <a:t>business</a:t>
             </a:r>
           </a:p>
@@ -4895,7 +2903,11 @@
           <a:p>
             <a:pPr algn="ctr"/>
             <a:r>
-              <a:rPr lang="en-US" sz="1200" dirty="0"/>
+              <a:rPr lang="en-US" sz="1200" dirty="0">
+                <a:solidFill>
+                  <a:schemeClr val="bg1"/>
+                </a:solidFill>
+              </a:rPr>
               <a:t>guest</a:t>
             </a:r>
           </a:p>
@@ -4944,7 +2956,11 @@
           <a:p>
             <a:pPr algn="ctr"/>
             <a:r>
-              <a:rPr lang="en-US" sz="1200" dirty="0"/>
+              <a:rPr lang="en-US" sz="1200" dirty="0">
+                <a:solidFill>
+                  <a:schemeClr val="bg1"/>
+                </a:solidFill>
+              </a:rPr>
               <a:t>View product</a:t>
             </a:r>
           </a:p>
@@ -4993,22 +3009,38 @@
           <a:p>
             <a:pPr algn="ctr"/>
             <a:r>
-              <a:rPr lang="en-US" sz="1200" dirty="0"/>
+              <a:rPr lang="en-US" sz="1200" dirty="0">
+                <a:solidFill>
+                  <a:schemeClr val="bg1"/>
+                </a:solidFill>
+              </a:rPr>
               <a:t>Create </a:t>
             </a:r>
             <a:r>
-              <a:rPr lang="en-US" sz="1200" dirty="0" err="1"/>
+              <a:rPr lang="en-US" sz="1200" dirty="0" err="1">
+                <a:solidFill>
+                  <a:schemeClr val="bg1"/>
+                </a:solidFill>
+              </a:rPr>
               <a:t>cartID</a:t>
             </a:r>
             <a:r>
-              <a:rPr lang="en-US" sz="1200" dirty="0"/>
+              <a:rPr lang="en-US" sz="1200" dirty="0">
+                <a:solidFill>
+                  <a:schemeClr val="bg1"/>
+                </a:solidFill>
+              </a:rPr>
               <a:t> </a:t>
             </a:r>
           </a:p>
           <a:p>
             <a:pPr algn="ctr"/>
             <a:r>
-              <a:rPr lang="en-US" sz="1200" dirty="0"/>
+              <a:rPr lang="en-US" sz="1200" dirty="0">
+                <a:solidFill>
+                  <a:schemeClr val="bg1"/>
+                </a:solidFill>
+              </a:rPr>
               <a:t>set  cart session</a:t>
             </a:r>
           </a:p>
@@ -5057,7 +3089,11 @@
           <a:p>
             <a:pPr algn="ctr"/>
             <a:r>
-              <a:rPr lang="en-US" sz="1200" dirty="0"/>
+              <a:rPr lang="en-US" sz="1200" dirty="0">
+                <a:solidFill>
+                  <a:schemeClr val="bg1"/>
+                </a:solidFill>
+              </a:rPr>
               <a:t>Add to cart</a:t>
             </a:r>
           </a:p>
@@ -5106,7 +3142,11 @@
           <a:p>
             <a:pPr algn="ctr"/>
             <a:r>
-              <a:rPr lang="en-US" sz="1200" dirty="0"/>
+              <a:rPr lang="en-US" sz="1200" dirty="0">
+                <a:solidFill>
+                  <a:schemeClr val="bg1"/>
+                </a:solidFill>
+              </a:rPr>
               <a:t>Place order</a:t>
             </a:r>
           </a:p>
@@ -5155,13 +3195,21 @@
           <a:p>
             <a:pPr algn="ctr"/>
             <a:r>
-              <a:rPr lang="en-US" sz="1200" dirty="0"/>
+              <a:rPr lang="en-US" sz="1200" dirty="0">
+                <a:solidFill>
+                  <a:schemeClr val="bg1"/>
+                </a:solidFill>
+              </a:rPr>
               <a:t>Cart clear</a:t>
             </a:r>
           </a:p>
           <a:p>
             <a:pPr algn="ctr"/>
-            <a:endParaRPr lang="en-US" sz="1200" dirty="0"/>
+            <a:endParaRPr lang="en-US" sz="1200" dirty="0">
+              <a:solidFill>
+                <a:schemeClr val="bg1"/>
+              </a:solidFill>
+            </a:endParaRPr>
           </a:p>
         </p:txBody>
       </p:sp>
@@ -5411,14 +3459,26 @@
           <a:lstStyle/>
           <a:p>
             <a:r>
-              <a:rPr lang="en-US" sz="1200" dirty="0"/>
+              <a:rPr lang="en-US" sz="1200" dirty="0">
+                <a:solidFill>
+                  <a:schemeClr val="bg1"/>
+                </a:solidFill>
+              </a:rPr>
               <a:t>Shopping again with new </a:t>
             </a:r>
             <a:r>
-              <a:rPr lang="en-US" sz="1200" dirty="0" err="1"/>
+              <a:rPr lang="en-US" sz="1200" dirty="0" err="1">
+                <a:solidFill>
+                  <a:schemeClr val="bg1"/>
+                </a:solidFill>
+              </a:rPr>
               <a:t>cartID</a:t>
             </a:r>
-            <a:endParaRPr lang="en-US" sz="1200" dirty="0"/>
+            <a:endParaRPr lang="en-US" sz="1200" dirty="0">
+              <a:solidFill>
+                <a:schemeClr val="bg1"/>
+              </a:solidFill>
+            </a:endParaRPr>
           </a:p>
         </p:txBody>
       </p:sp>
@@ -5451,14 +3511,26 @@
           <a:lstStyle/>
           <a:p>
             <a:r>
-              <a:rPr lang="en-US" sz="1200" dirty="0"/>
+              <a:rPr lang="en-US" sz="1200" dirty="0">
+                <a:solidFill>
+                  <a:schemeClr val="bg1"/>
+                </a:solidFill>
+              </a:rPr>
               <a:t>If no cart(empty), create new one with new </a:t>
             </a:r>
             <a:r>
-              <a:rPr lang="en-US" sz="1200" dirty="0" err="1"/>
+              <a:rPr lang="en-US" sz="1200" dirty="0" err="1">
+                <a:solidFill>
+                  <a:schemeClr val="bg1"/>
+                </a:solidFill>
+              </a:rPr>
               <a:t>cartID</a:t>
             </a:r>
-            <a:endParaRPr lang="en-US" sz="1200" dirty="0"/>
+            <a:endParaRPr lang="en-US" sz="1200" dirty="0">
+              <a:solidFill>
+                <a:schemeClr val="bg1"/>
+              </a:solidFill>
+            </a:endParaRPr>
           </a:p>
         </p:txBody>
       </p:sp>
@@ -5466,6 +3538,1101 @@
     <p:extLst>
       <p:ext uri="{BB962C8B-B14F-4D97-AF65-F5344CB8AC3E}">
         <p14:creationId xmlns:p14="http://schemas.microsoft.com/office/powerpoint/2010/main" val="1665153545"/>
+      </p:ext>
+    </p:extLst>
+  </p:cSld>
+  <p:clrMapOvr>
+    <a:masterClrMapping/>
+  </p:clrMapOvr>
+</p:sld>
+</file>
+
+<file path=ppt/slides/slide2.xml><?xml version="1.0" encoding="utf-8"?>
+<p:sld xmlns:a="http://schemas.openxmlformats.org/drawingml/2006/main" xmlns:r="http://schemas.openxmlformats.org/officeDocument/2006/relationships" xmlns:p="http://schemas.openxmlformats.org/presentationml/2006/main">
+  <p:cSld>
+    <p:spTree>
+      <p:nvGrpSpPr>
+        <p:cNvPr id="1" name=""/>
+        <p:cNvGrpSpPr/>
+        <p:nvPr/>
+      </p:nvGrpSpPr>
+      <p:grpSpPr>
+        <a:xfrm>
+          <a:off x="0" y="0"/>
+          <a:ext cx="0" cy="0"/>
+          <a:chOff x="0" y="0"/>
+          <a:chExt cx="0" cy="0"/>
+        </a:xfrm>
+      </p:grpSpPr>
+      <p:sp>
+        <p:nvSpPr>
+          <p:cNvPr id="2" name="Title 1">
+            <a:extLst>
+              <a:ext uri="{FF2B5EF4-FFF2-40B4-BE49-F238E27FC236}">
+                <a16:creationId xmlns:a16="http://schemas.microsoft.com/office/drawing/2014/main" id="{89C02D2D-E749-BD4B-BF23-4854D5DBCB5E}"/>
+              </a:ext>
+            </a:extLst>
+          </p:cNvPr>
+          <p:cNvSpPr>
+            <a:spLocks noGrp="1"/>
+          </p:cNvSpPr>
+          <p:nvPr>
+            <p:ph type="title"/>
+          </p:nvPr>
+        </p:nvSpPr>
+        <p:spPr>
+          <a:xfrm>
+            <a:off x="756719" y="328911"/>
+            <a:ext cx="10515600" cy="341045"/>
+          </a:xfrm>
+        </p:spPr>
+        <p:txBody>
+          <a:bodyPr>
+            <a:noAutofit/>
+          </a:bodyPr>
+          <a:lstStyle/>
+          <a:p>
+            <a:r>
+              <a:rPr lang="en-US" sz="2800" dirty="0"/>
+              <a:t>pagination</a:t>
+            </a:r>
+          </a:p>
+        </p:txBody>
+      </p:sp>
+      <p:pic>
+        <p:nvPicPr>
+          <p:cNvPr id="5" name="Picture 4">
+            <a:extLst>
+              <a:ext uri="{FF2B5EF4-FFF2-40B4-BE49-F238E27FC236}">
+                <a16:creationId xmlns:a16="http://schemas.microsoft.com/office/drawing/2014/main" id="{F66206B8-508C-1A43-914C-39D55F81FA09}"/>
+              </a:ext>
+            </a:extLst>
+          </p:cNvPr>
+          <p:cNvPicPr>
+            <a:picLocks noChangeAspect="1"/>
+          </p:cNvPicPr>
+          <p:nvPr/>
+        </p:nvPicPr>
+        <p:blipFill>
+          <a:blip r:embed="rId2"/>
+          <a:stretch>
+            <a:fillRect/>
+          </a:stretch>
+        </p:blipFill>
+        <p:spPr>
+          <a:xfrm>
+            <a:off x="1575302" y="4646528"/>
+            <a:ext cx="1756372" cy="310818"/>
+          </a:xfrm>
+          <a:prstGeom prst="rect">
+            <a:avLst/>
+          </a:prstGeom>
+        </p:spPr>
+      </p:pic>
+      <p:cxnSp>
+        <p:nvCxnSpPr>
+          <p:cNvPr id="7" name="Straight Arrow Connector 6">
+            <a:extLst>
+              <a:ext uri="{FF2B5EF4-FFF2-40B4-BE49-F238E27FC236}">
+                <a16:creationId xmlns:a16="http://schemas.microsoft.com/office/drawing/2014/main" id="{FA3E49CA-67F4-BF44-A66C-80C24FB72F32}"/>
+              </a:ext>
+            </a:extLst>
+          </p:cNvPr>
+          <p:cNvCxnSpPr>
+            <a:cxnSpLocks/>
+            <a:stCxn id="5" idx="3"/>
+            <a:endCxn id="8" idx="1"/>
+          </p:cNvCxnSpPr>
+          <p:nvPr/>
+        </p:nvCxnSpPr>
+        <p:spPr>
+          <a:xfrm>
+            <a:off x="3331674" y="4801937"/>
+            <a:ext cx="3621387" cy="656279"/>
+          </a:xfrm>
+          <a:prstGeom prst="straightConnector1">
+            <a:avLst/>
+          </a:prstGeom>
+          <a:ln>
+            <a:solidFill>
+              <a:schemeClr val="bg1"/>
+            </a:solidFill>
+            <a:tailEnd type="triangle"/>
+          </a:ln>
+        </p:spPr>
+        <p:style>
+          <a:lnRef idx="1">
+            <a:schemeClr val="accent1"/>
+          </a:lnRef>
+          <a:fillRef idx="0">
+            <a:schemeClr val="accent1"/>
+          </a:fillRef>
+          <a:effectRef idx="0">
+            <a:schemeClr val="accent1"/>
+          </a:effectRef>
+          <a:fontRef idx="minor">
+            <a:schemeClr val="tx1"/>
+          </a:fontRef>
+        </p:style>
+      </p:cxnSp>
+      <p:sp>
+        <p:nvSpPr>
+          <p:cNvPr id="8" name="TextBox 7">
+            <a:extLst>
+              <a:ext uri="{FF2B5EF4-FFF2-40B4-BE49-F238E27FC236}">
+                <a16:creationId xmlns:a16="http://schemas.microsoft.com/office/drawing/2014/main" id="{D3640195-D9D3-BC47-8B51-C78689A499A0}"/>
+              </a:ext>
+            </a:extLst>
+          </p:cNvPr>
+          <p:cNvSpPr txBox="1"/>
+          <p:nvPr/>
+        </p:nvSpPr>
+        <p:spPr>
+          <a:xfrm>
+            <a:off x="6953061" y="4581053"/>
+            <a:ext cx="3938258" cy="1754326"/>
+          </a:xfrm>
+          <a:prstGeom prst="rect">
+            <a:avLst/>
+          </a:prstGeom>
+          <a:noFill/>
+        </p:spPr>
+        <p:txBody>
+          <a:bodyPr wrap="square" rtlCol="0">
+            <a:spAutoFit/>
+          </a:bodyPr>
+          <a:lstStyle/>
+          <a:p>
+            <a:r>
+              <a:rPr lang="en-US" dirty="0">
+                <a:solidFill>
+                  <a:schemeClr val="bg1"/>
+                </a:solidFill>
+              </a:rPr>
+              <a:t>Page number: </a:t>
+            </a:r>
+            <a:r>
+              <a:rPr lang="en-US" dirty="0" err="1">
+                <a:solidFill>
+                  <a:schemeClr val="bg1"/>
+                </a:solidFill>
+              </a:rPr>
+              <a:t>pn</a:t>
+            </a:r>
+            <a:endParaRPr lang="en-US" dirty="0">
+              <a:solidFill>
+                <a:schemeClr val="bg1"/>
+              </a:solidFill>
+            </a:endParaRPr>
+          </a:p>
+          <a:p>
+            <a:r>
+              <a:rPr lang="en-US" dirty="0">
+                <a:solidFill>
+                  <a:schemeClr val="bg1"/>
+                </a:solidFill>
+              </a:rPr>
+              <a:t>Index:  index</a:t>
+            </a:r>
+          </a:p>
+          <a:p>
+            <a:r>
+              <a:rPr lang="en-US" dirty="0">
+                <a:solidFill>
+                  <a:schemeClr val="bg1"/>
+                </a:solidFill>
+              </a:rPr>
+              <a:t>For loop start---end:</a:t>
+            </a:r>
+          </a:p>
+          <a:p>
+            <a:r>
+              <a:rPr lang="en-US" dirty="0">
+                <a:solidFill>
+                  <a:schemeClr val="bg1"/>
+                </a:solidFill>
+              </a:rPr>
+              <a:t>(Index -1)*</a:t>
+            </a:r>
+            <a:r>
+              <a:rPr lang="en-US" dirty="0" err="1">
+                <a:solidFill>
+                  <a:schemeClr val="bg1"/>
+                </a:solidFill>
+              </a:rPr>
+              <a:t>pn</a:t>
+            </a:r>
+            <a:r>
+              <a:rPr lang="en-US" dirty="0">
+                <a:solidFill>
+                  <a:schemeClr val="bg1"/>
+                </a:solidFill>
+              </a:rPr>
+              <a:t> ----index * </a:t>
+            </a:r>
+            <a:r>
+              <a:rPr lang="en-US" dirty="0" err="1">
+                <a:solidFill>
+                  <a:schemeClr val="bg1"/>
+                </a:solidFill>
+              </a:rPr>
+              <a:t>pn</a:t>
+            </a:r>
+            <a:endParaRPr lang="en-US" dirty="0">
+              <a:solidFill>
+                <a:schemeClr val="bg1"/>
+              </a:solidFill>
+            </a:endParaRPr>
+          </a:p>
+          <a:p>
+            <a:endParaRPr lang="en-US" dirty="0">
+              <a:solidFill>
+                <a:schemeClr val="bg1"/>
+              </a:solidFill>
+            </a:endParaRPr>
+          </a:p>
+          <a:p>
+            <a:r>
+              <a:rPr lang="en-US" dirty="0">
+                <a:solidFill>
+                  <a:schemeClr val="bg1"/>
+                </a:solidFill>
+              </a:rPr>
+              <a:t>JS button:</a:t>
+            </a:r>
+          </a:p>
+        </p:txBody>
+      </p:sp>
+      <p:sp>
+        <p:nvSpPr>
+          <p:cNvPr id="18" name="Rectangle 17">
+            <a:extLst>
+              <a:ext uri="{FF2B5EF4-FFF2-40B4-BE49-F238E27FC236}">
+                <a16:creationId xmlns:a16="http://schemas.microsoft.com/office/drawing/2014/main" id="{2C9A15BD-DD04-6141-B79B-149A620F709D}"/>
+              </a:ext>
+            </a:extLst>
+          </p:cNvPr>
+          <p:cNvSpPr/>
+          <p:nvPr/>
+        </p:nvSpPr>
+        <p:spPr>
+          <a:xfrm>
+            <a:off x="1475274" y="1448554"/>
+            <a:ext cx="3187261" cy="3132499"/>
+          </a:xfrm>
+          <a:prstGeom prst="rect">
+            <a:avLst/>
+          </a:prstGeom>
+        </p:spPr>
+        <p:style>
+          <a:lnRef idx="2">
+            <a:schemeClr val="accent1">
+              <a:shade val="50000"/>
+            </a:schemeClr>
+          </a:lnRef>
+          <a:fillRef idx="1">
+            <a:schemeClr val="accent1"/>
+          </a:fillRef>
+          <a:effectRef idx="0">
+            <a:schemeClr val="accent1"/>
+          </a:effectRef>
+          <a:fontRef idx="minor">
+            <a:schemeClr val="lt1"/>
+          </a:fontRef>
+        </p:style>
+        <p:txBody>
+          <a:bodyPr rtlCol="0" anchor="ctr"/>
+          <a:lstStyle/>
+          <a:p>
+            <a:pPr algn="ctr"/>
+            <a:r>
+              <a:rPr lang="en-US" dirty="0"/>
+              <a:t>table</a:t>
+            </a:r>
+          </a:p>
+        </p:txBody>
+      </p:sp>
+      <p:sp>
+        <p:nvSpPr>
+          <p:cNvPr id="24" name="TextBox 23">
+            <a:extLst>
+              <a:ext uri="{FF2B5EF4-FFF2-40B4-BE49-F238E27FC236}">
+                <a16:creationId xmlns:a16="http://schemas.microsoft.com/office/drawing/2014/main" id="{43F8AAF8-D626-6247-BF65-2FAFF98A219D}"/>
+              </a:ext>
+            </a:extLst>
+          </p:cNvPr>
+          <p:cNvSpPr txBox="1"/>
+          <p:nvPr/>
+        </p:nvSpPr>
+        <p:spPr>
+          <a:xfrm>
+            <a:off x="6076384" y="1034690"/>
+            <a:ext cx="5691612" cy="3785652"/>
+          </a:xfrm>
+          <a:prstGeom prst="rect">
+            <a:avLst/>
+          </a:prstGeom>
+          <a:noFill/>
+        </p:spPr>
+        <p:txBody>
+          <a:bodyPr wrap="square" rtlCol="0">
+            <a:spAutoFit/>
+          </a:bodyPr>
+          <a:lstStyle/>
+          <a:p>
+            <a:r>
+              <a:rPr lang="en-US" sz="1200" dirty="0">
+                <a:solidFill>
+                  <a:schemeClr val="bg1"/>
+                </a:solidFill>
+              </a:rPr>
+              <a:t>Search---table(data)+pagination(data) (cannot get the data)</a:t>
+            </a:r>
+          </a:p>
+          <a:p>
+            <a:endParaRPr lang="en-US" sz="1200" dirty="0">
+              <a:solidFill>
+                <a:schemeClr val="bg1"/>
+              </a:solidFill>
+            </a:endParaRPr>
+          </a:p>
+          <a:p>
+            <a:r>
+              <a:rPr lang="en-US" sz="1200" dirty="0">
+                <a:solidFill>
+                  <a:schemeClr val="accent2"/>
+                </a:solidFill>
+              </a:rPr>
+              <a:t>Let &lt;span&gt; to get the </a:t>
+            </a:r>
+            <a:r>
+              <a:rPr lang="en-US" sz="1200" dirty="0" err="1">
+                <a:solidFill>
+                  <a:schemeClr val="accent2"/>
+                </a:solidFill>
+              </a:rPr>
+              <a:t>dataString</a:t>
+            </a:r>
+            <a:r>
+              <a:rPr lang="en-US" sz="1200" dirty="0">
+                <a:solidFill>
+                  <a:schemeClr val="accent2"/>
+                </a:solidFill>
+              </a:rPr>
+              <a:t> of data(</a:t>
+            </a:r>
+            <a:r>
+              <a:rPr lang="en-US" sz="1200" dirty="0" err="1">
+                <a:solidFill>
+                  <a:schemeClr val="accent2"/>
+                </a:solidFill>
+              </a:rPr>
+              <a:t>json</a:t>
+            </a:r>
+            <a:r>
+              <a:rPr lang="en-US" sz="1200" dirty="0">
+                <a:solidFill>
+                  <a:schemeClr val="accent2"/>
+                </a:solidFill>
+              </a:rPr>
+              <a:t>).</a:t>
+            </a:r>
+          </a:p>
+          <a:p>
+            <a:r>
+              <a:rPr lang="en-US" sz="1200" dirty="0" err="1">
+                <a:solidFill>
+                  <a:schemeClr val="accent2"/>
+                </a:solidFill>
+              </a:rPr>
+              <a:t>Retieve</a:t>
+            </a:r>
+            <a:r>
+              <a:rPr lang="en-US" sz="1200" dirty="0">
+                <a:solidFill>
+                  <a:schemeClr val="accent2"/>
+                </a:solidFill>
+              </a:rPr>
+              <a:t> the data with </a:t>
+            </a:r>
+            <a:r>
+              <a:rPr lang="en-US" sz="1200" dirty="0" err="1">
+                <a:solidFill>
+                  <a:schemeClr val="accent2"/>
+                </a:solidFill>
+              </a:rPr>
+              <a:t>JSON.parse</a:t>
+            </a:r>
+            <a:r>
+              <a:rPr lang="en-US" sz="1200" dirty="0">
+                <a:solidFill>
+                  <a:schemeClr val="accent2"/>
+                </a:solidFill>
+              </a:rPr>
+              <a:t>() in Pagination function </a:t>
+            </a:r>
+          </a:p>
+          <a:p>
+            <a:endParaRPr lang="en-US" sz="1200" dirty="0">
+              <a:solidFill>
+                <a:schemeClr val="bg1"/>
+              </a:solidFill>
+            </a:endParaRPr>
+          </a:p>
+          <a:p>
+            <a:r>
+              <a:rPr lang="en-US" sz="1200" dirty="0">
+                <a:solidFill>
+                  <a:schemeClr val="bg1"/>
+                </a:solidFill>
+              </a:rPr>
+              <a:t>Pagination(data)—table page(data)</a:t>
+            </a:r>
+          </a:p>
+          <a:p>
+            <a:endParaRPr lang="en-US" sz="1200" dirty="0">
+              <a:solidFill>
+                <a:schemeClr val="bg1"/>
+              </a:solidFill>
+            </a:endParaRPr>
+          </a:p>
+          <a:p>
+            <a:endParaRPr lang="en-US" sz="1200" dirty="0">
+              <a:solidFill>
+                <a:schemeClr val="bg1"/>
+              </a:solidFill>
+            </a:endParaRPr>
+          </a:p>
+          <a:p>
+            <a:r>
+              <a:rPr lang="en-US" sz="1200" dirty="0">
+                <a:solidFill>
+                  <a:schemeClr val="bg1"/>
+                </a:solidFill>
+              </a:rPr>
+              <a:t>Click search:  </a:t>
+            </a:r>
+            <a:r>
+              <a:rPr lang="en-US" sz="1200" dirty="0" err="1">
+                <a:solidFill>
+                  <a:schemeClr val="bg1"/>
+                </a:solidFill>
+              </a:rPr>
+              <a:t>showTable</a:t>
+            </a:r>
+            <a:r>
+              <a:rPr lang="en-US" sz="1200" dirty="0">
+                <a:solidFill>
+                  <a:schemeClr val="bg1"/>
+                </a:solidFill>
+              </a:rPr>
+              <a:t> and Pagination (</a:t>
+            </a:r>
+            <a:r>
+              <a:rPr lang="en-US" sz="1200" dirty="0" err="1">
+                <a:solidFill>
+                  <a:schemeClr val="bg1"/>
+                </a:solidFill>
+              </a:rPr>
+              <a:t>pageNumber</a:t>
+            </a:r>
+            <a:r>
+              <a:rPr lang="en-US" sz="1200" dirty="0">
+                <a:solidFill>
+                  <a:schemeClr val="bg1"/>
+                </a:solidFill>
+              </a:rPr>
+              <a:t> =1, default)</a:t>
+            </a:r>
+          </a:p>
+          <a:p>
+            <a:r>
+              <a:rPr lang="en-US" sz="1200" dirty="0">
+                <a:solidFill>
+                  <a:schemeClr val="bg1"/>
+                </a:solidFill>
+              </a:rPr>
+              <a:t>Click </a:t>
+            </a:r>
+            <a:r>
+              <a:rPr lang="en-US" sz="1200" dirty="0" err="1">
+                <a:solidFill>
+                  <a:schemeClr val="bg1"/>
+                </a:solidFill>
+              </a:rPr>
+              <a:t>pagenumber</a:t>
+            </a:r>
+            <a:r>
+              <a:rPr lang="en-US" sz="1200" dirty="0">
+                <a:solidFill>
+                  <a:schemeClr val="bg1"/>
+                </a:solidFill>
+              </a:rPr>
+              <a:t>: </a:t>
+            </a:r>
+            <a:r>
+              <a:rPr lang="en-US" sz="1200" dirty="0" err="1">
+                <a:solidFill>
+                  <a:schemeClr val="bg1"/>
+                </a:solidFill>
+              </a:rPr>
+              <a:t>showTable</a:t>
+            </a:r>
+            <a:r>
+              <a:rPr lang="en-US" sz="1200" dirty="0">
+                <a:solidFill>
+                  <a:schemeClr val="bg1"/>
+                </a:solidFill>
+              </a:rPr>
+              <a:t> and pagination(with active number)</a:t>
+            </a:r>
+          </a:p>
+          <a:p>
+            <a:endParaRPr lang="en-US" sz="1200" dirty="0">
+              <a:solidFill>
+                <a:schemeClr val="bg1"/>
+              </a:solidFill>
+            </a:endParaRPr>
+          </a:p>
+          <a:p>
+            <a:r>
+              <a:rPr lang="en-US" sz="1200" dirty="0" err="1">
+                <a:solidFill>
+                  <a:schemeClr val="bg1"/>
+                </a:solidFill>
+              </a:rPr>
+              <a:t>showTable</a:t>
+            </a:r>
+            <a:r>
+              <a:rPr lang="en-US" sz="1200" dirty="0">
+                <a:solidFill>
+                  <a:schemeClr val="bg1"/>
+                </a:solidFill>
+              </a:rPr>
+              <a:t>:  </a:t>
+            </a:r>
+            <a:r>
+              <a:rPr lang="en-US" sz="1200" dirty="0" err="1">
+                <a:solidFill>
+                  <a:schemeClr val="bg1"/>
+                </a:solidFill>
+              </a:rPr>
+              <a:t>args</a:t>
+            </a:r>
+            <a:r>
+              <a:rPr lang="en-US" sz="1200" dirty="0">
+                <a:solidFill>
+                  <a:schemeClr val="bg1"/>
+                </a:solidFill>
+              </a:rPr>
+              <a:t>: data, action, </a:t>
+            </a:r>
+            <a:r>
+              <a:rPr lang="en-US" sz="1200" dirty="0" err="1">
+                <a:solidFill>
+                  <a:schemeClr val="bg1"/>
+                </a:solidFill>
+              </a:rPr>
+              <a:t>pageItems</a:t>
+            </a:r>
+            <a:r>
+              <a:rPr lang="en-US" sz="1200" dirty="0">
+                <a:solidFill>
+                  <a:schemeClr val="bg1"/>
+                </a:solidFill>
+              </a:rPr>
+              <a:t>, </a:t>
+            </a:r>
+            <a:r>
+              <a:rPr lang="en-US" sz="1200" dirty="0" err="1">
+                <a:solidFill>
+                  <a:schemeClr val="bg1"/>
+                </a:solidFill>
+              </a:rPr>
+              <a:t>pageNumber</a:t>
+            </a:r>
+            <a:r>
+              <a:rPr lang="en-US" sz="1200" dirty="0">
+                <a:solidFill>
+                  <a:schemeClr val="bg1"/>
+                </a:solidFill>
+              </a:rPr>
+              <a:t> </a:t>
+            </a:r>
+          </a:p>
+          <a:p>
+            <a:r>
+              <a:rPr lang="en-US" sz="1200" dirty="0">
+                <a:solidFill>
+                  <a:schemeClr val="bg1"/>
+                </a:solidFill>
+              </a:rPr>
+              <a:t>Function: </a:t>
+            </a:r>
+            <a:r>
+              <a:rPr lang="en-US" sz="1200" dirty="0" err="1">
+                <a:solidFill>
+                  <a:schemeClr val="bg1"/>
+                </a:solidFill>
+              </a:rPr>
+              <a:t>async</a:t>
+            </a:r>
+            <a:r>
+              <a:rPr lang="en-US" sz="1200" dirty="0">
+                <a:solidFill>
+                  <a:schemeClr val="bg1"/>
+                </a:solidFill>
+              </a:rPr>
+              <a:t> ajax</a:t>
+            </a:r>
+          </a:p>
+          <a:p>
+            <a:pPr marL="171450" indent="-171450">
+              <a:buFont typeface="Arial" panose="020B0604020202020204" pitchFamily="34" charset="0"/>
+              <a:buChar char="•"/>
+            </a:pPr>
+            <a:r>
+              <a:rPr lang="en-US" sz="1200" dirty="0">
+                <a:solidFill>
+                  <a:schemeClr val="bg1"/>
+                </a:solidFill>
+              </a:rPr>
+              <a:t>Data from database (</a:t>
+            </a:r>
+            <a:r>
+              <a:rPr lang="en-US" sz="1200" dirty="0" err="1">
+                <a:solidFill>
+                  <a:schemeClr val="bg1"/>
+                </a:solidFill>
+              </a:rPr>
+              <a:t>ajaxsearch</a:t>
+            </a:r>
+            <a:r>
+              <a:rPr lang="en-US" sz="1200" dirty="0">
+                <a:solidFill>
+                  <a:schemeClr val="bg1"/>
+                </a:solidFill>
+              </a:rPr>
+              <a:t>)</a:t>
+            </a:r>
+          </a:p>
+          <a:p>
+            <a:pPr marL="171450" indent="-171450">
+              <a:buFont typeface="Arial" panose="020B0604020202020204" pitchFamily="34" charset="0"/>
+              <a:buChar char="•"/>
+            </a:pPr>
+            <a:r>
+              <a:rPr lang="en-US" sz="1200" dirty="0" err="1">
+                <a:solidFill>
+                  <a:schemeClr val="bg1"/>
+                </a:solidFill>
+              </a:rPr>
+              <a:t>pageItems</a:t>
+            </a:r>
+            <a:r>
+              <a:rPr lang="en-US" sz="1200" dirty="0">
+                <a:solidFill>
+                  <a:schemeClr val="bg1"/>
+                </a:solidFill>
+              </a:rPr>
+              <a:t> is set by user</a:t>
+            </a:r>
+          </a:p>
+          <a:p>
+            <a:pPr marL="171450" indent="-171450">
+              <a:buFont typeface="Arial" panose="020B0604020202020204" pitchFamily="34" charset="0"/>
+              <a:buChar char="•"/>
+            </a:pPr>
+            <a:r>
+              <a:rPr lang="en-US" sz="1200" dirty="0" err="1">
+                <a:solidFill>
+                  <a:schemeClr val="bg1"/>
+                </a:solidFill>
+              </a:rPr>
+              <a:t>pageNumber</a:t>
+            </a:r>
+            <a:r>
+              <a:rPr lang="en-US" sz="1200" dirty="0">
+                <a:solidFill>
+                  <a:schemeClr val="bg1"/>
+                </a:solidFill>
+              </a:rPr>
+              <a:t> is from Pagination</a:t>
+            </a:r>
+          </a:p>
+          <a:p>
+            <a:pPr marL="171450" indent="-171450">
+              <a:buFont typeface="Arial" panose="020B0604020202020204" pitchFamily="34" charset="0"/>
+              <a:buChar char="•"/>
+            </a:pPr>
+            <a:endParaRPr lang="en-US" sz="1200" dirty="0">
+              <a:solidFill>
+                <a:schemeClr val="bg1"/>
+              </a:solidFill>
+            </a:endParaRPr>
+          </a:p>
+          <a:p>
+            <a:r>
+              <a:rPr lang="en-US" sz="1200" dirty="0">
+                <a:solidFill>
+                  <a:schemeClr val="bg1"/>
+                </a:solidFill>
+              </a:rPr>
+              <a:t>show Pagination:  </a:t>
+            </a:r>
+            <a:r>
+              <a:rPr lang="en-US" sz="1200" dirty="0" err="1">
+                <a:solidFill>
+                  <a:schemeClr val="bg1"/>
+                </a:solidFill>
+              </a:rPr>
+              <a:t>args</a:t>
+            </a:r>
+            <a:r>
+              <a:rPr lang="en-US" sz="1200" dirty="0">
+                <a:solidFill>
+                  <a:schemeClr val="bg1"/>
+                </a:solidFill>
+              </a:rPr>
+              <a:t>: </a:t>
+            </a:r>
+            <a:r>
+              <a:rPr lang="en-US" sz="1200" dirty="0" err="1">
+                <a:solidFill>
+                  <a:schemeClr val="bg1"/>
+                </a:solidFill>
+              </a:rPr>
+              <a:t>data,pageItems</a:t>
+            </a:r>
+            <a:endParaRPr lang="en-US" sz="1200" dirty="0">
+              <a:solidFill>
+                <a:schemeClr val="bg1"/>
+              </a:solidFill>
+            </a:endParaRPr>
+          </a:p>
+          <a:p>
+            <a:r>
+              <a:rPr lang="en-US" sz="1200" dirty="0">
+                <a:solidFill>
+                  <a:schemeClr val="bg1"/>
+                </a:solidFill>
+              </a:rPr>
+              <a:t>Function : </a:t>
+            </a:r>
+            <a:r>
+              <a:rPr lang="en-US" sz="1200" dirty="0" err="1">
+                <a:solidFill>
+                  <a:schemeClr val="bg1"/>
+                </a:solidFill>
+              </a:rPr>
+              <a:t>Async</a:t>
+            </a:r>
+            <a:r>
+              <a:rPr lang="en-US" sz="1200" dirty="0">
+                <a:solidFill>
+                  <a:schemeClr val="bg1"/>
+                </a:solidFill>
+              </a:rPr>
+              <a:t> ajax</a:t>
+            </a:r>
+          </a:p>
+          <a:p>
+            <a:endParaRPr lang="en-US" sz="1200" dirty="0">
+              <a:solidFill>
+                <a:schemeClr val="bg1"/>
+              </a:solidFill>
+            </a:endParaRPr>
+          </a:p>
+        </p:txBody>
+      </p:sp>
+      <p:sp>
+        <p:nvSpPr>
+          <p:cNvPr id="25" name="Rectangle 24">
+            <a:extLst>
+              <a:ext uri="{FF2B5EF4-FFF2-40B4-BE49-F238E27FC236}">
+                <a16:creationId xmlns:a16="http://schemas.microsoft.com/office/drawing/2014/main" id="{F936027E-803E-4242-BD67-E5155E9BA33D}"/>
+              </a:ext>
+            </a:extLst>
+          </p:cNvPr>
+          <p:cNvSpPr/>
+          <p:nvPr/>
+        </p:nvSpPr>
+        <p:spPr>
+          <a:xfrm>
+            <a:off x="305428" y="1494207"/>
+            <a:ext cx="960862" cy="271219"/>
+          </a:xfrm>
+          <a:prstGeom prst="rect">
+            <a:avLst/>
+          </a:prstGeom>
+        </p:spPr>
+        <p:style>
+          <a:lnRef idx="2">
+            <a:schemeClr val="accent1">
+              <a:shade val="50000"/>
+            </a:schemeClr>
+          </a:lnRef>
+          <a:fillRef idx="1">
+            <a:schemeClr val="accent1"/>
+          </a:fillRef>
+          <a:effectRef idx="0">
+            <a:schemeClr val="accent1"/>
+          </a:effectRef>
+          <a:fontRef idx="minor">
+            <a:schemeClr val="lt1"/>
+          </a:fontRef>
+        </p:style>
+        <p:txBody>
+          <a:bodyPr rtlCol="0" anchor="ctr"/>
+          <a:lstStyle/>
+          <a:p>
+            <a:pPr algn="ctr"/>
+            <a:r>
+              <a:rPr lang="en-US" sz="1600" dirty="0"/>
+              <a:t>search1</a:t>
+            </a:r>
+          </a:p>
+        </p:txBody>
+      </p:sp>
+      <p:sp>
+        <p:nvSpPr>
+          <p:cNvPr id="28" name="Rectangle 27">
+            <a:extLst>
+              <a:ext uri="{FF2B5EF4-FFF2-40B4-BE49-F238E27FC236}">
+                <a16:creationId xmlns:a16="http://schemas.microsoft.com/office/drawing/2014/main" id="{FD5A7FEE-0644-F649-9D49-CE53E694622D}"/>
+              </a:ext>
+            </a:extLst>
+          </p:cNvPr>
+          <p:cNvSpPr/>
+          <p:nvPr/>
+        </p:nvSpPr>
+        <p:spPr>
+          <a:xfrm>
+            <a:off x="3412558" y="4646528"/>
+            <a:ext cx="426708" cy="269341"/>
+          </a:xfrm>
+          <a:prstGeom prst="rect">
+            <a:avLst/>
+          </a:prstGeom>
+        </p:spPr>
+        <p:style>
+          <a:lnRef idx="2">
+            <a:schemeClr val="accent1">
+              <a:shade val="50000"/>
+            </a:schemeClr>
+          </a:lnRef>
+          <a:fillRef idx="1">
+            <a:schemeClr val="accent1"/>
+          </a:fillRef>
+          <a:effectRef idx="0">
+            <a:schemeClr val="accent1"/>
+          </a:effectRef>
+          <a:fontRef idx="minor">
+            <a:schemeClr val="lt1"/>
+          </a:fontRef>
+        </p:style>
+        <p:txBody>
+          <a:bodyPr rtlCol="0" anchor="ctr"/>
+          <a:lstStyle/>
+          <a:p>
+            <a:pPr algn="ctr"/>
+            <a:r>
+              <a:rPr lang="en-US" sz="1200" dirty="0"/>
+              <a:t>5</a:t>
+            </a:r>
+          </a:p>
+        </p:txBody>
+      </p:sp>
+      <p:sp>
+        <p:nvSpPr>
+          <p:cNvPr id="29" name="TextBox 28">
+            <a:extLst>
+              <a:ext uri="{FF2B5EF4-FFF2-40B4-BE49-F238E27FC236}">
+                <a16:creationId xmlns:a16="http://schemas.microsoft.com/office/drawing/2014/main" id="{85C426D1-9865-8042-87DC-8E0622B8D90F}"/>
+              </a:ext>
+            </a:extLst>
+          </p:cNvPr>
+          <p:cNvSpPr txBox="1"/>
+          <p:nvPr/>
+        </p:nvSpPr>
+        <p:spPr>
+          <a:xfrm>
+            <a:off x="3839266" y="4646528"/>
+            <a:ext cx="895696" cy="276999"/>
+          </a:xfrm>
+          <a:prstGeom prst="rect">
+            <a:avLst/>
+          </a:prstGeom>
+          <a:noFill/>
+        </p:spPr>
+        <p:txBody>
+          <a:bodyPr wrap="square" rtlCol="0">
+            <a:spAutoFit/>
+          </a:bodyPr>
+          <a:lstStyle/>
+          <a:p>
+            <a:r>
+              <a:rPr lang="en-US" sz="1200" dirty="0">
+                <a:solidFill>
+                  <a:schemeClr val="bg1"/>
+                </a:solidFill>
+              </a:rPr>
+              <a:t>items/page</a:t>
+            </a:r>
+          </a:p>
+        </p:txBody>
+      </p:sp>
+      <p:sp>
+        <p:nvSpPr>
+          <p:cNvPr id="35" name="Rectangle 34">
+            <a:extLst>
+              <a:ext uri="{FF2B5EF4-FFF2-40B4-BE49-F238E27FC236}">
+                <a16:creationId xmlns:a16="http://schemas.microsoft.com/office/drawing/2014/main" id="{72F19D48-B275-444A-BA9F-9A33A85DA9D2}"/>
+              </a:ext>
+            </a:extLst>
+          </p:cNvPr>
+          <p:cNvSpPr/>
+          <p:nvPr/>
+        </p:nvSpPr>
+        <p:spPr>
+          <a:xfrm>
+            <a:off x="278111" y="1955934"/>
+            <a:ext cx="960862" cy="271219"/>
+          </a:xfrm>
+          <a:prstGeom prst="rect">
+            <a:avLst/>
+          </a:prstGeom>
+        </p:spPr>
+        <p:style>
+          <a:lnRef idx="2">
+            <a:schemeClr val="accent1">
+              <a:shade val="50000"/>
+            </a:schemeClr>
+          </a:lnRef>
+          <a:fillRef idx="1">
+            <a:schemeClr val="accent1"/>
+          </a:fillRef>
+          <a:effectRef idx="0">
+            <a:schemeClr val="accent1"/>
+          </a:effectRef>
+          <a:fontRef idx="minor">
+            <a:schemeClr val="lt1"/>
+          </a:fontRef>
+        </p:style>
+        <p:txBody>
+          <a:bodyPr rtlCol="0" anchor="ctr"/>
+          <a:lstStyle/>
+          <a:p>
+            <a:pPr algn="ctr"/>
+            <a:r>
+              <a:rPr lang="en-US" sz="1600" dirty="0"/>
+              <a:t>search2</a:t>
+            </a:r>
+          </a:p>
+        </p:txBody>
+      </p:sp>
+      <p:sp>
+        <p:nvSpPr>
+          <p:cNvPr id="36" name="Rectangle 35">
+            <a:extLst>
+              <a:ext uri="{FF2B5EF4-FFF2-40B4-BE49-F238E27FC236}">
+                <a16:creationId xmlns:a16="http://schemas.microsoft.com/office/drawing/2014/main" id="{DBBA6808-2120-BF47-AD7F-73123524B9AB}"/>
+              </a:ext>
+            </a:extLst>
+          </p:cNvPr>
+          <p:cNvSpPr/>
+          <p:nvPr/>
+        </p:nvSpPr>
+        <p:spPr>
+          <a:xfrm>
+            <a:off x="305428" y="2522632"/>
+            <a:ext cx="960862" cy="271219"/>
+          </a:xfrm>
+          <a:prstGeom prst="rect">
+            <a:avLst/>
+          </a:prstGeom>
+        </p:spPr>
+        <p:style>
+          <a:lnRef idx="2">
+            <a:schemeClr val="accent1">
+              <a:shade val="50000"/>
+            </a:schemeClr>
+          </a:lnRef>
+          <a:fillRef idx="1">
+            <a:schemeClr val="accent1"/>
+          </a:fillRef>
+          <a:effectRef idx="0">
+            <a:schemeClr val="accent1"/>
+          </a:effectRef>
+          <a:fontRef idx="minor">
+            <a:schemeClr val="lt1"/>
+          </a:fontRef>
+        </p:style>
+        <p:txBody>
+          <a:bodyPr rtlCol="0" anchor="ctr"/>
+          <a:lstStyle/>
+          <a:p>
+            <a:pPr algn="ctr"/>
+            <a:r>
+              <a:rPr lang="en-US" sz="1600" dirty="0"/>
+              <a:t>search3</a:t>
+            </a:r>
+          </a:p>
+        </p:txBody>
+      </p:sp>
+      <p:sp>
+        <p:nvSpPr>
+          <p:cNvPr id="37" name="Rectangle 36">
+            <a:extLst>
+              <a:ext uri="{FF2B5EF4-FFF2-40B4-BE49-F238E27FC236}">
+                <a16:creationId xmlns:a16="http://schemas.microsoft.com/office/drawing/2014/main" id="{DCD4D372-5A5A-D647-9460-45E4C0642AC3}"/>
+              </a:ext>
+            </a:extLst>
+          </p:cNvPr>
+          <p:cNvSpPr/>
+          <p:nvPr/>
+        </p:nvSpPr>
+        <p:spPr>
+          <a:xfrm>
+            <a:off x="299486" y="3114612"/>
+            <a:ext cx="960862" cy="271219"/>
+          </a:xfrm>
+          <a:prstGeom prst="rect">
+            <a:avLst/>
+          </a:prstGeom>
+        </p:spPr>
+        <p:style>
+          <a:lnRef idx="2">
+            <a:schemeClr val="accent1">
+              <a:shade val="50000"/>
+            </a:schemeClr>
+          </a:lnRef>
+          <a:fillRef idx="1">
+            <a:schemeClr val="accent1"/>
+          </a:fillRef>
+          <a:effectRef idx="0">
+            <a:schemeClr val="accent1"/>
+          </a:effectRef>
+          <a:fontRef idx="minor">
+            <a:schemeClr val="lt1"/>
+          </a:fontRef>
+        </p:style>
+        <p:txBody>
+          <a:bodyPr rtlCol="0" anchor="ctr"/>
+          <a:lstStyle/>
+          <a:p>
+            <a:pPr algn="ctr"/>
+            <a:r>
+              <a:rPr lang="en-US" sz="1600" dirty="0"/>
+              <a:t>search4</a:t>
+            </a:r>
+          </a:p>
+        </p:txBody>
+      </p:sp>
+    </p:spTree>
+    <p:extLst>
+      <p:ext uri="{BB962C8B-B14F-4D97-AF65-F5344CB8AC3E}">
+        <p14:creationId xmlns:p14="http://schemas.microsoft.com/office/powerpoint/2010/main" val="235475581"/>
       </p:ext>
     </p:extLst>
   </p:cSld>

</xml_diff>

<commit_message>
admin update book part with sort by price
</commit_message>
<xml_diff>
--- a/build/web/doc/business flow.pptx
+++ b/build/web/doc/business flow.pptx
@@ -7,6 +7,7 @@
   <p:sldIdLst>
     <p:sldId id="256" r:id="rId2"/>
     <p:sldId id="258" r:id="rId3"/>
+    <p:sldId id="259" r:id="rId4"/>
   </p:sldIdLst>
   <p:sldSz cx="12192000" cy="6858000"/>
   <p:notesSz cx="6858000" cy="9144000"/>
@@ -162,6 +163,9 @@
             <a:off x="1524000" y="1122363"/>
             <a:ext cx="9144000" cy="2387600"/>
           </a:xfrm>
+          <a:prstGeom prst="rect">
+            <a:avLst/>
+          </a:prstGeom>
         </p:spPr>
         <p:txBody>
           <a:bodyPr anchor="b"/>
@@ -172,7 +176,7 @@
           </a:lstStyle>
           <a:p>
             <a:r>
-              <a:rPr lang="en-US"/>
+              <a:rPr lang="en-US" dirty="0"/>
               <a:t>Click to edit Master title style</a:t>
             </a:r>
           </a:p>
@@ -199,6 +203,9 @@
             <a:off x="1524000" y="3602038"/>
             <a:ext cx="9144000" cy="1655762"/>
           </a:xfrm>
+          <a:prstGeom prst="rect">
+            <a:avLst/>
+          </a:prstGeom>
         </p:spPr>
         <p:txBody>
           <a:bodyPr/>
@@ -242,7 +249,7 @@
           </a:lstStyle>
           <a:p>
             <a:r>
-              <a:rPr lang="en-US"/>
+              <a:rPr lang="en-US" dirty="0"/>
               <a:t>Click to edit Master subtitle style</a:t>
             </a:r>
           </a:p>
@@ -271,7 +278,7 @@
           <a:p>
             <a:fld id="{C5F3B386-61D0-A542-9BBD-24895FFB08D6}" type="datetimeFigureOut">
               <a:rPr lang="en-US" smtClean="0"/>
-              <a:t>6/2/20</a:t>
+              <a:t>6/4/20</a:t>
             </a:fld>
             <a:endParaRPr lang="en-US"/>
           </a:p>
@@ -345,7 +352,7 @@
 </file>
 
 <file path=ppt/slideLayouts/slideLayout2.xml><?xml version="1.0" encoding="utf-8"?>
-<p:sldLayout xmlns:a="http://schemas.openxmlformats.org/drawingml/2006/main" xmlns:r="http://schemas.openxmlformats.org/officeDocument/2006/relationships" xmlns:p="http://schemas.openxmlformats.org/presentationml/2006/main" type="obj" preserve="1">
+<p:sldLayout xmlns:a="http://schemas.openxmlformats.org/drawingml/2006/main" xmlns:r="http://schemas.openxmlformats.org/officeDocument/2006/relationships" xmlns:p="http://schemas.openxmlformats.org/presentationml/2006/main" preserve="1" userDrawn="1">
   <p:cSld name="Title and Content">
     <p:spTree>
       <p:nvGrpSpPr>
@@ -363,91 +370,6 @@
       </p:grpSpPr>
       <p:sp>
         <p:nvSpPr>
-          <p:cNvPr id="2" name="Title 1">
-            <a:extLst>
-              <a:ext uri="{FF2B5EF4-FFF2-40B4-BE49-F238E27FC236}">
-                <a16:creationId xmlns:a16="http://schemas.microsoft.com/office/drawing/2014/main" id="{32B28B07-EBA6-8842-9967-A4C59B38A585}"/>
-              </a:ext>
-            </a:extLst>
-          </p:cNvPr>
-          <p:cNvSpPr>
-            <a:spLocks noGrp="1"/>
-          </p:cNvSpPr>
-          <p:nvPr>
-            <p:ph type="title"/>
-          </p:nvPr>
-        </p:nvSpPr>
-        <p:spPr/>
-        <p:txBody>
-          <a:bodyPr/>
-          <a:lstStyle/>
-          <a:p>
-            <a:r>
-              <a:rPr lang="en-US"/>
-              <a:t>Click to edit Master title style</a:t>
-            </a:r>
-          </a:p>
-        </p:txBody>
-      </p:sp>
-      <p:sp>
-        <p:nvSpPr>
-          <p:cNvPr id="3" name="Content Placeholder 2">
-            <a:extLst>
-              <a:ext uri="{FF2B5EF4-FFF2-40B4-BE49-F238E27FC236}">
-                <a16:creationId xmlns:a16="http://schemas.microsoft.com/office/drawing/2014/main" id="{5A41E37D-B66F-B14F-B31F-B0B6281AD520}"/>
-              </a:ext>
-            </a:extLst>
-          </p:cNvPr>
-          <p:cNvSpPr>
-            <a:spLocks noGrp="1"/>
-          </p:cNvSpPr>
-          <p:nvPr>
-            <p:ph idx="1"/>
-          </p:nvPr>
-        </p:nvSpPr>
-        <p:spPr/>
-        <p:txBody>
-          <a:bodyPr/>
-          <a:lstStyle/>
-          <a:p>
-            <a:pPr lvl="0"/>
-            <a:r>
-              <a:rPr lang="en-US"/>
-              <a:t>Edit Master text styles</a:t>
-            </a:r>
-          </a:p>
-          <a:p>
-            <a:pPr lvl="1"/>
-            <a:r>
-              <a:rPr lang="en-US"/>
-              <a:t>Second level</a:t>
-            </a:r>
-          </a:p>
-          <a:p>
-            <a:pPr lvl="2"/>
-            <a:r>
-              <a:rPr lang="en-US"/>
-              <a:t>Third level</a:t>
-            </a:r>
-          </a:p>
-          <a:p>
-            <a:pPr lvl="3"/>
-            <a:r>
-              <a:rPr lang="en-US"/>
-              <a:t>Fourth level</a:t>
-            </a:r>
-          </a:p>
-          <a:p>
-            <a:pPr lvl="4"/>
-            <a:r>
-              <a:rPr lang="en-US"/>
-              <a:t>Fifth level</a:t>
-            </a:r>
-          </a:p>
-        </p:txBody>
-      </p:sp>
-      <p:sp>
-        <p:nvSpPr>
           <p:cNvPr id="4" name="Date Placeholder 3">
             <a:extLst>
               <a:ext uri="{FF2B5EF4-FFF2-40B4-BE49-F238E27FC236}">
@@ -469,7 +391,7 @@
           <a:p>
             <a:fld id="{C5F3B386-61D0-A542-9BBD-24895FFB08D6}" type="datetimeFigureOut">
               <a:rPr lang="en-US" smtClean="0"/>
-              <a:t>6/2/20</a:t>
+              <a:t>6/4/20</a:t>
             </a:fld>
             <a:endParaRPr lang="en-US"/>
           </a:p>
@@ -496,7 +418,7 @@
           <a:bodyPr/>
           <a:lstStyle/>
           <a:p>
-            <a:endParaRPr lang="en-US"/>
+            <a:endParaRPr lang="en-US" dirty="0"/>
           </a:p>
         </p:txBody>
       </p:sp>
@@ -526,6 +448,131 @@
               <a:t>‹#›</a:t>
             </a:fld>
             <a:endParaRPr lang="en-US"/>
+          </a:p>
+        </p:txBody>
+      </p:sp>
+      <p:sp>
+        <p:nvSpPr>
+          <p:cNvPr id="9" name="Footer Placeholder 4">
+            <a:extLst>
+              <a:ext uri="{FF2B5EF4-FFF2-40B4-BE49-F238E27FC236}">
+                <a16:creationId xmlns:a16="http://schemas.microsoft.com/office/drawing/2014/main" id="{756B8A14-E434-4A4C-B53F-F6B6E3BF25D5}"/>
+              </a:ext>
+            </a:extLst>
+          </p:cNvPr>
+          <p:cNvSpPr txBox="1">
+            <a:spLocks/>
+          </p:cNvSpPr>
+          <p:nvPr userDrawn="1"/>
+        </p:nvSpPr>
+        <p:spPr>
+          <a:xfrm>
+            <a:off x="152400" y="117596"/>
+            <a:ext cx="4114800" cy="365125"/>
+          </a:xfrm>
+          <a:prstGeom prst="rect">
+            <a:avLst/>
+          </a:prstGeom>
+        </p:spPr>
+        <p:txBody>
+          <a:bodyPr vert="horz" lIns="91440" tIns="45720" rIns="91440" bIns="45720" rtlCol="0" anchor="ctr"/>
+          <a:lstStyle>
+            <a:defPPr>
+              <a:defRPr lang="en-US"/>
+            </a:defPPr>
+            <a:lvl1pPr marL="0" algn="ctr" defTabSz="914400" rtl="0" eaLnBrk="1" latinLnBrk="0" hangingPunct="1">
+              <a:defRPr sz="1200" kern="1200">
+                <a:solidFill>
+                  <a:schemeClr val="bg1"/>
+                </a:solidFill>
+                <a:latin typeface="+mn-lt"/>
+                <a:ea typeface="+mn-ea"/>
+                <a:cs typeface="+mn-cs"/>
+              </a:defRPr>
+            </a:lvl1pPr>
+            <a:lvl2pPr marL="457200" algn="l" defTabSz="914400" rtl="0" eaLnBrk="1" latinLnBrk="0" hangingPunct="1">
+              <a:defRPr sz="1800" kern="1200">
+                <a:solidFill>
+                  <a:schemeClr val="tx1"/>
+                </a:solidFill>
+                <a:latin typeface="+mn-lt"/>
+                <a:ea typeface="+mn-ea"/>
+                <a:cs typeface="+mn-cs"/>
+              </a:defRPr>
+            </a:lvl2pPr>
+            <a:lvl3pPr marL="914400" algn="l" defTabSz="914400" rtl="0" eaLnBrk="1" latinLnBrk="0" hangingPunct="1">
+              <a:defRPr sz="1800" kern="1200">
+                <a:solidFill>
+                  <a:schemeClr val="tx1"/>
+                </a:solidFill>
+                <a:latin typeface="+mn-lt"/>
+                <a:ea typeface="+mn-ea"/>
+                <a:cs typeface="+mn-cs"/>
+              </a:defRPr>
+            </a:lvl3pPr>
+            <a:lvl4pPr marL="1371600" algn="l" defTabSz="914400" rtl="0" eaLnBrk="1" latinLnBrk="0" hangingPunct="1">
+              <a:defRPr sz="1800" kern="1200">
+                <a:solidFill>
+                  <a:schemeClr val="tx1"/>
+                </a:solidFill>
+                <a:latin typeface="+mn-lt"/>
+                <a:ea typeface="+mn-ea"/>
+                <a:cs typeface="+mn-cs"/>
+              </a:defRPr>
+            </a:lvl4pPr>
+            <a:lvl5pPr marL="1828800" algn="l" defTabSz="914400" rtl="0" eaLnBrk="1" latinLnBrk="0" hangingPunct="1">
+              <a:defRPr sz="1800" kern="1200">
+                <a:solidFill>
+                  <a:schemeClr val="tx1"/>
+                </a:solidFill>
+                <a:latin typeface="+mn-lt"/>
+                <a:ea typeface="+mn-ea"/>
+                <a:cs typeface="+mn-cs"/>
+              </a:defRPr>
+            </a:lvl5pPr>
+            <a:lvl6pPr marL="2286000" algn="l" defTabSz="914400" rtl="0" eaLnBrk="1" latinLnBrk="0" hangingPunct="1">
+              <a:defRPr sz="1800" kern="1200">
+                <a:solidFill>
+                  <a:schemeClr val="tx1"/>
+                </a:solidFill>
+                <a:latin typeface="+mn-lt"/>
+                <a:ea typeface="+mn-ea"/>
+                <a:cs typeface="+mn-cs"/>
+              </a:defRPr>
+            </a:lvl6pPr>
+            <a:lvl7pPr marL="2743200" algn="l" defTabSz="914400" rtl="0" eaLnBrk="1" latinLnBrk="0" hangingPunct="1">
+              <a:defRPr sz="1800" kern="1200">
+                <a:solidFill>
+                  <a:schemeClr val="tx1"/>
+                </a:solidFill>
+                <a:latin typeface="+mn-lt"/>
+                <a:ea typeface="+mn-ea"/>
+                <a:cs typeface="+mn-cs"/>
+              </a:defRPr>
+            </a:lvl7pPr>
+            <a:lvl8pPr marL="3200400" algn="l" defTabSz="914400" rtl="0" eaLnBrk="1" latinLnBrk="0" hangingPunct="1">
+              <a:defRPr sz="1800" kern="1200">
+                <a:solidFill>
+                  <a:schemeClr val="tx1"/>
+                </a:solidFill>
+                <a:latin typeface="+mn-lt"/>
+                <a:ea typeface="+mn-ea"/>
+                <a:cs typeface="+mn-cs"/>
+              </a:defRPr>
+            </a:lvl8pPr>
+            <a:lvl9pPr marL="3657600" algn="l" defTabSz="914400" rtl="0" eaLnBrk="1" latinLnBrk="0" hangingPunct="1">
+              <a:defRPr sz="1800" kern="1200">
+                <a:solidFill>
+                  <a:schemeClr val="tx1"/>
+                </a:solidFill>
+                <a:latin typeface="+mn-lt"/>
+                <a:ea typeface="+mn-ea"/>
+                <a:cs typeface="+mn-cs"/>
+              </a:defRPr>
+            </a:lvl9pPr>
+          </a:lstStyle>
+          <a:p>
+            <a:endParaRPr lang="en-US" sz="1600" dirty="0"/>
           </a:p>
         </p:txBody>
       </p:sp>
@@ -569,111 +616,6 @@
       </p:grpSpPr>
       <p:sp>
         <p:nvSpPr>
-          <p:cNvPr id="2" name="Title Placeholder 1">
-            <a:extLst>
-              <a:ext uri="{FF2B5EF4-FFF2-40B4-BE49-F238E27FC236}">
-                <a16:creationId xmlns:a16="http://schemas.microsoft.com/office/drawing/2014/main" id="{16AEED88-C795-344B-8A20-E8BC6BF47ECA}"/>
-              </a:ext>
-            </a:extLst>
-          </p:cNvPr>
-          <p:cNvSpPr>
-            <a:spLocks noGrp="1"/>
-          </p:cNvSpPr>
-          <p:nvPr>
-            <p:ph type="title"/>
-          </p:nvPr>
-        </p:nvSpPr>
-        <p:spPr>
-          <a:xfrm>
-            <a:off x="838200" y="365125"/>
-            <a:ext cx="10515600" cy="1325563"/>
-          </a:xfrm>
-          <a:prstGeom prst="rect">
-            <a:avLst/>
-          </a:prstGeom>
-        </p:spPr>
-        <p:txBody>
-          <a:bodyPr vert="horz" lIns="91440" tIns="45720" rIns="91440" bIns="45720" rtlCol="0" anchor="ctr">
-            <a:normAutofit/>
-          </a:bodyPr>
-          <a:lstStyle/>
-          <a:p>
-            <a:r>
-              <a:rPr lang="en-US"/>
-              <a:t>Click to edit Master title style</a:t>
-            </a:r>
-          </a:p>
-        </p:txBody>
-      </p:sp>
-      <p:sp>
-        <p:nvSpPr>
-          <p:cNvPr id="3" name="Text Placeholder 2">
-            <a:extLst>
-              <a:ext uri="{FF2B5EF4-FFF2-40B4-BE49-F238E27FC236}">
-                <a16:creationId xmlns:a16="http://schemas.microsoft.com/office/drawing/2014/main" id="{C847053D-1018-5340-A80B-2DE324BF8C7F}"/>
-              </a:ext>
-            </a:extLst>
-          </p:cNvPr>
-          <p:cNvSpPr>
-            <a:spLocks noGrp="1"/>
-          </p:cNvSpPr>
-          <p:nvPr>
-            <p:ph type="body" idx="1"/>
-          </p:nvPr>
-        </p:nvSpPr>
-        <p:spPr>
-          <a:xfrm>
-            <a:off x="838200" y="1825625"/>
-            <a:ext cx="10515600" cy="4351338"/>
-          </a:xfrm>
-          <a:prstGeom prst="rect">
-            <a:avLst/>
-          </a:prstGeom>
-        </p:spPr>
-        <p:txBody>
-          <a:bodyPr vert="horz" lIns="91440" tIns="45720" rIns="91440" bIns="45720" rtlCol="0">
-            <a:normAutofit/>
-          </a:bodyPr>
-          <a:lstStyle/>
-          <a:p>
-            <a:pPr lvl="0"/>
-            <a:r>
-              <a:rPr lang="en-US"/>
-              <a:t>Edit Master text styles</a:t>
-            </a:r>
-          </a:p>
-          <a:p>
-            <a:pPr lvl="1"/>
-            <a:r>
-              <a:rPr lang="en-US"/>
-              <a:t>Second level</a:t>
-            </a:r>
-          </a:p>
-          <a:p>
-            <a:pPr lvl="2"/>
-            <a:r>
-              <a:rPr lang="en-US"/>
-              <a:t>Third level</a:t>
-            </a:r>
-          </a:p>
-          <a:p>
-            <a:pPr lvl="3"/>
-            <a:r>
-              <a:rPr lang="en-US"/>
-              <a:t>Fourth level</a:t>
-            </a:r>
-          </a:p>
-          <a:p>
-            <a:pPr lvl="4"/>
-            <a:r>
-              <a:rPr lang="en-US"/>
-              <a:t>Fifth level</a:t>
-            </a:r>
-          </a:p>
-        </p:txBody>
-      </p:sp>
-      <p:sp>
-        <p:nvSpPr>
           <p:cNvPr id="4" name="Date Placeholder 3">
             <a:extLst>
               <a:ext uri="{FF2B5EF4-FFF2-40B4-BE49-F238E27FC236}">
@@ -712,7 +654,7 @@
             <a:fld id="{C5F3B386-61D0-A542-9BBD-24895FFB08D6}" type="datetimeFigureOut">
               <a:rPr lang="en-US" smtClean="0"/>
               <a:pPr/>
-              <a:t>6/2/20</a:t>
+              <a:t>6/4/20</a:t>
             </a:fld>
             <a:endParaRPr lang="en-US"/>
           </a:p>
@@ -802,6 +744,57 @@
               <a:t>‹#›</a:t>
             </a:fld>
             <a:endParaRPr lang="en-US"/>
+          </a:p>
+        </p:txBody>
+      </p:sp>
+      <p:sp>
+        <p:nvSpPr>
+          <p:cNvPr id="8" name="Title 1">
+            <a:extLst>
+              <a:ext uri="{FF2B5EF4-FFF2-40B4-BE49-F238E27FC236}">
+                <a16:creationId xmlns:a16="http://schemas.microsoft.com/office/drawing/2014/main" id="{54AD75F0-7ECF-5E43-9C44-4B9DA2DBB580}"/>
+              </a:ext>
+            </a:extLst>
+          </p:cNvPr>
+          <p:cNvSpPr txBox="1">
+            <a:spLocks/>
+          </p:cNvSpPr>
+          <p:nvPr userDrawn="1"/>
+        </p:nvSpPr>
+        <p:spPr>
+          <a:xfrm>
+            <a:off x="0" y="78256"/>
+            <a:ext cx="10515600" cy="737534"/>
+          </a:xfrm>
+          <a:prstGeom prst="rect">
+            <a:avLst/>
+          </a:prstGeom>
+        </p:spPr>
+        <p:txBody>
+          <a:bodyPr>
+            <a:normAutofit/>
+          </a:bodyPr>
+          <a:lstStyle>
+            <a:lvl1pPr algn="l" defTabSz="914400" rtl="0" eaLnBrk="1" latinLnBrk="0" hangingPunct="1">
+              <a:lnSpc>
+                <a:spcPct val="90000"/>
+              </a:lnSpc>
+              <a:spcBef>
+                <a:spcPct val="0"/>
+              </a:spcBef>
+              <a:buNone/>
+              <a:defRPr sz="3200" kern="1200">
+                <a:solidFill>
+                  <a:schemeClr val="bg1"/>
+                </a:solidFill>
+                <a:latin typeface="+mj-lt"/>
+                <a:ea typeface="+mj-ea"/>
+                <a:cs typeface="+mj-cs"/>
+              </a:defRPr>
+            </a:lvl1pPr>
+          </a:lstStyle>
+          <a:p>
+            <a:endParaRPr lang="en-US" dirty="0"/>
           </a:p>
         </p:txBody>
       </p:sp>
@@ -3577,7 +3570,7 @@
             <a:spLocks noGrp="1"/>
           </p:cNvSpPr>
           <p:nvPr>
-            <p:ph type="title"/>
+            <p:ph type="title" idx="4294967295"/>
           </p:nvPr>
         </p:nvSpPr>
         <p:spPr>
@@ -3585,6 +3578,9 @@
             <a:off x="756719" y="328911"/>
             <a:ext cx="10515600" cy="341045"/>
           </a:xfrm>
+          <a:prstGeom prst="rect">
+            <a:avLst/>
+          </a:prstGeom>
         </p:spPr>
         <p:txBody>
           <a:bodyPr>
@@ -4633,6 +4629,318 @@
     <p:extLst>
       <p:ext uri="{BB962C8B-B14F-4D97-AF65-F5344CB8AC3E}">
         <p14:creationId xmlns:p14="http://schemas.microsoft.com/office/powerpoint/2010/main" val="235475581"/>
+      </p:ext>
+    </p:extLst>
+  </p:cSld>
+  <p:clrMapOvr>
+    <a:masterClrMapping/>
+  </p:clrMapOvr>
+</p:sld>
+</file>
+
+<file path=ppt/slides/slide3.xml><?xml version="1.0" encoding="utf-8"?>
+<p:sld xmlns:a="http://schemas.openxmlformats.org/drawingml/2006/main" xmlns:r="http://schemas.openxmlformats.org/officeDocument/2006/relationships" xmlns:p="http://schemas.openxmlformats.org/presentationml/2006/main">
+  <p:cSld>
+    <p:spTree>
+      <p:nvGrpSpPr>
+        <p:cNvPr id="1" name=""/>
+        <p:cNvGrpSpPr/>
+        <p:nvPr/>
+      </p:nvGrpSpPr>
+      <p:grpSpPr>
+        <a:xfrm>
+          <a:off x="0" y="0"/>
+          <a:ext cx="0" cy="0"/>
+          <a:chOff x="0" y="0"/>
+          <a:chExt cx="0" cy="0"/>
+        </a:xfrm>
+      </p:grpSpPr>
+      <p:pic>
+        <p:nvPicPr>
+          <p:cNvPr id="4" name="Picture 3">
+            <a:extLst>
+              <a:ext uri="{FF2B5EF4-FFF2-40B4-BE49-F238E27FC236}">
+                <a16:creationId xmlns:a16="http://schemas.microsoft.com/office/drawing/2014/main" id="{011A5516-4A59-4048-9FD0-695643E0A42B}"/>
+              </a:ext>
+            </a:extLst>
+          </p:cNvPr>
+          <p:cNvPicPr>
+            <a:picLocks noChangeAspect="1"/>
+          </p:cNvPicPr>
+          <p:nvPr/>
+        </p:nvPicPr>
+        <p:blipFill>
+          <a:blip r:embed="rId2"/>
+          <a:stretch>
+            <a:fillRect/>
+          </a:stretch>
+        </p:blipFill>
+        <p:spPr>
+          <a:xfrm>
+            <a:off x="114953" y="1478138"/>
+            <a:ext cx="6722879" cy="3282007"/>
+          </a:xfrm>
+          <a:prstGeom prst="rect">
+            <a:avLst/>
+          </a:prstGeom>
+        </p:spPr>
+      </p:pic>
+      <p:sp>
+        <p:nvSpPr>
+          <p:cNvPr id="5" name="Rectangle 4">
+            <a:extLst>
+              <a:ext uri="{FF2B5EF4-FFF2-40B4-BE49-F238E27FC236}">
+                <a16:creationId xmlns:a16="http://schemas.microsoft.com/office/drawing/2014/main" id="{6F19428C-4A0A-7841-92C0-8600B9EF7B1E}"/>
+              </a:ext>
+            </a:extLst>
+          </p:cNvPr>
+          <p:cNvSpPr/>
+          <p:nvPr/>
+        </p:nvSpPr>
+        <p:spPr>
+          <a:xfrm>
+            <a:off x="7621122" y="365124"/>
+            <a:ext cx="3979207" cy="4108263"/>
+          </a:xfrm>
+          <a:prstGeom prst="rect">
+            <a:avLst/>
+          </a:prstGeom>
+        </p:spPr>
+        <p:style>
+          <a:lnRef idx="2">
+            <a:schemeClr val="accent1">
+              <a:shade val="50000"/>
+            </a:schemeClr>
+          </a:lnRef>
+          <a:fillRef idx="1">
+            <a:schemeClr val="accent1"/>
+          </a:fillRef>
+          <a:effectRef idx="0">
+            <a:schemeClr val="accent1"/>
+          </a:effectRef>
+          <a:fontRef idx="minor">
+            <a:schemeClr val="lt1"/>
+          </a:fontRef>
+        </p:style>
+        <p:txBody>
+          <a:bodyPr rtlCol="0" anchor="ctr"/>
+          <a:lstStyle/>
+          <a:p>
+            <a:pPr marL="285750" indent="-285750">
+              <a:buFont typeface="Arial" panose="020B0604020202020204" pitchFamily="34" charset="0"/>
+              <a:buChar char="•"/>
+            </a:pPr>
+            <a:r>
+              <a:rPr lang="en-US" sz="1400" dirty="0"/>
+              <a:t>Click Price</a:t>
+            </a:r>
+          </a:p>
+          <a:p>
+            <a:pPr marL="285750" indent="-285750">
+              <a:buFont typeface="Arial" panose="020B0604020202020204" pitchFamily="34" charset="0"/>
+              <a:buChar char="•"/>
+            </a:pPr>
+            <a:r>
+              <a:rPr lang="en-US" sz="1400" dirty="0" err="1"/>
+              <a:t>Async</a:t>
+            </a:r>
+            <a:r>
+              <a:rPr lang="en-US" sz="1400" dirty="0"/>
+              <a:t> to retrieve data from DB</a:t>
+            </a:r>
+          </a:p>
+          <a:p>
+            <a:pPr marL="742950" lvl="1" indent="-285750">
+              <a:buFont typeface="Arial" panose="020B0604020202020204" pitchFamily="34" charset="0"/>
+              <a:buChar char="•"/>
+            </a:pPr>
+            <a:r>
+              <a:rPr lang="en-US" sz="1400" dirty="0"/>
+              <a:t>Para: price</a:t>
+            </a:r>
+          </a:p>
+          <a:p>
+            <a:pPr marL="742950" lvl="1" indent="-285750">
+              <a:buFont typeface="Arial" panose="020B0604020202020204" pitchFamily="34" charset="0"/>
+              <a:buChar char="•"/>
+            </a:pPr>
+            <a:r>
+              <a:rPr lang="en-US" sz="1400" dirty="0"/>
+              <a:t>DB order by price</a:t>
+            </a:r>
+          </a:p>
+          <a:p>
+            <a:pPr marL="285750" indent="-285750">
+              <a:buFont typeface="Arial" panose="020B0604020202020204" pitchFamily="34" charset="0"/>
+              <a:buChar char="•"/>
+            </a:pPr>
+            <a:r>
+              <a:rPr lang="en-US" sz="1400" dirty="0"/>
+              <a:t>Show table</a:t>
+            </a:r>
+          </a:p>
+          <a:p>
+            <a:pPr marL="285750" indent="-285750">
+              <a:buFont typeface="Arial" panose="020B0604020202020204" pitchFamily="34" charset="0"/>
+              <a:buChar char="•"/>
+            </a:pPr>
+            <a:endParaRPr lang="en-US" sz="1400" dirty="0"/>
+          </a:p>
+          <a:p>
+            <a:pPr marL="285750" indent="-285750">
+              <a:buFont typeface="Arial" panose="020B0604020202020204" pitchFamily="34" charset="0"/>
+              <a:buChar char="•"/>
+            </a:pPr>
+            <a:r>
+              <a:rPr lang="en-US" sz="1400" dirty="0"/>
+              <a:t>Click Price again</a:t>
+            </a:r>
+          </a:p>
+          <a:p>
+            <a:pPr marL="285750" indent="-285750">
+              <a:buFont typeface="Arial" panose="020B0604020202020204" pitchFamily="34" charset="0"/>
+              <a:buChar char="•"/>
+            </a:pPr>
+            <a:r>
+              <a:rPr lang="en-US" sz="1400" dirty="0"/>
+              <a:t>Repeat above but with </a:t>
+            </a:r>
+          </a:p>
+          <a:p>
+            <a:pPr marL="742950" lvl="1" indent="-285750">
+              <a:buFont typeface="Arial" panose="020B0604020202020204" pitchFamily="34" charset="0"/>
+              <a:buChar char="•"/>
+            </a:pPr>
+            <a:r>
+              <a:rPr lang="en-US" sz="1400" dirty="0"/>
+              <a:t>DB order by price DESC (\&gt;)</a:t>
+            </a:r>
+          </a:p>
+          <a:p>
+            <a:endParaRPr lang="en-US" sz="1400" dirty="0"/>
+          </a:p>
+          <a:p>
+            <a:r>
+              <a:rPr lang="en-US" sz="1400" dirty="0"/>
+              <a:t>Front end:</a:t>
+            </a:r>
+          </a:p>
+          <a:p>
+            <a:r>
+              <a:rPr lang="en-US" sz="1400" dirty="0"/>
+              <a:t>Back end</a:t>
+            </a:r>
+          </a:p>
+          <a:p>
+            <a:r>
+              <a:rPr lang="en-US" sz="1400" dirty="0" err="1"/>
+              <a:t>BookDB</a:t>
+            </a:r>
+            <a:r>
+              <a:rPr lang="en-US" sz="1400" dirty="0"/>
+              <a:t>  </a:t>
+            </a:r>
+            <a:r>
+              <a:rPr lang="en-US" sz="1400" dirty="0" err="1"/>
+              <a:t>sortResults</a:t>
+            </a:r>
+            <a:r>
+              <a:rPr lang="en-US" sz="1400" dirty="0"/>
+              <a:t>( para)</a:t>
+            </a:r>
+          </a:p>
+          <a:p>
+            <a:endParaRPr lang="en-US" sz="1400" dirty="0"/>
+          </a:p>
+          <a:p>
+            <a:r>
+              <a:rPr lang="en-US" sz="1400" dirty="0"/>
+              <a:t>be careful :</a:t>
+            </a:r>
+          </a:p>
+          <a:p>
+            <a:endParaRPr lang="en-US" sz="1400" dirty="0"/>
+          </a:p>
+          <a:p>
+            <a:r>
+              <a:rPr lang="en-US" sz="1400" dirty="0"/>
+              <a:t>Column cannot be parameter in JDBC.</a:t>
+            </a:r>
+          </a:p>
+        </p:txBody>
+      </p:sp>
+      <p:sp>
+        <p:nvSpPr>
+          <p:cNvPr id="9" name="Rectangle 8">
+            <a:extLst>
+              <a:ext uri="{FF2B5EF4-FFF2-40B4-BE49-F238E27FC236}">
+                <a16:creationId xmlns:a16="http://schemas.microsoft.com/office/drawing/2014/main" id="{9C147B6B-9B6E-B944-973E-A27E3D75BAD5}"/>
+              </a:ext>
+            </a:extLst>
+          </p:cNvPr>
+          <p:cNvSpPr/>
+          <p:nvPr/>
+        </p:nvSpPr>
+        <p:spPr>
+          <a:xfrm>
+            <a:off x="295417" y="180459"/>
+            <a:ext cx="2933880" cy="461665"/>
+          </a:xfrm>
+          <a:prstGeom prst="rect">
+            <a:avLst/>
+          </a:prstGeom>
+        </p:spPr>
+        <p:txBody>
+          <a:bodyPr wrap="none">
+            <a:spAutoFit/>
+          </a:bodyPr>
+          <a:lstStyle/>
+          <a:p>
+            <a:r>
+              <a:rPr lang="en-US" sz="2400" dirty="0">
+                <a:solidFill>
+                  <a:schemeClr val="bg1"/>
+                </a:solidFill>
+              </a:rPr>
+              <a:t>Sort by Price, reviews,</a:t>
+            </a:r>
+          </a:p>
+        </p:txBody>
+      </p:sp>
+      <p:pic>
+        <p:nvPicPr>
+          <p:cNvPr id="10" name="Picture 9">
+            <a:extLst>
+              <a:ext uri="{FF2B5EF4-FFF2-40B4-BE49-F238E27FC236}">
+                <a16:creationId xmlns:a16="http://schemas.microsoft.com/office/drawing/2014/main" id="{1EDE6C10-517B-3B40-AB53-77378A570CC6}"/>
+              </a:ext>
+            </a:extLst>
+          </p:cNvPr>
+          <p:cNvPicPr>
+            <a:picLocks noChangeAspect="1"/>
+          </p:cNvPicPr>
+          <p:nvPr/>
+        </p:nvPicPr>
+        <p:blipFill>
+          <a:blip r:embed="rId3"/>
+          <a:stretch>
+            <a:fillRect/>
+          </a:stretch>
+        </p:blipFill>
+        <p:spPr>
+          <a:xfrm>
+            <a:off x="5893549" y="365125"/>
+            <a:ext cx="1231900" cy="685800"/>
+          </a:xfrm>
+          <a:prstGeom prst="rect">
+            <a:avLst/>
+          </a:prstGeom>
+        </p:spPr>
+      </p:pic>
+    </p:spTree>
+    <p:extLst>
+      <p:ext uri="{BB962C8B-B14F-4D97-AF65-F5344CB8AC3E}">
+        <p14:creationId xmlns:p14="http://schemas.microsoft.com/office/powerpoint/2010/main" val="3669957498"/>
       </p:ext>
     </p:extLst>
   </p:cSld>

</xml_diff>

<commit_message>
new pagination from DB directly
</commit_message>
<xml_diff>
--- a/build/web/doc/business flow.pptx
+++ b/build/web/doc/business flow.pptx
@@ -7,7 +7,8 @@
   <p:sldIdLst>
     <p:sldId id="256" r:id="rId2"/>
     <p:sldId id="258" r:id="rId3"/>
-    <p:sldId id="259" r:id="rId4"/>
+    <p:sldId id="260" r:id="rId4"/>
+    <p:sldId id="259" r:id="rId5"/>
   </p:sldIdLst>
   <p:sldSz cx="12192000" cy="6858000"/>
   <p:notesSz cx="6858000" cy="9144000"/>
@@ -278,7 +279,7 @@
           <a:p>
             <a:fld id="{C5F3B386-61D0-A542-9BBD-24895FFB08D6}" type="datetimeFigureOut">
               <a:rPr lang="en-US" smtClean="0"/>
-              <a:t>6/4/20</a:t>
+              <a:t>6/5/20</a:t>
             </a:fld>
             <a:endParaRPr lang="en-US"/>
           </a:p>
@@ -391,7 +392,7 @@
           <a:p>
             <a:fld id="{C5F3B386-61D0-A542-9BBD-24895FFB08D6}" type="datetimeFigureOut">
               <a:rPr lang="en-US" smtClean="0"/>
-              <a:t>6/4/20</a:t>
+              <a:t>6/5/20</a:t>
             </a:fld>
             <a:endParaRPr lang="en-US"/>
           </a:p>
@@ -654,7 +655,7 @@
             <a:fld id="{C5F3B386-61D0-A542-9BBD-24895FFB08D6}" type="datetimeFigureOut">
               <a:rPr lang="en-US" smtClean="0"/>
               <a:pPr/>
-              <a:t>6/4/20</a:t>
+              <a:t>6/5/20</a:t>
             </a:fld>
             <a:endParaRPr lang="en-US"/>
           </a:p>
@@ -4655,6 +4656,669 @@
           <a:chExt cx="0" cy="0"/>
         </a:xfrm>
       </p:grpSpPr>
+      <p:sp>
+        <p:nvSpPr>
+          <p:cNvPr id="2" name="Title 1">
+            <a:extLst>
+              <a:ext uri="{FF2B5EF4-FFF2-40B4-BE49-F238E27FC236}">
+                <a16:creationId xmlns:a16="http://schemas.microsoft.com/office/drawing/2014/main" id="{89C02D2D-E749-BD4B-BF23-4854D5DBCB5E}"/>
+              </a:ext>
+            </a:extLst>
+          </p:cNvPr>
+          <p:cNvSpPr>
+            <a:spLocks noGrp="1"/>
+          </p:cNvSpPr>
+          <p:nvPr>
+            <p:ph type="title" idx="4294967295"/>
+          </p:nvPr>
+        </p:nvSpPr>
+        <p:spPr>
+          <a:xfrm>
+            <a:off x="756718" y="328911"/>
+            <a:ext cx="7641047" cy="408090"/>
+          </a:xfrm>
+          <a:prstGeom prst="rect">
+            <a:avLst/>
+          </a:prstGeom>
+        </p:spPr>
+        <p:txBody>
+          <a:bodyPr>
+            <a:noAutofit/>
+          </a:bodyPr>
+          <a:lstStyle/>
+          <a:p>
+            <a:r>
+              <a:rPr lang="en-US" sz="2800" dirty="0"/>
+              <a:t>Pagination-method with DB for a large of data</a:t>
+            </a:r>
+          </a:p>
+        </p:txBody>
+      </p:sp>
+      <p:pic>
+        <p:nvPicPr>
+          <p:cNvPr id="5" name="Picture 4">
+            <a:extLst>
+              <a:ext uri="{FF2B5EF4-FFF2-40B4-BE49-F238E27FC236}">
+                <a16:creationId xmlns:a16="http://schemas.microsoft.com/office/drawing/2014/main" id="{F66206B8-508C-1A43-914C-39D55F81FA09}"/>
+              </a:ext>
+            </a:extLst>
+          </p:cNvPr>
+          <p:cNvPicPr>
+            <a:picLocks noChangeAspect="1"/>
+          </p:cNvPicPr>
+          <p:nvPr/>
+        </p:nvPicPr>
+        <p:blipFill>
+          <a:blip r:embed="rId2"/>
+          <a:stretch>
+            <a:fillRect/>
+          </a:stretch>
+        </p:blipFill>
+        <p:spPr>
+          <a:xfrm>
+            <a:off x="1575302" y="4646528"/>
+            <a:ext cx="1756372" cy="310818"/>
+          </a:xfrm>
+          <a:prstGeom prst="rect">
+            <a:avLst/>
+          </a:prstGeom>
+        </p:spPr>
+      </p:pic>
+      <p:cxnSp>
+        <p:nvCxnSpPr>
+          <p:cNvPr id="7" name="Straight Arrow Connector 6">
+            <a:extLst>
+              <a:ext uri="{FF2B5EF4-FFF2-40B4-BE49-F238E27FC236}">
+                <a16:creationId xmlns:a16="http://schemas.microsoft.com/office/drawing/2014/main" id="{FA3E49CA-67F4-BF44-A66C-80C24FB72F32}"/>
+              </a:ext>
+            </a:extLst>
+          </p:cNvPr>
+          <p:cNvCxnSpPr>
+            <a:cxnSpLocks/>
+            <a:stCxn id="5" idx="3"/>
+            <a:endCxn id="8" idx="1"/>
+          </p:cNvCxnSpPr>
+          <p:nvPr/>
+        </p:nvCxnSpPr>
+        <p:spPr>
+          <a:xfrm flipV="1">
+            <a:off x="3331674" y="4646528"/>
+            <a:ext cx="2097387" cy="155409"/>
+          </a:xfrm>
+          <a:prstGeom prst="straightConnector1">
+            <a:avLst/>
+          </a:prstGeom>
+          <a:ln>
+            <a:solidFill>
+              <a:schemeClr val="bg1"/>
+            </a:solidFill>
+            <a:tailEnd type="triangle"/>
+          </a:ln>
+        </p:spPr>
+        <p:style>
+          <a:lnRef idx="1">
+            <a:schemeClr val="accent1"/>
+          </a:lnRef>
+          <a:fillRef idx="0">
+            <a:schemeClr val="accent1"/>
+          </a:fillRef>
+          <a:effectRef idx="0">
+            <a:schemeClr val="accent1"/>
+          </a:effectRef>
+          <a:fontRef idx="minor">
+            <a:schemeClr val="tx1"/>
+          </a:fontRef>
+        </p:style>
+      </p:cxnSp>
+      <p:sp>
+        <p:nvSpPr>
+          <p:cNvPr id="8" name="TextBox 7">
+            <a:extLst>
+              <a:ext uri="{FF2B5EF4-FFF2-40B4-BE49-F238E27FC236}">
+                <a16:creationId xmlns:a16="http://schemas.microsoft.com/office/drawing/2014/main" id="{D3640195-D9D3-BC47-8B51-C78689A499A0}"/>
+              </a:ext>
+            </a:extLst>
+          </p:cNvPr>
+          <p:cNvSpPr txBox="1"/>
+          <p:nvPr/>
+        </p:nvSpPr>
+        <p:spPr>
+          <a:xfrm>
+            <a:off x="5429061" y="3738587"/>
+            <a:ext cx="6363545" cy="1815882"/>
+          </a:xfrm>
+          <a:prstGeom prst="rect">
+            <a:avLst/>
+          </a:prstGeom>
+          <a:noFill/>
+        </p:spPr>
+        <p:txBody>
+          <a:bodyPr wrap="square" rtlCol="0">
+            <a:spAutoFit/>
+          </a:bodyPr>
+          <a:lstStyle/>
+          <a:p>
+            <a:r>
+              <a:rPr lang="en-US" sz="1600" dirty="0">
+                <a:solidFill>
+                  <a:schemeClr val="bg1"/>
+                </a:solidFill>
+              </a:rPr>
+              <a:t>Pagination bar</a:t>
+            </a:r>
+          </a:p>
+          <a:p>
+            <a:r>
+              <a:rPr lang="en-US" sz="1600" dirty="0">
+                <a:solidFill>
+                  <a:schemeClr val="bg1"/>
+                </a:solidFill>
+              </a:rPr>
+              <a:t>Click pagination bar number</a:t>
+            </a:r>
+          </a:p>
+          <a:p>
+            <a:pPr marL="285750" indent="-285750">
+              <a:buFont typeface="Wingdings" pitchFamily="2" charset="2"/>
+              <a:buChar char="à"/>
+            </a:pPr>
+            <a:r>
+              <a:rPr lang="en-US" sz="1600" dirty="0">
+                <a:solidFill>
+                  <a:schemeClr val="bg1"/>
+                </a:solidFill>
+                <a:sym typeface="Wingdings" pitchFamily="2" charset="2"/>
+              </a:rPr>
+              <a:t>retrieve data from DB</a:t>
+            </a:r>
+          </a:p>
+          <a:p>
+            <a:pPr marL="742950" lvl="1" indent="-285750">
+              <a:buFont typeface="Wingdings" pitchFamily="2" charset="2"/>
+              <a:buChar char="à"/>
+            </a:pPr>
+            <a:r>
+              <a:rPr lang="en-US" sz="1600" dirty="0">
+                <a:solidFill>
+                  <a:schemeClr val="bg1"/>
+                </a:solidFill>
+                <a:sym typeface="Wingdings" pitchFamily="2" charset="2"/>
+              </a:rPr>
+              <a:t> (limit (page number-1)*</a:t>
+            </a:r>
+            <a:r>
+              <a:rPr lang="en-US" sz="1600" dirty="0" err="1">
+                <a:solidFill>
+                  <a:schemeClr val="bg1"/>
+                </a:solidFill>
+                <a:sym typeface="Wingdings" pitchFamily="2" charset="2"/>
+              </a:rPr>
+              <a:t>pageitems</a:t>
+            </a:r>
+            <a:r>
+              <a:rPr lang="en-US" sz="1600" dirty="0">
+                <a:solidFill>
+                  <a:schemeClr val="bg1"/>
+                </a:solidFill>
+                <a:sym typeface="Wingdings" pitchFamily="2" charset="2"/>
+              </a:rPr>
+              <a:t>, (page number)*</a:t>
+            </a:r>
+            <a:r>
+              <a:rPr lang="en-US" sz="1600" dirty="0" err="1">
+                <a:solidFill>
+                  <a:schemeClr val="bg1"/>
+                </a:solidFill>
+                <a:sym typeface="Wingdings" pitchFamily="2" charset="2"/>
+              </a:rPr>
+              <a:t>pageitems</a:t>
+            </a:r>
+            <a:r>
+              <a:rPr lang="en-US" sz="1600" dirty="0">
+                <a:solidFill>
+                  <a:schemeClr val="bg1"/>
+                </a:solidFill>
+                <a:sym typeface="Wingdings" pitchFamily="2" charset="2"/>
+              </a:rPr>
+              <a:t>) </a:t>
+            </a:r>
+          </a:p>
+          <a:p>
+            <a:endParaRPr lang="en-US" sz="1600" dirty="0">
+              <a:solidFill>
+                <a:schemeClr val="bg1"/>
+              </a:solidFill>
+              <a:sym typeface="Wingdings" pitchFamily="2" charset="2"/>
+            </a:endParaRPr>
+          </a:p>
+          <a:p>
+            <a:r>
+              <a:rPr lang="en-US" sz="1600" dirty="0">
+                <a:solidFill>
+                  <a:schemeClr val="bg1"/>
+                </a:solidFill>
+                <a:sym typeface="Wingdings" pitchFamily="2" charset="2"/>
+              </a:rPr>
+              <a:t>Click search1</a:t>
+            </a:r>
+          </a:p>
+          <a:p>
+            <a:r>
+              <a:rPr lang="en-US" sz="1600" dirty="0">
+                <a:solidFill>
+                  <a:schemeClr val="bg1"/>
+                </a:solidFill>
+                <a:sym typeface="Wingdings" pitchFamily="2" charset="2"/>
+              </a:rPr>
+              <a:t> </a:t>
+            </a:r>
+            <a:r>
+              <a:rPr lang="en-US" sz="1600" dirty="0" err="1">
+                <a:solidFill>
+                  <a:schemeClr val="bg1"/>
+                </a:solidFill>
+                <a:sym typeface="Wingdings" pitchFamily="2" charset="2"/>
+              </a:rPr>
+              <a:t>Retrive</a:t>
+            </a:r>
+            <a:r>
+              <a:rPr lang="en-US" sz="1600" dirty="0">
+                <a:solidFill>
+                  <a:schemeClr val="bg1"/>
+                </a:solidFill>
+                <a:sym typeface="Wingdings" pitchFamily="2" charset="2"/>
+              </a:rPr>
+              <a:t> data from DB(limit 0, </a:t>
+            </a:r>
+            <a:r>
+              <a:rPr lang="en-US" sz="1600" dirty="0" err="1">
+                <a:solidFill>
+                  <a:schemeClr val="bg1"/>
+                </a:solidFill>
+                <a:sym typeface="Wingdings" pitchFamily="2" charset="2"/>
+              </a:rPr>
+              <a:t>pageitems</a:t>
+            </a:r>
+            <a:r>
+              <a:rPr lang="en-US" sz="1600" dirty="0">
+                <a:solidFill>
+                  <a:schemeClr val="bg1"/>
+                </a:solidFill>
+                <a:sym typeface="Wingdings" pitchFamily="2" charset="2"/>
+              </a:rPr>
+              <a:t>)</a:t>
+            </a:r>
+            <a:endParaRPr lang="en-US" sz="1600" dirty="0">
+              <a:solidFill>
+                <a:schemeClr val="bg1"/>
+              </a:solidFill>
+            </a:endParaRPr>
+          </a:p>
+        </p:txBody>
+      </p:sp>
+      <p:sp>
+        <p:nvSpPr>
+          <p:cNvPr id="18" name="Rectangle 17">
+            <a:extLst>
+              <a:ext uri="{FF2B5EF4-FFF2-40B4-BE49-F238E27FC236}">
+                <a16:creationId xmlns:a16="http://schemas.microsoft.com/office/drawing/2014/main" id="{2C9A15BD-DD04-6141-B79B-149A620F709D}"/>
+              </a:ext>
+            </a:extLst>
+          </p:cNvPr>
+          <p:cNvSpPr/>
+          <p:nvPr/>
+        </p:nvSpPr>
+        <p:spPr>
+          <a:xfrm>
+            <a:off x="1475274" y="1448554"/>
+            <a:ext cx="3187261" cy="3132499"/>
+          </a:xfrm>
+          <a:prstGeom prst="rect">
+            <a:avLst/>
+          </a:prstGeom>
+        </p:spPr>
+        <p:style>
+          <a:lnRef idx="2">
+            <a:schemeClr val="accent1">
+              <a:shade val="50000"/>
+            </a:schemeClr>
+          </a:lnRef>
+          <a:fillRef idx="1">
+            <a:schemeClr val="accent1"/>
+          </a:fillRef>
+          <a:effectRef idx="0">
+            <a:schemeClr val="accent1"/>
+          </a:effectRef>
+          <a:fontRef idx="minor">
+            <a:schemeClr val="lt1"/>
+          </a:fontRef>
+        </p:style>
+        <p:txBody>
+          <a:bodyPr rtlCol="0" anchor="ctr"/>
+          <a:lstStyle/>
+          <a:p>
+            <a:pPr algn="ctr"/>
+            <a:r>
+              <a:rPr lang="en-US" dirty="0"/>
+              <a:t>table</a:t>
+            </a:r>
+          </a:p>
+        </p:txBody>
+      </p:sp>
+      <p:sp>
+        <p:nvSpPr>
+          <p:cNvPr id="25" name="Rectangle 24">
+            <a:extLst>
+              <a:ext uri="{FF2B5EF4-FFF2-40B4-BE49-F238E27FC236}">
+                <a16:creationId xmlns:a16="http://schemas.microsoft.com/office/drawing/2014/main" id="{F936027E-803E-4242-BD67-E5155E9BA33D}"/>
+              </a:ext>
+            </a:extLst>
+          </p:cNvPr>
+          <p:cNvSpPr/>
+          <p:nvPr/>
+        </p:nvSpPr>
+        <p:spPr>
+          <a:xfrm>
+            <a:off x="305428" y="1494207"/>
+            <a:ext cx="960862" cy="271219"/>
+          </a:xfrm>
+          <a:prstGeom prst="rect">
+            <a:avLst/>
+          </a:prstGeom>
+        </p:spPr>
+        <p:style>
+          <a:lnRef idx="2">
+            <a:schemeClr val="accent1">
+              <a:shade val="50000"/>
+            </a:schemeClr>
+          </a:lnRef>
+          <a:fillRef idx="1">
+            <a:schemeClr val="accent1"/>
+          </a:fillRef>
+          <a:effectRef idx="0">
+            <a:schemeClr val="accent1"/>
+          </a:effectRef>
+          <a:fontRef idx="minor">
+            <a:schemeClr val="lt1"/>
+          </a:fontRef>
+        </p:style>
+        <p:txBody>
+          <a:bodyPr rtlCol="0" anchor="ctr"/>
+          <a:lstStyle/>
+          <a:p>
+            <a:pPr algn="ctr"/>
+            <a:r>
+              <a:rPr lang="en-US" sz="1600" dirty="0"/>
+              <a:t>search1</a:t>
+            </a:r>
+          </a:p>
+        </p:txBody>
+      </p:sp>
+      <p:sp>
+        <p:nvSpPr>
+          <p:cNvPr id="28" name="Rectangle 27">
+            <a:extLst>
+              <a:ext uri="{FF2B5EF4-FFF2-40B4-BE49-F238E27FC236}">
+                <a16:creationId xmlns:a16="http://schemas.microsoft.com/office/drawing/2014/main" id="{FD5A7FEE-0644-F649-9D49-CE53E694622D}"/>
+              </a:ext>
+            </a:extLst>
+          </p:cNvPr>
+          <p:cNvSpPr/>
+          <p:nvPr/>
+        </p:nvSpPr>
+        <p:spPr>
+          <a:xfrm>
+            <a:off x="3412558" y="4646528"/>
+            <a:ext cx="426708" cy="269341"/>
+          </a:xfrm>
+          <a:prstGeom prst="rect">
+            <a:avLst/>
+          </a:prstGeom>
+        </p:spPr>
+        <p:style>
+          <a:lnRef idx="2">
+            <a:schemeClr val="accent1">
+              <a:shade val="50000"/>
+            </a:schemeClr>
+          </a:lnRef>
+          <a:fillRef idx="1">
+            <a:schemeClr val="accent1"/>
+          </a:fillRef>
+          <a:effectRef idx="0">
+            <a:schemeClr val="accent1"/>
+          </a:effectRef>
+          <a:fontRef idx="minor">
+            <a:schemeClr val="lt1"/>
+          </a:fontRef>
+        </p:style>
+        <p:txBody>
+          <a:bodyPr rtlCol="0" anchor="ctr"/>
+          <a:lstStyle/>
+          <a:p>
+            <a:pPr algn="ctr"/>
+            <a:r>
+              <a:rPr lang="en-US" sz="1200" dirty="0"/>
+              <a:t>5</a:t>
+            </a:r>
+          </a:p>
+        </p:txBody>
+      </p:sp>
+      <p:sp>
+        <p:nvSpPr>
+          <p:cNvPr id="29" name="TextBox 28">
+            <a:extLst>
+              <a:ext uri="{FF2B5EF4-FFF2-40B4-BE49-F238E27FC236}">
+                <a16:creationId xmlns:a16="http://schemas.microsoft.com/office/drawing/2014/main" id="{85C426D1-9865-8042-87DC-8E0622B8D90F}"/>
+              </a:ext>
+            </a:extLst>
+          </p:cNvPr>
+          <p:cNvSpPr txBox="1"/>
+          <p:nvPr/>
+        </p:nvSpPr>
+        <p:spPr>
+          <a:xfrm>
+            <a:off x="3839266" y="4646528"/>
+            <a:ext cx="895696" cy="276999"/>
+          </a:xfrm>
+          <a:prstGeom prst="rect">
+            <a:avLst/>
+          </a:prstGeom>
+          <a:noFill/>
+        </p:spPr>
+        <p:txBody>
+          <a:bodyPr wrap="square" rtlCol="0">
+            <a:spAutoFit/>
+          </a:bodyPr>
+          <a:lstStyle/>
+          <a:p>
+            <a:r>
+              <a:rPr lang="en-US" sz="1200" dirty="0">
+                <a:solidFill>
+                  <a:schemeClr val="bg1"/>
+                </a:solidFill>
+              </a:rPr>
+              <a:t>items/page</a:t>
+            </a:r>
+          </a:p>
+        </p:txBody>
+      </p:sp>
+      <p:sp>
+        <p:nvSpPr>
+          <p:cNvPr id="35" name="Rectangle 34">
+            <a:extLst>
+              <a:ext uri="{FF2B5EF4-FFF2-40B4-BE49-F238E27FC236}">
+                <a16:creationId xmlns:a16="http://schemas.microsoft.com/office/drawing/2014/main" id="{72F19D48-B275-444A-BA9F-9A33A85DA9D2}"/>
+              </a:ext>
+            </a:extLst>
+          </p:cNvPr>
+          <p:cNvSpPr/>
+          <p:nvPr/>
+        </p:nvSpPr>
+        <p:spPr>
+          <a:xfrm>
+            <a:off x="278111" y="1955934"/>
+            <a:ext cx="960862" cy="271219"/>
+          </a:xfrm>
+          <a:prstGeom prst="rect">
+            <a:avLst/>
+          </a:prstGeom>
+        </p:spPr>
+        <p:style>
+          <a:lnRef idx="2">
+            <a:schemeClr val="accent1">
+              <a:shade val="50000"/>
+            </a:schemeClr>
+          </a:lnRef>
+          <a:fillRef idx="1">
+            <a:schemeClr val="accent1"/>
+          </a:fillRef>
+          <a:effectRef idx="0">
+            <a:schemeClr val="accent1"/>
+          </a:effectRef>
+          <a:fontRef idx="minor">
+            <a:schemeClr val="lt1"/>
+          </a:fontRef>
+        </p:style>
+        <p:txBody>
+          <a:bodyPr rtlCol="0" anchor="ctr"/>
+          <a:lstStyle/>
+          <a:p>
+            <a:pPr algn="ctr"/>
+            <a:r>
+              <a:rPr lang="en-US" sz="1600" dirty="0"/>
+              <a:t>search2</a:t>
+            </a:r>
+          </a:p>
+        </p:txBody>
+      </p:sp>
+      <p:sp>
+        <p:nvSpPr>
+          <p:cNvPr id="36" name="Rectangle 35">
+            <a:extLst>
+              <a:ext uri="{FF2B5EF4-FFF2-40B4-BE49-F238E27FC236}">
+                <a16:creationId xmlns:a16="http://schemas.microsoft.com/office/drawing/2014/main" id="{DBBA6808-2120-BF47-AD7F-73123524B9AB}"/>
+              </a:ext>
+            </a:extLst>
+          </p:cNvPr>
+          <p:cNvSpPr/>
+          <p:nvPr/>
+        </p:nvSpPr>
+        <p:spPr>
+          <a:xfrm>
+            <a:off x="305428" y="2522632"/>
+            <a:ext cx="960862" cy="271219"/>
+          </a:xfrm>
+          <a:prstGeom prst="rect">
+            <a:avLst/>
+          </a:prstGeom>
+        </p:spPr>
+        <p:style>
+          <a:lnRef idx="2">
+            <a:schemeClr val="accent1">
+              <a:shade val="50000"/>
+            </a:schemeClr>
+          </a:lnRef>
+          <a:fillRef idx="1">
+            <a:schemeClr val="accent1"/>
+          </a:fillRef>
+          <a:effectRef idx="0">
+            <a:schemeClr val="accent1"/>
+          </a:effectRef>
+          <a:fontRef idx="minor">
+            <a:schemeClr val="lt1"/>
+          </a:fontRef>
+        </p:style>
+        <p:txBody>
+          <a:bodyPr rtlCol="0" anchor="ctr"/>
+          <a:lstStyle/>
+          <a:p>
+            <a:pPr algn="ctr"/>
+            <a:r>
+              <a:rPr lang="en-US" sz="1600" dirty="0"/>
+              <a:t>search3</a:t>
+            </a:r>
+          </a:p>
+        </p:txBody>
+      </p:sp>
+      <p:sp>
+        <p:nvSpPr>
+          <p:cNvPr id="37" name="Rectangle 36">
+            <a:extLst>
+              <a:ext uri="{FF2B5EF4-FFF2-40B4-BE49-F238E27FC236}">
+                <a16:creationId xmlns:a16="http://schemas.microsoft.com/office/drawing/2014/main" id="{DCD4D372-5A5A-D647-9460-45E4C0642AC3}"/>
+              </a:ext>
+            </a:extLst>
+          </p:cNvPr>
+          <p:cNvSpPr/>
+          <p:nvPr/>
+        </p:nvSpPr>
+        <p:spPr>
+          <a:xfrm>
+            <a:off x="299486" y="3114612"/>
+            <a:ext cx="960862" cy="271219"/>
+          </a:xfrm>
+          <a:prstGeom prst="rect">
+            <a:avLst/>
+          </a:prstGeom>
+        </p:spPr>
+        <p:style>
+          <a:lnRef idx="2">
+            <a:schemeClr val="accent1">
+              <a:shade val="50000"/>
+            </a:schemeClr>
+          </a:lnRef>
+          <a:fillRef idx="1">
+            <a:schemeClr val="accent1"/>
+          </a:fillRef>
+          <a:effectRef idx="0">
+            <a:schemeClr val="accent1"/>
+          </a:effectRef>
+          <a:fontRef idx="minor">
+            <a:schemeClr val="lt1"/>
+          </a:fontRef>
+        </p:style>
+        <p:txBody>
+          <a:bodyPr rtlCol="0" anchor="ctr"/>
+          <a:lstStyle/>
+          <a:p>
+            <a:pPr algn="ctr"/>
+            <a:r>
+              <a:rPr lang="en-US" sz="1600" dirty="0"/>
+              <a:t>search4</a:t>
+            </a:r>
+          </a:p>
+        </p:txBody>
+      </p:sp>
+    </p:spTree>
+    <p:extLst>
+      <p:ext uri="{BB962C8B-B14F-4D97-AF65-F5344CB8AC3E}">
+        <p14:creationId xmlns:p14="http://schemas.microsoft.com/office/powerpoint/2010/main" val="3104768899"/>
+      </p:ext>
+    </p:extLst>
+  </p:cSld>
+  <p:clrMapOvr>
+    <a:masterClrMapping/>
+  </p:clrMapOvr>
+</p:sld>
+</file>
+
+<file path=ppt/slides/slide4.xml><?xml version="1.0" encoding="utf-8"?>
+<p:sld xmlns:a="http://schemas.openxmlformats.org/drawingml/2006/main" xmlns:r="http://schemas.openxmlformats.org/officeDocument/2006/relationships" xmlns:p="http://schemas.openxmlformats.org/presentationml/2006/main">
+  <p:cSld>
+    <p:spTree>
+      <p:nvGrpSpPr>
+        <p:cNvPr id="1" name=""/>
+        <p:cNvGrpSpPr/>
+        <p:nvPr/>
+      </p:nvGrpSpPr>
+      <p:grpSpPr>
+        <a:xfrm>
+          <a:off x="0" y="0"/>
+          <a:ext cx="0" cy="0"/>
+          <a:chOff x="0" y="0"/>
+          <a:chExt cx="0" cy="0"/>
+        </a:xfrm>
+      </p:grpSpPr>
       <p:pic>
         <p:nvPicPr>
           <p:cNvPr id="4" name="Picture 3">

</xml_diff>